<commit_message>
Update presentations and numbering
</commit_message>
<xml_diff>
--- a/presentations/01_intro_to_python.pptx
+++ b/presentations/01_intro_to_python.pptx
@@ -5,18 +5,13 @@
     <p:sldMasterId id="2147483648" r:id="rId4"/>
   </p:sldMasterIdLst>
   <p:notesMasterIdLst>
-    <p:notesMasterId r:id="rId14"/>
+    <p:notesMasterId r:id="rId9"/>
   </p:notesMasterIdLst>
   <p:sldIdLst>
     <p:sldId id="324" r:id="rId5"/>
-    <p:sldId id="337" r:id="rId6"/>
-    <p:sldId id="336" r:id="rId7"/>
-    <p:sldId id="330" r:id="rId8"/>
-    <p:sldId id="331" r:id="rId9"/>
-    <p:sldId id="332" r:id="rId10"/>
-    <p:sldId id="333" r:id="rId11"/>
-    <p:sldId id="334" r:id="rId12"/>
-    <p:sldId id="335" r:id="rId13"/>
+    <p:sldId id="338" r:id="rId6"/>
+    <p:sldId id="337" r:id="rId7"/>
+    <p:sldId id="339" r:id="rId8"/>
   </p:sldIdLst>
   <p:sldSz cx="12192000" cy="6858000"/>
   <p:notesSz cx="7315200" cy="9601200"/>
@@ -137,177 +132,13 @@
 <file path=ppt/revisionInfo.xml><?xml version="1.0" encoding="utf-8"?>
 <p1510:revInfo xmlns:a="http://schemas.openxmlformats.org/drawingml/2006/main" xmlns:r="http://schemas.openxmlformats.org/officeDocument/2006/relationships" xmlns:p1510="http://schemas.microsoft.com/office/powerpoint/2015/10/main">
   <p1510:revLst>
-    <p1510:client id="{373F5699-3C0E-4355-B31C-A4709A6527A1}" v="1" dt="2023-07-05T17:27:30.875"/>
-    <p1510:client id="{7D70C094-A805-428F-B743-92F967DB2CA9}" v="8" dt="2023-07-06T12:19:42.166"/>
+    <p1510:client id="{9744BA7C-2BE5-4B7E-856E-FE2B955BEC20}" v="2" dt="2023-11-01T12:59:50.917"/>
   </p1510:revLst>
 </p1510:revInfo>
 </file>
 
 <file path=ppt/changesInfos/changesInfo1.xml><?xml version="1.0" encoding="utf-8"?>
 <pc:chgInfo xmlns:a="http://schemas.openxmlformats.org/drawingml/2006/main" xmlns:r="http://schemas.openxmlformats.org/officeDocument/2006/relationships" xmlns:ac="http://schemas.microsoft.com/office/drawing/2013/main/command" xmlns:pc="http://schemas.microsoft.com/office/powerpoint/2013/main/command">
-  <pc:docChgLst>
-    <pc:chgData name="Haskell,Allyson A" userId="f01f6c31-ef41-49db-8aa6-74fdc01fc293" providerId="ADAL" clId="{21E60B1A-A99F-4C7D-AC1F-8C261FD9A5AD}"/>
-    <pc:docChg chg="modSld">
-      <pc:chgData name="Haskell,Allyson A" userId="f01f6c31-ef41-49db-8aa6-74fdc01fc293" providerId="ADAL" clId="{21E60B1A-A99F-4C7D-AC1F-8C261FD9A5AD}" dt="2023-01-23T19:59:12.395" v="330" actId="962"/>
-      <pc:docMkLst>
-        <pc:docMk/>
-      </pc:docMkLst>
-      <pc:sldChg chg="modSp">
-        <pc:chgData name="Haskell,Allyson A" userId="f01f6c31-ef41-49db-8aa6-74fdc01fc293" providerId="ADAL" clId="{21E60B1A-A99F-4C7D-AC1F-8C261FD9A5AD}" dt="2023-01-23T19:59:04.243" v="329" actId="962"/>
-        <pc:sldMkLst>
-          <pc:docMk/>
-          <pc:sldMk cId="3933901158" sldId="266"/>
-        </pc:sldMkLst>
-        <pc:picChg chg="mod">
-          <ac:chgData name="Haskell,Allyson A" userId="f01f6c31-ef41-49db-8aa6-74fdc01fc293" providerId="ADAL" clId="{21E60B1A-A99F-4C7D-AC1F-8C261FD9A5AD}" dt="2023-01-23T19:59:04.243" v="329" actId="962"/>
-          <ac:picMkLst>
-            <pc:docMk/>
-            <pc:sldMk cId="3933901158" sldId="266"/>
-            <ac:picMk id="5" creationId="{D8E6060C-1B45-5B40-59EC-374B080840B8}"/>
-          </ac:picMkLst>
-        </pc:picChg>
-      </pc:sldChg>
-      <pc:sldChg chg="modSp">
-        <pc:chgData name="Haskell,Allyson A" userId="f01f6c31-ef41-49db-8aa6-74fdc01fc293" providerId="ADAL" clId="{21E60B1A-A99F-4C7D-AC1F-8C261FD9A5AD}" dt="2023-01-23T19:59:12.395" v="330" actId="962"/>
-        <pc:sldMkLst>
-          <pc:docMk/>
-          <pc:sldMk cId="2027155574" sldId="304"/>
-        </pc:sldMkLst>
-        <pc:picChg chg="mod">
-          <ac:chgData name="Haskell,Allyson A" userId="f01f6c31-ef41-49db-8aa6-74fdc01fc293" providerId="ADAL" clId="{21E60B1A-A99F-4C7D-AC1F-8C261FD9A5AD}" dt="2023-01-23T19:59:12.395" v="330" actId="962"/>
-          <ac:picMkLst>
-            <pc:docMk/>
-            <pc:sldMk cId="2027155574" sldId="304"/>
-            <ac:picMk id="13" creationId="{5167A017-3AA1-BFB9-5E6C-8D7A4DB8ED66}"/>
-          </ac:picMkLst>
-        </pc:picChg>
-      </pc:sldChg>
-      <pc:sldChg chg="addSp modSp">
-        <pc:chgData name="Haskell,Allyson A" userId="f01f6c31-ef41-49db-8aa6-74fdc01fc293" providerId="ADAL" clId="{21E60B1A-A99F-4C7D-AC1F-8C261FD9A5AD}" dt="2023-01-23T19:58:54.633" v="328" actId="962"/>
-        <pc:sldMkLst>
-          <pc:docMk/>
-          <pc:sldMk cId="2383651979" sldId="323"/>
-        </pc:sldMkLst>
-        <pc:spChg chg="add mod">
-          <ac:chgData name="Haskell,Allyson A" userId="f01f6c31-ef41-49db-8aa6-74fdc01fc293" providerId="ADAL" clId="{21E60B1A-A99F-4C7D-AC1F-8C261FD9A5AD}" dt="2023-01-23T19:58:23.515" v="324" actId="13244"/>
-          <ac:spMkLst>
-            <pc:docMk/>
-            <pc:sldMk cId="2383651979" sldId="323"/>
-            <ac:spMk id="2" creationId="{BC93EE85-2B2A-41CB-841E-13221C6EFFF9}"/>
-          </ac:spMkLst>
-        </pc:spChg>
-        <pc:picChg chg="mod">
-          <ac:chgData name="Haskell,Allyson A" userId="f01f6c31-ef41-49db-8aa6-74fdc01fc293" providerId="ADAL" clId="{21E60B1A-A99F-4C7D-AC1F-8C261FD9A5AD}" dt="2023-01-23T19:58:54.633" v="328" actId="962"/>
-          <ac:picMkLst>
-            <pc:docMk/>
-            <pc:sldMk cId="2383651979" sldId="323"/>
-            <ac:picMk id="3" creationId="{72A9A38D-4A89-28B3-5130-307F350F651B}"/>
-          </ac:picMkLst>
-        </pc:picChg>
-        <pc:picChg chg="mod">
-          <ac:chgData name="Haskell,Allyson A" userId="f01f6c31-ef41-49db-8aa6-74fdc01fc293" providerId="ADAL" clId="{21E60B1A-A99F-4C7D-AC1F-8C261FD9A5AD}" dt="2023-01-23T19:58:31.498" v="325" actId="962"/>
-          <ac:picMkLst>
-            <pc:docMk/>
-            <pc:sldMk cId="2383651979" sldId="323"/>
-            <ac:picMk id="1026" creationId="{2E199D10-634D-4257-BA3C-C6BFAF6D0A76}"/>
-          </ac:picMkLst>
-        </pc:picChg>
-      </pc:sldChg>
-      <pc:sldChg chg="addSp modSp mod">
-        <pc:chgData name="Haskell,Allyson A" userId="f01f6c31-ef41-49db-8aa6-74fdc01fc293" providerId="ADAL" clId="{21E60B1A-A99F-4C7D-AC1F-8C261FD9A5AD}" dt="2023-01-23T19:53:12.683" v="134" actId="962"/>
-        <pc:sldMkLst>
-          <pc:docMk/>
-          <pc:sldMk cId="4229412751" sldId="324"/>
-        </pc:sldMkLst>
-        <pc:spChg chg="mod">
-          <ac:chgData name="Haskell,Allyson A" userId="f01f6c31-ef41-49db-8aa6-74fdc01fc293" providerId="ADAL" clId="{21E60B1A-A99F-4C7D-AC1F-8C261FD9A5AD}" dt="2023-01-23T19:53:00.060" v="133" actId="962"/>
-          <ac:spMkLst>
-            <pc:docMk/>
-            <pc:sldMk cId="4229412751" sldId="324"/>
-            <ac:spMk id="3" creationId="{098BC2D2-CCF7-4C63-8489-B46BF394FCA2}"/>
-          </ac:spMkLst>
-        </pc:spChg>
-        <pc:spChg chg="add mod">
-          <ac:chgData name="Haskell,Allyson A" userId="f01f6c31-ef41-49db-8aa6-74fdc01fc293" providerId="ADAL" clId="{21E60B1A-A99F-4C7D-AC1F-8C261FD9A5AD}" dt="2023-01-23T19:52:56.737" v="130" actId="13244"/>
-          <ac:spMkLst>
-            <pc:docMk/>
-            <pc:sldMk cId="4229412751" sldId="324"/>
-            <ac:spMk id="4" creationId="{0324F03B-D820-4DF5-90A3-53682AC9E13C}"/>
-          </ac:spMkLst>
-        </pc:spChg>
-        <pc:picChg chg="mod">
-          <ac:chgData name="Haskell,Allyson A" userId="f01f6c31-ef41-49db-8aa6-74fdc01fc293" providerId="ADAL" clId="{21E60B1A-A99F-4C7D-AC1F-8C261FD9A5AD}" dt="2023-01-23T19:53:12.683" v="134" actId="962"/>
-          <ac:picMkLst>
-            <pc:docMk/>
-            <pc:sldMk cId="4229412751" sldId="324"/>
-            <ac:picMk id="2" creationId="{892659E9-3D8B-3B83-8D4A-7A89613C0D45}"/>
-          </ac:picMkLst>
-        </pc:picChg>
-        <pc:picChg chg="mod">
-          <ac:chgData name="Haskell,Allyson A" userId="f01f6c31-ef41-49db-8aa6-74fdc01fc293" providerId="ADAL" clId="{21E60B1A-A99F-4C7D-AC1F-8C261FD9A5AD}" dt="2023-01-23T19:45:27.422" v="0" actId="962"/>
-          <ac:picMkLst>
-            <pc:docMk/>
-            <pc:sldMk cId="4229412751" sldId="324"/>
-            <ac:picMk id="5" creationId="{DF27BAC9-5A6D-3E11-357C-BAB7C3DD4FB8}"/>
-          </ac:picMkLst>
-        </pc:picChg>
-      </pc:sldChg>
-      <pc:sldChg chg="addSp modSp">
-        <pc:chgData name="Haskell,Allyson A" userId="f01f6c31-ef41-49db-8aa6-74fdc01fc293" providerId="ADAL" clId="{21E60B1A-A99F-4C7D-AC1F-8C261FD9A5AD}" dt="2023-01-23T19:55:54.591" v="322" actId="962"/>
-        <pc:sldMkLst>
-          <pc:docMk/>
-          <pc:sldMk cId="3550115435" sldId="327"/>
-        </pc:sldMkLst>
-        <pc:spChg chg="add mod">
-          <ac:chgData name="Haskell,Allyson A" userId="f01f6c31-ef41-49db-8aa6-74fdc01fc293" providerId="ADAL" clId="{21E60B1A-A99F-4C7D-AC1F-8C261FD9A5AD}" dt="2023-01-23T19:53:23.045" v="135" actId="13244"/>
-          <ac:spMkLst>
-            <pc:docMk/>
-            <pc:sldMk cId="3550115435" sldId="327"/>
-            <ac:spMk id="2" creationId="{E6BB0473-FC8D-4BAF-A8F1-9C301A2784FA}"/>
-          </ac:spMkLst>
-        </pc:spChg>
-        <pc:picChg chg="mod">
-          <ac:chgData name="Haskell,Allyson A" userId="f01f6c31-ef41-49db-8aa6-74fdc01fc293" providerId="ADAL" clId="{21E60B1A-A99F-4C7D-AC1F-8C261FD9A5AD}" dt="2023-01-23T19:53:35.564" v="137" actId="962"/>
-          <ac:picMkLst>
-            <pc:docMk/>
-            <pc:sldMk cId="3550115435" sldId="327"/>
-            <ac:picMk id="5" creationId="{3C93E1AE-B47F-6FB3-D05A-3B4FA7B5732A}"/>
-          </ac:picMkLst>
-        </pc:picChg>
-        <pc:picChg chg="mod">
-          <ac:chgData name="Haskell,Allyson A" userId="f01f6c31-ef41-49db-8aa6-74fdc01fc293" providerId="ADAL" clId="{21E60B1A-A99F-4C7D-AC1F-8C261FD9A5AD}" dt="2023-01-23T19:55:54.591" v="322" actId="962"/>
-          <ac:picMkLst>
-            <pc:docMk/>
-            <pc:sldMk cId="3550115435" sldId="327"/>
-            <ac:picMk id="6" creationId="{6706020F-E618-4544-8D79-F68CC7189235}"/>
-          </ac:picMkLst>
-        </pc:picChg>
-        <pc:picChg chg="mod">
-          <ac:chgData name="Haskell,Allyson A" userId="f01f6c31-ef41-49db-8aa6-74fdc01fc293" providerId="ADAL" clId="{21E60B1A-A99F-4C7D-AC1F-8C261FD9A5AD}" dt="2023-01-23T19:53:29.016" v="136" actId="13244"/>
-          <ac:picMkLst>
-            <pc:docMk/>
-            <pc:sldMk cId="3550115435" sldId="327"/>
-            <ac:picMk id="1026" creationId="{4C852AB5-B5EE-F094-02DA-3EF5C6A37A2C}"/>
-          </ac:picMkLst>
-        </pc:picChg>
-      </pc:sldChg>
-      <pc:sldChg chg="modSp">
-        <pc:chgData name="Haskell,Allyson A" userId="f01f6c31-ef41-49db-8aa6-74fdc01fc293" providerId="ADAL" clId="{21E60B1A-A99F-4C7D-AC1F-8C261FD9A5AD}" dt="2023-01-23T19:52:37.853" v="129" actId="1076"/>
-        <pc:sldMkLst>
-          <pc:docMk/>
-          <pc:sldMk cId="2552202046" sldId="328"/>
-        </pc:sldMkLst>
-        <pc:spChg chg="mod">
-          <ac:chgData name="Haskell,Allyson A" userId="f01f6c31-ef41-49db-8aa6-74fdc01fc293" providerId="ADAL" clId="{21E60B1A-A99F-4C7D-AC1F-8C261FD9A5AD}" dt="2023-01-23T19:52:37.853" v="129" actId="1076"/>
-          <ac:spMkLst>
-            <pc:docMk/>
-            <pc:sldMk cId="2552202046" sldId="328"/>
-            <ac:spMk id="2" creationId="{E572A712-B415-4A2E-7599-A6167150739A}"/>
-          </ac:spMkLst>
-        </pc:spChg>
-      </pc:sldChg>
-    </pc:docChg>
-  </pc:docChgLst>
   <pc:docChgLst>
     <pc:chgData name="Maxwell,Daniel" userId="1b6ea79d-60d7-472e-a79a-e3fa9de1dfad" providerId="ADAL" clId="{353E58A6-5010-4706-8696-C30084910A34}"/>
     <pc:docChg chg="addSld delSld modSld sldOrd">
@@ -372,6 +203,359 @@
             <pc:docMk/>
             <pc:sldMk cId="3195899701" sldId="342"/>
             <ac:picMk id="7" creationId="{6C96B688-60A5-052A-4D3C-4625A9A3755F}"/>
+          </ac:picMkLst>
+        </pc:picChg>
+      </pc:sldChg>
+    </pc:docChg>
+  </pc:docChgLst>
+  <pc:docChgLst>
+    <pc:chgData name="Haskell,Allyson A" userId="f01f6c31-ef41-49db-8aa6-74fdc01fc293" providerId="ADAL" clId="{21E60B1A-A99F-4C7D-AC1F-8C261FD9A5AD}"/>
+    <pc:docChg chg="modSld">
+      <pc:chgData name="Haskell,Allyson A" userId="f01f6c31-ef41-49db-8aa6-74fdc01fc293" providerId="ADAL" clId="{21E60B1A-A99F-4C7D-AC1F-8C261FD9A5AD}" dt="2023-01-23T19:59:12.395" v="330" actId="962"/>
+      <pc:docMkLst>
+        <pc:docMk/>
+      </pc:docMkLst>
+      <pc:sldChg chg="modSp">
+        <pc:chgData name="Haskell,Allyson A" userId="f01f6c31-ef41-49db-8aa6-74fdc01fc293" providerId="ADAL" clId="{21E60B1A-A99F-4C7D-AC1F-8C261FD9A5AD}" dt="2023-01-23T19:59:04.243" v="329" actId="962"/>
+        <pc:sldMkLst>
+          <pc:docMk/>
+          <pc:sldMk cId="3933901158" sldId="266"/>
+        </pc:sldMkLst>
+        <pc:picChg chg="mod">
+          <ac:chgData name="Haskell,Allyson A" userId="f01f6c31-ef41-49db-8aa6-74fdc01fc293" providerId="ADAL" clId="{21E60B1A-A99F-4C7D-AC1F-8C261FD9A5AD}" dt="2023-01-23T19:59:04.243" v="329" actId="962"/>
+          <ac:picMkLst>
+            <pc:docMk/>
+            <pc:sldMk cId="3933901158" sldId="266"/>
+            <ac:picMk id="5" creationId="{D8E6060C-1B45-5B40-59EC-374B080840B8}"/>
+          </ac:picMkLst>
+        </pc:picChg>
+      </pc:sldChg>
+      <pc:sldChg chg="modSp">
+        <pc:chgData name="Haskell,Allyson A" userId="f01f6c31-ef41-49db-8aa6-74fdc01fc293" providerId="ADAL" clId="{21E60B1A-A99F-4C7D-AC1F-8C261FD9A5AD}" dt="2023-01-23T19:59:12.395" v="330" actId="962"/>
+        <pc:sldMkLst>
+          <pc:docMk/>
+          <pc:sldMk cId="2027155574" sldId="304"/>
+        </pc:sldMkLst>
+        <pc:picChg chg="mod">
+          <ac:chgData name="Haskell,Allyson A" userId="f01f6c31-ef41-49db-8aa6-74fdc01fc293" providerId="ADAL" clId="{21E60B1A-A99F-4C7D-AC1F-8C261FD9A5AD}" dt="2023-01-23T19:59:12.395" v="330" actId="962"/>
+          <ac:picMkLst>
+            <pc:docMk/>
+            <pc:sldMk cId="2027155574" sldId="304"/>
+            <ac:picMk id="13" creationId="{5167A017-3AA1-BFB9-5E6C-8D7A4DB8ED66}"/>
+          </ac:picMkLst>
+        </pc:picChg>
+      </pc:sldChg>
+      <pc:sldChg chg="addSp modSp">
+        <pc:chgData name="Haskell,Allyson A" userId="f01f6c31-ef41-49db-8aa6-74fdc01fc293" providerId="ADAL" clId="{21E60B1A-A99F-4C7D-AC1F-8C261FD9A5AD}" dt="2023-01-23T19:58:54.633" v="328" actId="962"/>
+        <pc:sldMkLst>
+          <pc:docMk/>
+          <pc:sldMk cId="2383651979" sldId="323"/>
+        </pc:sldMkLst>
+        <pc:spChg chg="add mod">
+          <ac:chgData name="Haskell,Allyson A" userId="f01f6c31-ef41-49db-8aa6-74fdc01fc293" providerId="ADAL" clId="{21E60B1A-A99F-4C7D-AC1F-8C261FD9A5AD}" dt="2023-01-23T19:58:23.515" v="324" actId="13244"/>
+          <ac:spMkLst>
+            <pc:docMk/>
+            <pc:sldMk cId="2383651979" sldId="323"/>
+            <ac:spMk id="2" creationId="{BC93EE85-2B2A-41CB-841E-13221C6EFFF9}"/>
+          </ac:spMkLst>
+        </pc:spChg>
+        <pc:picChg chg="mod">
+          <ac:chgData name="Haskell,Allyson A" userId="f01f6c31-ef41-49db-8aa6-74fdc01fc293" providerId="ADAL" clId="{21E60B1A-A99F-4C7D-AC1F-8C261FD9A5AD}" dt="2023-01-23T19:58:54.633" v="328" actId="962"/>
+          <ac:picMkLst>
+            <pc:docMk/>
+            <pc:sldMk cId="2383651979" sldId="323"/>
+            <ac:picMk id="3" creationId="{72A9A38D-4A89-28B3-5130-307F350F651B}"/>
+          </ac:picMkLst>
+        </pc:picChg>
+        <pc:picChg chg="mod">
+          <ac:chgData name="Haskell,Allyson A" userId="f01f6c31-ef41-49db-8aa6-74fdc01fc293" providerId="ADAL" clId="{21E60B1A-A99F-4C7D-AC1F-8C261FD9A5AD}" dt="2023-01-23T19:58:31.498" v="325" actId="962"/>
+          <ac:picMkLst>
+            <pc:docMk/>
+            <pc:sldMk cId="2383651979" sldId="323"/>
+            <ac:picMk id="1026" creationId="{2E199D10-634D-4257-BA3C-C6BFAF6D0A76}"/>
+          </ac:picMkLst>
+        </pc:picChg>
+      </pc:sldChg>
+      <pc:sldChg chg="addSp modSp mod">
+        <pc:chgData name="Haskell,Allyson A" userId="f01f6c31-ef41-49db-8aa6-74fdc01fc293" providerId="ADAL" clId="{21E60B1A-A99F-4C7D-AC1F-8C261FD9A5AD}" dt="2023-01-23T19:53:12.683" v="134" actId="962"/>
+        <pc:sldMkLst>
+          <pc:docMk/>
+          <pc:sldMk cId="4229412751" sldId="324"/>
+        </pc:sldMkLst>
+        <pc:spChg chg="mod">
+          <ac:chgData name="Haskell,Allyson A" userId="f01f6c31-ef41-49db-8aa6-74fdc01fc293" providerId="ADAL" clId="{21E60B1A-A99F-4C7D-AC1F-8C261FD9A5AD}" dt="2023-01-23T19:53:00.060" v="133" actId="962"/>
+          <ac:spMkLst>
+            <pc:docMk/>
+            <pc:sldMk cId="4229412751" sldId="324"/>
+            <ac:spMk id="3" creationId="{098BC2D2-CCF7-4C63-8489-B46BF394FCA2}"/>
+          </ac:spMkLst>
+        </pc:spChg>
+        <pc:spChg chg="add mod">
+          <ac:chgData name="Haskell,Allyson A" userId="f01f6c31-ef41-49db-8aa6-74fdc01fc293" providerId="ADAL" clId="{21E60B1A-A99F-4C7D-AC1F-8C261FD9A5AD}" dt="2023-01-23T19:52:56.737" v="130" actId="13244"/>
+          <ac:spMkLst>
+            <pc:docMk/>
+            <pc:sldMk cId="4229412751" sldId="324"/>
+            <ac:spMk id="4" creationId="{0324F03B-D820-4DF5-90A3-53682AC9E13C}"/>
+          </ac:spMkLst>
+        </pc:spChg>
+        <pc:picChg chg="mod">
+          <ac:chgData name="Haskell,Allyson A" userId="f01f6c31-ef41-49db-8aa6-74fdc01fc293" providerId="ADAL" clId="{21E60B1A-A99F-4C7D-AC1F-8C261FD9A5AD}" dt="2023-01-23T19:53:12.683" v="134" actId="962"/>
+          <ac:picMkLst>
+            <pc:docMk/>
+            <pc:sldMk cId="4229412751" sldId="324"/>
+            <ac:picMk id="2" creationId="{892659E9-3D8B-3B83-8D4A-7A89613C0D45}"/>
+          </ac:picMkLst>
+        </pc:picChg>
+        <pc:picChg chg="mod">
+          <ac:chgData name="Haskell,Allyson A" userId="f01f6c31-ef41-49db-8aa6-74fdc01fc293" providerId="ADAL" clId="{21E60B1A-A99F-4C7D-AC1F-8C261FD9A5AD}" dt="2023-01-23T19:45:27.422" v="0" actId="962"/>
+          <ac:picMkLst>
+            <pc:docMk/>
+            <pc:sldMk cId="4229412751" sldId="324"/>
+            <ac:picMk id="5" creationId="{DF27BAC9-5A6D-3E11-357C-BAB7C3DD4FB8}"/>
+          </ac:picMkLst>
+        </pc:picChg>
+      </pc:sldChg>
+      <pc:sldChg chg="addSp modSp">
+        <pc:chgData name="Haskell,Allyson A" userId="f01f6c31-ef41-49db-8aa6-74fdc01fc293" providerId="ADAL" clId="{21E60B1A-A99F-4C7D-AC1F-8C261FD9A5AD}" dt="2023-01-23T19:55:54.591" v="322" actId="962"/>
+        <pc:sldMkLst>
+          <pc:docMk/>
+          <pc:sldMk cId="3550115435" sldId="327"/>
+        </pc:sldMkLst>
+        <pc:spChg chg="add mod">
+          <ac:chgData name="Haskell,Allyson A" userId="f01f6c31-ef41-49db-8aa6-74fdc01fc293" providerId="ADAL" clId="{21E60B1A-A99F-4C7D-AC1F-8C261FD9A5AD}" dt="2023-01-23T19:53:23.045" v="135" actId="13244"/>
+          <ac:spMkLst>
+            <pc:docMk/>
+            <pc:sldMk cId="3550115435" sldId="327"/>
+            <ac:spMk id="2" creationId="{E6BB0473-FC8D-4BAF-A8F1-9C301A2784FA}"/>
+          </ac:spMkLst>
+        </pc:spChg>
+        <pc:picChg chg="mod">
+          <ac:chgData name="Haskell,Allyson A" userId="f01f6c31-ef41-49db-8aa6-74fdc01fc293" providerId="ADAL" clId="{21E60B1A-A99F-4C7D-AC1F-8C261FD9A5AD}" dt="2023-01-23T19:53:35.564" v="137" actId="962"/>
+          <ac:picMkLst>
+            <pc:docMk/>
+            <pc:sldMk cId="3550115435" sldId="327"/>
+            <ac:picMk id="5" creationId="{3C93E1AE-B47F-6FB3-D05A-3B4FA7B5732A}"/>
+          </ac:picMkLst>
+        </pc:picChg>
+        <pc:picChg chg="mod">
+          <ac:chgData name="Haskell,Allyson A" userId="f01f6c31-ef41-49db-8aa6-74fdc01fc293" providerId="ADAL" clId="{21E60B1A-A99F-4C7D-AC1F-8C261FD9A5AD}" dt="2023-01-23T19:55:54.591" v="322" actId="962"/>
+          <ac:picMkLst>
+            <pc:docMk/>
+            <pc:sldMk cId="3550115435" sldId="327"/>
+            <ac:picMk id="6" creationId="{6706020F-E618-4544-8D79-F68CC7189235}"/>
+          </ac:picMkLst>
+        </pc:picChg>
+        <pc:picChg chg="mod">
+          <ac:chgData name="Haskell,Allyson A" userId="f01f6c31-ef41-49db-8aa6-74fdc01fc293" providerId="ADAL" clId="{21E60B1A-A99F-4C7D-AC1F-8C261FD9A5AD}" dt="2023-01-23T19:53:29.016" v="136" actId="13244"/>
+          <ac:picMkLst>
+            <pc:docMk/>
+            <pc:sldMk cId="3550115435" sldId="327"/>
+            <ac:picMk id="1026" creationId="{4C852AB5-B5EE-F094-02DA-3EF5C6A37A2C}"/>
+          </ac:picMkLst>
+        </pc:picChg>
+      </pc:sldChg>
+      <pc:sldChg chg="modSp">
+        <pc:chgData name="Haskell,Allyson A" userId="f01f6c31-ef41-49db-8aa6-74fdc01fc293" providerId="ADAL" clId="{21E60B1A-A99F-4C7D-AC1F-8C261FD9A5AD}" dt="2023-01-23T19:52:37.853" v="129" actId="1076"/>
+        <pc:sldMkLst>
+          <pc:docMk/>
+          <pc:sldMk cId="2552202046" sldId="328"/>
+        </pc:sldMkLst>
+        <pc:spChg chg="mod">
+          <ac:chgData name="Haskell,Allyson A" userId="f01f6c31-ef41-49db-8aa6-74fdc01fc293" providerId="ADAL" clId="{21E60B1A-A99F-4C7D-AC1F-8C261FD9A5AD}" dt="2023-01-23T19:52:37.853" v="129" actId="1076"/>
+          <ac:spMkLst>
+            <pc:docMk/>
+            <pc:sldMk cId="2552202046" sldId="328"/>
+            <ac:spMk id="2" creationId="{E572A712-B415-4A2E-7599-A6167150739A}"/>
+          </ac:spMkLst>
+        </pc:spChg>
+      </pc:sldChg>
+    </pc:docChg>
+  </pc:docChgLst>
+  <pc:docChgLst>
+    <pc:chgData name="Gitzendanner, Matt" userId="b4bd9a28-947d-4019-a646-080a1de8474c" providerId="ADAL" clId="{29AF0007-F919-4A0F-89FE-B26226E3B811}"/>
+    <pc:docChg chg="custSel addSld delSld modSld sldOrd">
+      <pc:chgData name="Gitzendanner, Matt" userId="b4bd9a28-947d-4019-a646-080a1de8474c" providerId="ADAL" clId="{29AF0007-F919-4A0F-89FE-B26226E3B811}" dt="2023-09-05T17:27:50.122" v="320" actId="962"/>
+      <pc:docMkLst>
+        <pc:docMk/>
+      </pc:docMkLst>
+      <pc:sldChg chg="del">
+        <pc:chgData name="Gitzendanner, Matt" userId="b4bd9a28-947d-4019-a646-080a1de8474c" providerId="ADAL" clId="{29AF0007-F919-4A0F-89FE-B26226E3B811}" dt="2023-09-05T17:16:42.589" v="7" actId="47"/>
+        <pc:sldMkLst>
+          <pc:docMk/>
+          <pc:sldMk cId="972631615" sldId="330"/>
+        </pc:sldMkLst>
+      </pc:sldChg>
+      <pc:sldChg chg="del">
+        <pc:chgData name="Gitzendanner, Matt" userId="b4bd9a28-947d-4019-a646-080a1de8474c" providerId="ADAL" clId="{29AF0007-F919-4A0F-89FE-B26226E3B811}" dt="2023-09-05T17:16:42.589" v="7" actId="47"/>
+        <pc:sldMkLst>
+          <pc:docMk/>
+          <pc:sldMk cId="4257819007" sldId="331"/>
+        </pc:sldMkLst>
+      </pc:sldChg>
+      <pc:sldChg chg="del">
+        <pc:chgData name="Gitzendanner, Matt" userId="b4bd9a28-947d-4019-a646-080a1de8474c" providerId="ADAL" clId="{29AF0007-F919-4A0F-89FE-B26226E3B811}" dt="2023-09-05T17:16:42.589" v="7" actId="47"/>
+        <pc:sldMkLst>
+          <pc:docMk/>
+          <pc:sldMk cId="2760127036" sldId="332"/>
+        </pc:sldMkLst>
+      </pc:sldChg>
+      <pc:sldChg chg="del">
+        <pc:chgData name="Gitzendanner, Matt" userId="b4bd9a28-947d-4019-a646-080a1de8474c" providerId="ADAL" clId="{29AF0007-F919-4A0F-89FE-B26226E3B811}" dt="2023-09-05T17:16:42.589" v="7" actId="47"/>
+        <pc:sldMkLst>
+          <pc:docMk/>
+          <pc:sldMk cId="3975799666" sldId="333"/>
+        </pc:sldMkLst>
+      </pc:sldChg>
+      <pc:sldChg chg="del">
+        <pc:chgData name="Gitzendanner, Matt" userId="b4bd9a28-947d-4019-a646-080a1de8474c" providerId="ADAL" clId="{29AF0007-F919-4A0F-89FE-B26226E3B811}" dt="2023-09-05T17:16:42.589" v="7" actId="47"/>
+        <pc:sldMkLst>
+          <pc:docMk/>
+          <pc:sldMk cId="3662302424" sldId="334"/>
+        </pc:sldMkLst>
+      </pc:sldChg>
+      <pc:sldChg chg="del">
+        <pc:chgData name="Gitzendanner, Matt" userId="b4bd9a28-947d-4019-a646-080a1de8474c" providerId="ADAL" clId="{29AF0007-F919-4A0F-89FE-B26226E3B811}" dt="2023-09-05T17:16:42.589" v="7" actId="47"/>
+        <pc:sldMkLst>
+          <pc:docMk/>
+          <pc:sldMk cId="3062191149" sldId="335"/>
+        </pc:sldMkLst>
+      </pc:sldChg>
+      <pc:sldChg chg="del">
+        <pc:chgData name="Gitzendanner, Matt" userId="b4bd9a28-947d-4019-a646-080a1de8474c" providerId="ADAL" clId="{29AF0007-F919-4A0F-89FE-B26226E3B811}" dt="2023-09-05T17:16:42.589" v="7" actId="47"/>
+        <pc:sldMkLst>
+          <pc:docMk/>
+          <pc:sldMk cId="3739470341" sldId="336"/>
+        </pc:sldMkLst>
+      </pc:sldChg>
+      <pc:sldChg chg="addSp delSp modSp mod delAnim modAnim modNotesTx">
+        <pc:chgData name="Gitzendanner, Matt" userId="b4bd9a28-947d-4019-a646-080a1de8474c" providerId="ADAL" clId="{29AF0007-F919-4A0F-89FE-B26226E3B811}" dt="2023-09-05T17:27:29.020" v="192" actId="962"/>
+        <pc:sldMkLst>
+          <pc:docMk/>
+          <pc:sldMk cId="392144026" sldId="337"/>
+        </pc:sldMkLst>
+        <pc:picChg chg="add del mod">
+          <ac:chgData name="Gitzendanner, Matt" userId="b4bd9a28-947d-4019-a646-080a1de8474c" providerId="ADAL" clId="{29AF0007-F919-4A0F-89FE-B26226E3B811}" dt="2023-09-05T17:21:27.168" v="29" actId="478"/>
+          <ac:picMkLst>
+            <pc:docMk/>
+            <pc:sldMk cId="392144026" sldId="337"/>
+            <ac:picMk id="3" creationId="{75F00E85-81DC-B82D-31A0-293ED8BA4ADD}"/>
+          </ac:picMkLst>
+        </pc:picChg>
+        <pc:picChg chg="add del mod">
+          <ac:chgData name="Gitzendanner, Matt" userId="b4bd9a28-947d-4019-a646-080a1de8474c" providerId="ADAL" clId="{29AF0007-F919-4A0F-89FE-B26226E3B811}" dt="2023-09-05T17:22:47.155" v="37" actId="21"/>
+          <ac:picMkLst>
+            <pc:docMk/>
+            <pc:sldMk cId="392144026" sldId="337"/>
+            <ac:picMk id="5" creationId="{7483BC5B-5544-F3B5-E8A4-207C7E5CFC31}"/>
+          </ac:picMkLst>
+        </pc:picChg>
+        <pc:picChg chg="mod">
+          <ac:chgData name="Gitzendanner, Matt" userId="b4bd9a28-947d-4019-a646-080a1de8474c" providerId="ADAL" clId="{29AF0007-F919-4A0F-89FE-B26226E3B811}" dt="2023-09-05T17:27:29.020" v="192" actId="962"/>
+          <ac:picMkLst>
+            <pc:docMk/>
+            <pc:sldMk cId="392144026" sldId="337"/>
+            <ac:picMk id="1026" creationId="{3723C6B1-ABA5-663E-4CCE-F7DFCC646272}"/>
+          </ac:picMkLst>
+        </pc:picChg>
+      </pc:sldChg>
+      <pc:sldChg chg="addSp modSp new mod ord setBg modAnim">
+        <pc:chgData name="Gitzendanner, Matt" userId="b4bd9a28-947d-4019-a646-080a1de8474c" providerId="ADAL" clId="{29AF0007-F919-4A0F-89FE-B26226E3B811}" dt="2023-09-05T17:27:18.373" v="142" actId="962"/>
+        <pc:sldMkLst>
+          <pc:docMk/>
+          <pc:sldMk cId="3385506350" sldId="338"/>
+        </pc:sldMkLst>
+        <pc:picChg chg="add mod ord">
+          <ac:chgData name="Gitzendanner, Matt" userId="b4bd9a28-947d-4019-a646-080a1de8474c" providerId="ADAL" clId="{29AF0007-F919-4A0F-89FE-B26226E3B811}" dt="2023-09-05T17:27:01.638" v="66" actId="962"/>
+          <ac:picMkLst>
+            <pc:docMk/>
+            <pc:sldMk cId="3385506350" sldId="338"/>
+            <ac:picMk id="2" creationId="{E87BC2EE-676C-78A6-6452-B7171DA5AE94}"/>
+          </ac:picMkLst>
+        </pc:picChg>
+        <pc:picChg chg="add mod ord">
+          <ac:chgData name="Gitzendanner, Matt" userId="b4bd9a28-947d-4019-a646-080a1de8474c" providerId="ADAL" clId="{29AF0007-F919-4A0F-89FE-B26226E3B811}" dt="2023-09-05T17:27:11.254" v="105" actId="962"/>
+          <ac:picMkLst>
+            <pc:docMk/>
+            <pc:sldMk cId="3385506350" sldId="338"/>
+            <ac:picMk id="3" creationId="{FBF248DE-3F48-2FCD-D5B4-81F7CA1E67D3}"/>
+          </ac:picMkLst>
+        </pc:picChg>
+        <pc:picChg chg="add mod">
+          <ac:chgData name="Gitzendanner, Matt" userId="b4bd9a28-947d-4019-a646-080a1de8474c" providerId="ADAL" clId="{29AF0007-F919-4A0F-89FE-B26226E3B811}" dt="2023-09-05T17:27:18.373" v="142" actId="962"/>
+          <ac:picMkLst>
+            <pc:docMk/>
+            <pc:sldMk cId="3385506350" sldId="338"/>
+            <ac:picMk id="4" creationId="{90BA9BEC-A6D4-09EB-A1B3-7F22AD647B8C}"/>
+          </ac:picMkLst>
+        </pc:picChg>
+        <pc:cxnChg chg="add">
+          <ac:chgData name="Gitzendanner, Matt" userId="b4bd9a28-947d-4019-a646-080a1de8474c" providerId="ADAL" clId="{29AF0007-F919-4A0F-89FE-B26226E3B811}" dt="2023-09-05T17:23:00.545" v="39" actId="26606"/>
+          <ac:cxnSpMkLst>
+            <pc:docMk/>
+            <pc:sldMk cId="3385506350" sldId="338"/>
+            <ac:cxnSpMk id="9" creationId="{DCD67800-37AC-4E14-89B0-F79DCB3FB86D}"/>
+          </ac:cxnSpMkLst>
+        </pc:cxnChg>
+        <pc:cxnChg chg="add">
+          <ac:chgData name="Gitzendanner, Matt" userId="b4bd9a28-947d-4019-a646-080a1de8474c" providerId="ADAL" clId="{29AF0007-F919-4A0F-89FE-B26226E3B811}" dt="2023-09-05T17:23:00.545" v="39" actId="26606"/>
+          <ac:cxnSpMkLst>
+            <pc:docMk/>
+            <pc:sldMk cId="3385506350" sldId="338"/>
+            <ac:cxnSpMk id="11" creationId="{20F1788F-A5AE-4188-8274-F7F2E3833ECD}"/>
+          </ac:cxnSpMkLst>
+        </pc:cxnChg>
+      </pc:sldChg>
+      <pc:sldChg chg="addSp delSp modSp new del mod">
+        <pc:chgData name="Gitzendanner, Matt" userId="b4bd9a28-947d-4019-a646-080a1de8474c" providerId="ADAL" clId="{29AF0007-F919-4A0F-89FE-B26226E3B811}" dt="2023-09-05T17:20:12.261" v="22" actId="47"/>
+        <pc:sldMkLst>
+          <pc:docMk/>
+          <pc:sldMk cId="342891500" sldId="339"/>
+        </pc:sldMkLst>
+        <pc:spChg chg="add del mod">
+          <ac:chgData name="Gitzendanner, Matt" userId="b4bd9a28-947d-4019-a646-080a1de8474c" providerId="ADAL" clId="{29AF0007-F919-4A0F-89FE-B26226E3B811}" dt="2023-09-05T17:20:08.725" v="21" actId="478"/>
+          <ac:spMkLst>
+            <pc:docMk/>
+            <pc:sldMk cId="342891500" sldId="339"/>
+            <ac:spMk id="2" creationId="{8CE0E23E-9B69-1457-8E12-5FDC60F3B96A}"/>
+          </ac:spMkLst>
+        </pc:spChg>
+        <pc:spChg chg="add del mod">
+          <ac:chgData name="Gitzendanner, Matt" userId="b4bd9a28-947d-4019-a646-080a1de8474c" providerId="ADAL" clId="{29AF0007-F919-4A0F-89FE-B26226E3B811}" dt="2023-09-05T17:20:07.877" v="20" actId="478"/>
+          <ac:spMkLst>
+            <pc:docMk/>
+            <pc:sldMk cId="342891500" sldId="339"/>
+            <ac:spMk id="3" creationId="{843F2EE5-2120-C01C-50BA-B07AC1CA22C1}"/>
+          </ac:spMkLst>
+        </pc:spChg>
+      </pc:sldChg>
+      <pc:sldChg chg="addSp delSp modSp add modAnim modNotesTx">
+        <pc:chgData name="Gitzendanner, Matt" userId="b4bd9a28-947d-4019-a646-080a1de8474c" providerId="ADAL" clId="{29AF0007-F919-4A0F-89FE-B26226E3B811}" dt="2023-09-05T17:27:50.122" v="320" actId="962"/>
+        <pc:sldMkLst>
+          <pc:docMk/>
+          <pc:sldMk cId="2933933768" sldId="339"/>
+        </pc:sldMkLst>
+        <pc:picChg chg="mod">
+          <ac:chgData name="Gitzendanner, Matt" userId="b4bd9a28-947d-4019-a646-080a1de8474c" providerId="ADAL" clId="{29AF0007-F919-4A0F-89FE-B26226E3B811}" dt="2023-09-05T17:27:50.122" v="320" actId="962"/>
+          <ac:picMkLst>
+            <pc:docMk/>
+            <pc:sldMk cId="2933933768" sldId="339"/>
+            <ac:picMk id="3" creationId="{75F00E85-81DC-B82D-31A0-293ED8BA4ADD}"/>
+          </ac:picMkLst>
+        </pc:picChg>
+        <pc:picChg chg="add del mod">
+          <ac:chgData name="Gitzendanner, Matt" userId="b4bd9a28-947d-4019-a646-080a1de8474c" providerId="ADAL" clId="{29AF0007-F919-4A0F-89FE-B26226E3B811}" dt="2023-09-05T17:22:36.120" v="34"/>
+          <ac:picMkLst>
+            <pc:docMk/>
+            <pc:sldMk cId="2933933768" sldId="339"/>
+            <ac:picMk id="5" creationId="{3BCB9DCA-453E-92E4-CBA9-76F8CDED479B}"/>
+          </ac:picMkLst>
+        </pc:picChg>
+        <pc:picChg chg="mod">
+          <ac:chgData name="Gitzendanner, Matt" userId="b4bd9a28-947d-4019-a646-080a1de8474c" providerId="ADAL" clId="{29AF0007-F919-4A0F-89FE-B26226E3B811}" dt="2023-09-05T17:27:44.196" v="290" actId="962"/>
+          <ac:picMkLst>
+            <pc:docMk/>
+            <pc:sldMk cId="2933933768" sldId="339"/>
+            <ac:picMk id="1026" creationId="{3723C6B1-ABA5-663E-4CCE-F7DFCC646272}"/>
           </ac:picMkLst>
         </pc:picChg>
       </pc:sldChg>
@@ -973,6 +1157,123 @@
     </pc:docChg>
   </pc:docChgLst>
   <pc:docChgLst>
+    <pc:chgData name="Haskell,Allyson A" userId="f01f6c31-ef41-49db-8aa6-74fdc01fc293" providerId="ADAL" clId="{48411A0E-4CF5-41C5-8C8E-C56A4C22DFF4}"/>
+    <pc:docChg chg="modSld">
+      <pc:chgData name="Haskell,Allyson A" userId="f01f6c31-ef41-49db-8aa6-74fdc01fc293" providerId="ADAL" clId="{48411A0E-4CF5-41C5-8C8E-C56A4C22DFF4}" dt="2023-09-05T19:21:29.701" v="90" actId="962"/>
+      <pc:docMkLst>
+        <pc:docMk/>
+      </pc:docMkLst>
+      <pc:sldChg chg="addSp modSp mod">
+        <pc:chgData name="Haskell,Allyson A" userId="f01f6c31-ef41-49db-8aa6-74fdc01fc293" providerId="ADAL" clId="{48411A0E-4CF5-41C5-8C8E-C56A4C22DFF4}" dt="2023-09-05T19:20:19.574" v="72" actId="962"/>
+        <pc:sldMkLst>
+          <pc:docMk/>
+          <pc:sldMk cId="4229412751" sldId="324"/>
+        </pc:sldMkLst>
+        <pc:spChg chg="mod">
+          <ac:chgData name="Haskell,Allyson A" userId="f01f6c31-ef41-49db-8aa6-74fdc01fc293" providerId="ADAL" clId="{48411A0E-4CF5-41C5-8C8E-C56A4C22DFF4}" dt="2023-09-05T19:20:19.574" v="72" actId="962"/>
+          <ac:spMkLst>
+            <pc:docMk/>
+            <pc:sldMk cId="4229412751" sldId="324"/>
+            <ac:spMk id="3" creationId="{098BC2D2-CCF7-4C63-8489-B46BF394FCA2}"/>
+          </ac:spMkLst>
+        </pc:spChg>
+        <pc:spChg chg="add mod">
+          <ac:chgData name="Haskell,Allyson A" userId="f01f6c31-ef41-49db-8aa6-74fdc01fc293" providerId="ADAL" clId="{48411A0E-4CF5-41C5-8C8E-C56A4C22DFF4}" dt="2023-09-05T19:20:13.460" v="71" actId="13244"/>
+          <ac:spMkLst>
+            <pc:docMk/>
+            <pc:sldMk cId="4229412751" sldId="324"/>
+            <ac:spMk id="4" creationId="{2D0D5C11-0DF5-486F-9F72-D98170B4FB97}"/>
+          </ac:spMkLst>
+        </pc:spChg>
+      </pc:sldChg>
+      <pc:sldChg chg="addSp modSp mod">
+        <pc:chgData name="Haskell,Allyson A" userId="f01f6c31-ef41-49db-8aa6-74fdc01fc293" providerId="ADAL" clId="{48411A0E-4CF5-41C5-8C8E-C56A4C22DFF4}" dt="2023-09-05T19:21:13.140" v="87" actId="962"/>
+        <pc:sldMkLst>
+          <pc:docMk/>
+          <pc:sldMk cId="392144026" sldId="337"/>
+        </pc:sldMkLst>
+        <pc:spChg chg="add mod">
+          <ac:chgData name="Haskell,Allyson A" userId="f01f6c31-ef41-49db-8aa6-74fdc01fc293" providerId="ADAL" clId="{48411A0E-4CF5-41C5-8C8E-C56A4C22DFF4}" dt="2023-09-05T19:21:08.594" v="86" actId="13244"/>
+          <ac:spMkLst>
+            <pc:docMk/>
+            <pc:sldMk cId="392144026" sldId="337"/>
+            <ac:spMk id="3" creationId="{AD48ED86-B563-4FF0-8FCB-1C78EE3B50FC}"/>
+          </ac:spMkLst>
+        </pc:spChg>
+        <pc:picChg chg="mod">
+          <ac:chgData name="Haskell,Allyson A" userId="f01f6c31-ef41-49db-8aa6-74fdc01fc293" providerId="ADAL" clId="{48411A0E-4CF5-41C5-8C8E-C56A4C22DFF4}" dt="2023-09-05T19:21:13.140" v="87" actId="962"/>
+          <ac:picMkLst>
+            <pc:docMk/>
+            <pc:sldMk cId="392144026" sldId="337"/>
+            <ac:picMk id="1026" creationId="{3723C6B1-ABA5-663E-4CCE-F7DFCC646272}"/>
+          </ac:picMkLst>
+        </pc:picChg>
+      </pc:sldChg>
+      <pc:sldChg chg="addSp modSp mod">
+        <pc:chgData name="Haskell,Allyson A" userId="f01f6c31-ef41-49db-8aa6-74fdc01fc293" providerId="ADAL" clId="{48411A0E-4CF5-41C5-8C8E-C56A4C22DFF4}" dt="2023-09-05T19:21:00.402" v="85" actId="20577"/>
+        <pc:sldMkLst>
+          <pc:docMk/>
+          <pc:sldMk cId="3385506350" sldId="338"/>
+        </pc:sldMkLst>
+        <pc:spChg chg="add mod">
+          <ac:chgData name="Haskell,Allyson A" userId="f01f6c31-ef41-49db-8aa6-74fdc01fc293" providerId="ADAL" clId="{48411A0E-4CF5-41C5-8C8E-C56A4C22DFF4}" dt="2023-09-05T19:21:00.402" v="85" actId="20577"/>
+          <ac:spMkLst>
+            <pc:docMk/>
+            <pc:sldMk cId="3385506350" sldId="338"/>
+            <ac:spMk id="5" creationId="{B43ACC0D-07F9-4942-A66C-AC76F2E16EE6}"/>
+          </ac:spMkLst>
+        </pc:spChg>
+        <pc:picChg chg="mod">
+          <ac:chgData name="Haskell,Allyson A" userId="f01f6c31-ef41-49db-8aa6-74fdc01fc293" providerId="ADAL" clId="{48411A0E-4CF5-41C5-8C8E-C56A4C22DFF4}" dt="2023-09-05T19:20:41.177" v="74" actId="13244"/>
+          <ac:picMkLst>
+            <pc:docMk/>
+            <pc:sldMk cId="3385506350" sldId="338"/>
+            <ac:picMk id="2" creationId="{E87BC2EE-676C-78A6-6452-B7171DA5AE94}"/>
+          </ac:picMkLst>
+        </pc:picChg>
+        <pc:picChg chg="mod">
+          <ac:chgData name="Haskell,Allyson A" userId="f01f6c31-ef41-49db-8aa6-74fdc01fc293" providerId="ADAL" clId="{48411A0E-4CF5-41C5-8C8E-C56A4C22DFF4}" dt="2023-09-05T19:20:46.791" v="75" actId="13244"/>
+          <ac:picMkLst>
+            <pc:docMk/>
+            <pc:sldMk cId="3385506350" sldId="338"/>
+            <ac:picMk id="3" creationId="{FBF248DE-3F48-2FCD-D5B4-81F7CA1E67D3}"/>
+          </ac:picMkLst>
+        </pc:picChg>
+      </pc:sldChg>
+      <pc:sldChg chg="addSp modSp mod">
+        <pc:chgData name="Haskell,Allyson A" userId="f01f6c31-ef41-49db-8aa6-74fdc01fc293" providerId="ADAL" clId="{48411A0E-4CF5-41C5-8C8E-C56A4C22DFF4}" dt="2023-09-05T19:21:29.701" v="90" actId="962"/>
+        <pc:sldMkLst>
+          <pc:docMk/>
+          <pc:sldMk cId="2933933768" sldId="339"/>
+        </pc:sldMkLst>
+        <pc:spChg chg="add mod">
+          <ac:chgData name="Haskell,Allyson A" userId="f01f6c31-ef41-49db-8aa6-74fdc01fc293" providerId="ADAL" clId="{48411A0E-4CF5-41C5-8C8E-C56A4C22DFF4}" dt="2023-09-05T19:21:24.851" v="88" actId="13244"/>
+          <ac:spMkLst>
+            <pc:docMk/>
+            <pc:sldMk cId="2933933768" sldId="339"/>
+            <ac:spMk id="4" creationId="{3E24E32D-2BAD-4804-B513-11E4618F0D02}"/>
+          </ac:spMkLst>
+        </pc:spChg>
+        <pc:picChg chg="mod">
+          <ac:chgData name="Haskell,Allyson A" userId="f01f6c31-ef41-49db-8aa6-74fdc01fc293" providerId="ADAL" clId="{48411A0E-4CF5-41C5-8C8E-C56A4C22DFF4}" dt="2023-09-05T19:21:29.701" v="90" actId="962"/>
+          <ac:picMkLst>
+            <pc:docMk/>
+            <pc:sldMk cId="2933933768" sldId="339"/>
+            <ac:picMk id="3" creationId="{75F00E85-81DC-B82D-31A0-293ED8BA4ADD}"/>
+          </ac:picMkLst>
+        </pc:picChg>
+        <pc:picChg chg="mod">
+          <ac:chgData name="Haskell,Allyson A" userId="f01f6c31-ef41-49db-8aa6-74fdc01fc293" providerId="ADAL" clId="{48411A0E-4CF5-41C5-8C8E-C56A4C22DFF4}" dt="2023-09-05T19:21:28.587" v="89" actId="962"/>
+          <ac:picMkLst>
+            <pc:docMk/>
+            <pc:sldMk cId="2933933768" sldId="339"/>
+            <ac:picMk id="1026" creationId="{3723C6B1-ABA5-663E-4CCE-F7DFCC646272}"/>
+          </ac:picMkLst>
+        </pc:picChg>
+      </pc:sldChg>
+    </pc:docChg>
+  </pc:docChgLst>
+  <pc:docChgLst>
     <pc:chgData name="Maxwell,Daniel" userId="1b6ea79d-60d7-472e-a79a-e3fa9de1dfad" providerId="ADAL" clId="{4CAA5DB9-0338-42D5-A165-E0396B77DCD2}"/>
     <pc:docChg chg="custSel addSld delSld modSld sldOrd">
       <pc:chgData name="Maxwell,Daniel" userId="1b6ea79d-60d7-472e-a79a-e3fa9de1dfad" providerId="ADAL" clId="{4CAA5DB9-0338-42D5-A165-E0396B77DCD2}" dt="2023-03-09T14:50:33.015" v="940"/>
@@ -1158,7 +1459,7 @@
           <a:p>
             <a:fld id="{FD93C9B2-20F6-4DB1-B471-224337D0AC79}" type="datetimeFigureOut">
               <a:rPr lang="en-US" smtClean="0"/>
-              <a:t>7/6/2023</a:t>
+              <a:t>11/1/2023</a:t>
             </a:fld>
             <a:endParaRPr lang="en-US"/>
           </a:p>
@@ -1614,34 +1915,6 @@
           <a:bodyPr/>
           <a:lstStyle/>
           <a:p>
-            <a:pPr marL="0" marR="0" lvl="0" indent="0" algn="l" defTabSz="914400" rtl="0" eaLnBrk="1" fontAlgn="auto" latinLnBrk="0" hangingPunct="1">
-              <a:lnSpc>
-                <a:spcPct val="100000"/>
-              </a:lnSpc>
-              <a:spcBef>
-                <a:spcPts val="0"/>
-              </a:spcBef>
-              <a:spcAft>
-                <a:spcPts val="0"/>
-              </a:spcAft>
-              <a:buClrTx/>
-              <a:buSzTx/>
-              <a:buFontTx/>
-              <a:buNone/>
-              <a:tabLst/>
-              <a:defRPr/>
-            </a:pPr>
-            <a:r>
-              <a:rPr lang="en-US" sz="1800" dirty="0">
-                <a:effectLst/>
-                <a:latin typeface="Calibri" panose="020F0502020204030204" pitchFamily="34" charset="0"/>
-                <a:ea typeface="Calibri" panose="020F0502020204030204" pitchFamily="34" charset="0"/>
-                <a:cs typeface="Times New Roman" panose="02020603050405020304" pitchFamily="18" charset="0"/>
-              </a:rPr>
-              <a:t>So, let’s begin by asking a rather simple question.  Why Python?  Why not learn C++ or a tool like MatLab or SAS?  Well, the answer is that over time Python has become the de-facto language of AI.  In fact, the most important AI frameworks – SciKit-Learn, TensorFlow, and Pytorch – are all Python based.  And though we can’t teach you everything about Python, we hope to provide a foundation so that you can execute your own AI project.</a:t>
-            </a:r>
-          </a:p>
-          <a:p>
             <a:endParaRPr lang="en-US" dirty="0"/>
           </a:p>
         </p:txBody>
@@ -1672,7 +1945,7 @@
     </p:spTree>
     <p:extLst>
       <p:ext uri="{BB962C8B-B14F-4D97-AF65-F5344CB8AC3E}">
-        <p14:creationId xmlns:p14="http://schemas.microsoft.com/office/powerpoint/2010/main" val="1525937164"/>
+        <p14:creationId xmlns:p14="http://schemas.microsoft.com/office/powerpoint/2010/main" val="3959093452"/>
       </p:ext>
     </p:extLst>
   </p:cSld>
@@ -1726,122 +1999,6 @@
           <a:bodyPr/>
           <a:lstStyle/>
           <a:p>
-            <a:pPr marL="0" indent="0" defTabSz="966612">
-              <a:buFontTx/>
-              <a:buNone/>
-              <a:defRPr/>
-            </a:pPr>
-            <a:r>
-              <a:rPr lang="en-US" sz="1200" b="0" dirty="0">
-                <a:solidFill>
-                  <a:srgbClr val="24292F"/>
-                </a:solidFill>
-                <a:effectLst>
-                  <a:outerShdw blurRad="38100" dist="38100" dir="2700000" algn="tl">
-                    <a:srgbClr val="000000">
-                      <a:alpha val="43137"/>
-                    </a:srgbClr>
-                  </a:outerShdw>
-                </a:effectLst>
-                <a:latin typeface="+mn-lt"/>
-                <a:ea typeface="Times New Roman" panose="02020603050405020304" pitchFamily="18" charset="0"/>
-              </a:rPr>
-              <a:t>Now that I’ve talked about </a:t>
-            </a:r>
-            <a:r>
-              <a:rPr lang="en-US" sz="1200" b="1" dirty="0">
-                <a:solidFill>
-                  <a:srgbClr val="24292F"/>
-                </a:solidFill>
-                <a:effectLst>
-                  <a:outerShdw blurRad="38100" dist="38100" dir="2700000" algn="tl">
-                    <a:srgbClr val="000000">
-                      <a:alpha val="43137"/>
-                    </a:srgbClr>
-                  </a:outerShdw>
-                </a:effectLst>
-                <a:latin typeface="+mn-lt"/>
-                <a:ea typeface="Times New Roman" panose="02020603050405020304" pitchFamily="18" charset="0"/>
-              </a:rPr>
-              <a:t>what</a:t>
-            </a:r>
-            <a:r>
-              <a:rPr lang="en-US" sz="1200" b="0" dirty="0">
-                <a:solidFill>
-                  <a:srgbClr val="24292F"/>
-                </a:solidFill>
-                <a:effectLst>
-                  <a:outerShdw blurRad="38100" dist="38100" dir="2700000" algn="tl">
-                    <a:srgbClr val="000000">
-                      <a:alpha val="43137"/>
-                    </a:srgbClr>
-                  </a:outerShdw>
-                </a:effectLst>
-                <a:latin typeface="+mn-lt"/>
-                <a:ea typeface="Times New Roman" panose="02020603050405020304" pitchFamily="18" charset="0"/>
-              </a:rPr>
-              <a:t> you’ll learn in this workshop series, I’d like to take a couple minutes to talk about </a:t>
-            </a:r>
-            <a:r>
-              <a:rPr lang="en-US" sz="1200" b="1" dirty="0">
-                <a:solidFill>
-                  <a:srgbClr val="24292F"/>
-                </a:solidFill>
-                <a:effectLst/>
-                <a:latin typeface="+mn-lt"/>
-                <a:ea typeface="Times New Roman" panose="02020603050405020304" pitchFamily="18" charset="0"/>
-              </a:rPr>
-              <a:t>how</a:t>
-            </a:r>
-            <a:r>
-              <a:rPr lang="en-US" sz="1200" b="0" dirty="0">
-                <a:solidFill>
-                  <a:srgbClr val="24292F"/>
-                </a:solidFill>
-                <a:effectLst>
-                  <a:outerShdw blurRad="38100" dist="38100" dir="2700000" algn="tl">
-                    <a:srgbClr val="000000">
-                      <a:alpha val="43137"/>
-                    </a:srgbClr>
-                  </a:outerShdw>
-                </a:effectLst>
-                <a:latin typeface="+mn-lt"/>
-                <a:ea typeface="Times New Roman" panose="02020603050405020304" pitchFamily="18" charset="0"/>
-              </a:rPr>
-              <a:t> to learn.  Mastering a new skill can be hard.  But the 6 learning strategies I’m going to share with you now will help! </a:t>
-            </a:r>
-          </a:p>
-          <a:p>
-            <a:endParaRPr lang="en-US" dirty="0"/>
-          </a:p>
-          <a:p>
-            <a:pPr marL="0" marR="0" lvl="0" indent="0" algn="l" defTabSz="914400" rtl="0" eaLnBrk="1" fontAlgn="auto" latinLnBrk="0" hangingPunct="1">
-              <a:lnSpc>
-                <a:spcPct val="100000"/>
-              </a:lnSpc>
-              <a:spcBef>
-                <a:spcPts val="0"/>
-              </a:spcBef>
-              <a:spcAft>
-                <a:spcPts val="0"/>
-              </a:spcAft>
-              <a:buClrTx/>
-              <a:buSzTx/>
-              <a:buFontTx/>
-              <a:buNone/>
-              <a:tabLst/>
-              <a:defRPr/>
-            </a:pPr>
-            <a:r>
-              <a:rPr lang="en-US" sz="1200" dirty="0">
-                <a:latin typeface="+mn-lt"/>
-                <a:ea typeface="Calibri" panose="020F0502020204030204" pitchFamily="34" charset="0"/>
-                <a:cs typeface="Times New Roman" panose="02020603050405020304" pitchFamily="18" charset="0"/>
-              </a:rPr>
-              <a:t>[NEXT SLIDE]</a:t>
-            </a:r>
-          </a:p>
-          <a:p>
             <a:endParaRPr lang="en-US" dirty="0"/>
           </a:p>
         </p:txBody>
@@ -1872,7 +2029,7 @@
     </p:spTree>
     <p:extLst>
       <p:ext uri="{BB962C8B-B14F-4D97-AF65-F5344CB8AC3E}">
-        <p14:creationId xmlns:p14="http://schemas.microsoft.com/office/powerpoint/2010/main" val="1746815070"/>
+        <p14:creationId xmlns:p14="http://schemas.microsoft.com/office/powerpoint/2010/main" val="1525937164"/>
       </p:ext>
     </p:extLst>
   </p:cSld>
@@ -1926,91 +2083,6 @@
           <a:bodyPr/>
           <a:lstStyle/>
           <a:p>
-            <a:pPr marL="0" indent="0" defTabSz="966612">
-              <a:buFontTx/>
-              <a:buNone/>
-              <a:defRPr/>
-            </a:pPr>
-            <a:r>
-              <a:rPr lang="en-US" sz="1200" b="1" dirty="0">
-                <a:solidFill>
-                  <a:srgbClr val="24292F"/>
-                </a:solidFill>
-                <a:effectLst>
-                  <a:outerShdw blurRad="38100" dist="38100" dir="2700000" algn="tl">
-                    <a:srgbClr val="000000">
-                      <a:alpha val="43137"/>
-                    </a:srgbClr>
-                  </a:outerShdw>
-                </a:effectLst>
-                <a:latin typeface="+mn-lt"/>
-                <a:ea typeface="Times New Roman" panose="02020603050405020304" pitchFamily="18" charset="0"/>
-              </a:rPr>
-              <a:t>Strategy # 1: Focus</a:t>
-            </a:r>
-          </a:p>
-          <a:p>
-            <a:pPr marL="0" indent="0" defTabSz="966612">
-              <a:buFontTx/>
-              <a:buNone/>
-              <a:defRPr/>
-            </a:pPr>
-            <a:endParaRPr lang="en-US" sz="1200" dirty="0">
-              <a:solidFill>
-                <a:srgbClr val="24292F"/>
-              </a:solidFill>
-              <a:latin typeface="+mn-lt"/>
-              <a:ea typeface="Times New Roman" panose="02020603050405020304" pitchFamily="18" charset="0"/>
-            </a:endParaRPr>
-          </a:p>
-          <a:p>
-            <a:pPr marL="0" indent="0" defTabSz="966612">
-              <a:buFontTx/>
-              <a:buNone/>
-              <a:defRPr/>
-            </a:pPr>
-            <a:r>
-              <a:rPr lang="en-US" sz="1200" dirty="0">
-                <a:solidFill>
-                  <a:srgbClr val="24292F"/>
-                </a:solidFill>
-                <a:latin typeface="+mn-lt"/>
-                <a:ea typeface="Times New Roman" panose="02020603050405020304" pitchFamily="18" charset="0"/>
-              </a:rPr>
-              <a:t>So often, students think they can learn to program while multi-tasking -- posting on Facebook, texting friends or watching TikTok.  If anything, these kinds of activities will slow you down.  Instead, you'll learn Python much faster if you can devote focused time to practice.</a:t>
-            </a:r>
-          </a:p>
-          <a:p>
-            <a:endParaRPr lang="en-US" dirty="0"/>
-          </a:p>
-          <a:p>
-            <a:pPr marL="0" marR="0" lvl="0" indent="0" algn="l" defTabSz="914400" rtl="0" eaLnBrk="1" fontAlgn="auto" latinLnBrk="0" hangingPunct="1">
-              <a:lnSpc>
-                <a:spcPct val="100000"/>
-              </a:lnSpc>
-              <a:spcBef>
-                <a:spcPts val="0"/>
-              </a:spcBef>
-              <a:spcAft>
-                <a:spcPts val="0"/>
-              </a:spcAft>
-              <a:buClrTx/>
-              <a:buSzTx/>
-              <a:buFontTx/>
-              <a:buNone/>
-              <a:tabLst/>
-              <a:defRPr/>
-            </a:pPr>
-            <a:r>
-              <a:rPr lang="en-US" sz="1200" dirty="0">
-                <a:latin typeface="+mn-lt"/>
-                <a:ea typeface="Calibri" panose="020F0502020204030204" pitchFamily="34" charset="0"/>
-                <a:cs typeface="Times New Roman" panose="02020603050405020304" pitchFamily="18" charset="0"/>
-              </a:rPr>
-              <a:t>[NEXT SLIDE]</a:t>
-            </a:r>
-          </a:p>
-          <a:p>
             <a:endParaRPr lang="en-US" dirty="0"/>
           </a:p>
         </p:txBody>
@@ -2041,951 +2113,7 @@
     </p:spTree>
     <p:extLst>
       <p:ext uri="{BB962C8B-B14F-4D97-AF65-F5344CB8AC3E}">
-        <p14:creationId xmlns:p14="http://schemas.microsoft.com/office/powerpoint/2010/main" val="3383801350"/>
-      </p:ext>
-    </p:extLst>
-  </p:cSld>
-  <p:clrMapOvr>
-    <a:masterClrMapping/>
-  </p:clrMapOvr>
-</p:notes>
-</file>
-
-<file path=ppt/notesSlides/notesSlide5.xml><?xml version="1.0" encoding="utf-8"?>
-<p:notes xmlns:a="http://schemas.openxmlformats.org/drawingml/2006/main" xmlns:r="http://schemas.openxmlformats.org/officeDocument/2006/relationships" xmlns:p="http://schemas.openxmlformats.org/presentationml/2006/main">
-  <p:cSld>
-    <p:spTree>
-      <p:nvGrpSpPr>
-        <p:cNvPr id="1" name=""/>
-        <p:cNvGrpSpPr/>
-        <p:nvPr/>
-      </p:nvGrpSpPr>
-      <p:grpSpPr>
-        <a:xfrm>
-          <a:off x="0" y="0"/>
-          <a:ext cx="0" cy="0"/>
-          <a:chOff x="0" y="0"/>
-          <a:chExt cx="0" cy="0"/>
-        </a:xfrm>
-      </p:grpSpPr>
-      <p:sp>
-        <p:nvSpPr>
-          <p:cNvPr id="2" name="Slide Image Placeholder 1"/>
-          <p:cNvSpPr>
-            <a:spLocks noGrp="1" noRot="1" noChangeAspect="1"/>
-          </p:cNvSpPr>
-          <p:nvPr>
-            <p:ph type="sldImg"/>
-          </p:nvPr>
-        </p:nvSpPr>
-        <p:spPr/>
-      </p:sp>
-      <p:sp>
-        <p:nvSpPr>
-          <p:cNvPr id="3" name="Notes Placeholder 2"/>
-          <p:cNvSpPr>
-            <a:spLocks noGrp="1"/>
-          </p:cNvSpPr>
-          <p:nvPr>
-            <p:ph type="body" idx="1"/>
-          </p:nvPr>
-        </p:nvSpPr>
-        <p:spPr/>
-        <p:txBody>
-          <a:bodyPr/>
-          <a:lstStyle/>
-          <a:p>
-            <a:pPr marL="0" indent="0" defTabSz="966612">
-              <a:buFontTx/>
-              <a:buNone/>
-              <a:defRPr/>
-            </a:pPr>
-            <a:r>
-              <a:rPr lang="en-US" sz="1200" b="1" dirty="0">
-                <a:latin typeface="+mn-lt"/>
-                <a:ea typeface="Calibri" panose="020F0502020204030204" pitchFamily="34" charset="0"/>
-                <a:cs typeface="LMRoman12-Bold"/>
-              </a:rPr>
-              <a:t>Strategy # 2: Avoid the “copy and paste” approach to writing code</a:t>
-            </a:r>
-          </a:p>
-          <a:p>
-            <a:pPr marL="0" indent="0" defTabSz="966612">
-              <a:buFontTx/>
-              <a:buNone/>
-              <a:defRPr/>
-            </a:pPr>
-            <a:endParaRPr lang="en-US" sz="1200" b="1" dirty="0">
-              <a:latin typeface="+mn-lt"/>
-              <a:ea typeface="Calibri" panose="020F0502020204030204" pitchFamily="34" charset="0"/>
-              <a:cs typeface="LMRoman10-Regular"/>
-            </a:endParaRPr>
-          </a:p>
-          <a:p>
-            <a:pPr marL="0" indent="0" defTabSz="966612">
-              <a:buFontTx/>
-              <a:buNone/>
-              <a:defRPr/>
-            </a:pPr>
-            <a:r>
-              <a:rPr lang="en-US" sz="1200" dirty="0">
-                <a:latin typeface="+mn-lt"/>
-                <a:ea typeface="Calibri" panose="020F0502020204030204" pitchFamily="34" charset="0"/>
-                <a:cs typeface="LMRoman10-Regular"/>
-              </a:rPr>
-              <a:t>The copy and past approach to writing code may sound like a good idea, but it can impede learning for these two reasons: </a:t>
-            </a:r>
-          </a:p>
-          <a:p>
-            <a:pPr marL="414692" lvl="0" indent="-362480" defTabSz="966612">
-              <a:buFont typeface="+mj-lt"/>
-              <a:buAutoNum type="arabicPeriod"/>
-              <a:defRPr/>
-            </a:pPr>
-            <a:r>
-              <a:rPr lang="en-US" sz="1200" dirty="0">
-                <a:latin typeface="+mn-lt"/>
-                <a:ea typeface="Calibri" panose="020F0502020204030204" pitchFamily="34" charset="0"/>
-                <a:cs typeface="Times New Roman" panose="02020603050405020304" pitchFamily="18" charset="0"/>
-              </a:rPr>
-              <a:t>When you type out a line of code, chances are you’re going to make a typing mistake or two.  And that’s a good thing!  You will learn much faster as you read, understand, and then fix errors.  None of this will happen if you take a copy and paste approach to writing code.</a:t>
-            </a:r>
-          </a:p>
-          <a:p>
-            <a:pPr marL="414692" lvl="0" indent="-362480" defTabSz="966612">
-              <a:buFont typeface="+mj-lt"/>
-              <a:buAutoNum type="arabicPeriod"/>
-              <a:defRPr/>
-            </a:pPr>
-            <a:r>
-              <a:rPr lang="en-US" sz="1200" dirty="0">
-                <a:latin typeface="+mn-lt"/>
-                <a:ea typeface="Calibri" panose="020F0502020204030204" pitchFamily="34" charset="0"/>
-                <a:cs typeface="Times New Roman" panose="02020603050405020304" pitchFamily="18" charset="0"/>
-              </a:rPr>
-              <a:t>When you copy and paste code, you may think you know what you are doing.  When, in fact, you don’t.  In the beginning, you want to avoid the illusion of mastery.</a:t>
-            </a:r>
-            <a:endParaRPr lang="en-US" sz="1200" dirty="0">
-              <a:latin typeface="+mn-lt"/>
-              <a:ea typeface="Calibri" panose="020F0502020204030204" pitchFamily="34" charset="0"/>
-              <a:cs typeface="LMRoman10-Regular"/>
-            </a:endParaRPr>
-          </a:p>
-          <a:p>
-            <a:endParaRPr lang="en-US" dirty="0"/>
-          </a:p>
-          <a:p>
-            <a:pPr marL="0" marR="0" lvl="0" indent="0" algn="l" defTabSz="914400" rtl="0" eaLnBrk="1" fontAlgn="auto" latinLnBrk="0" hangingPunct="1">
-              <a:lnSpc>
-                <a:spcPct val="100000"/>
-              </a:lnSpc>
-              <a:spcBef>
-                <a:spcPts val="0"/>
-              </a:spcBef>
-              <a:spcAft>
-                <a:spcPts val="0"/>
-              </a:spcAft>
-              <a:buClrTx/>
-              <a:buSzTx/>
-              <a:buFontTx/>
-              <a:buNone/>
-              <a:tabLst/>
-              <a:defRPr/>
-            </a:pPr>
-            <a:r>
-              <a:rPr lang="en-US" sz="1200" dirty="0">
-                <a:latin typeface="+mn-lt"/>
-                <a:ea typeface="Calibri" panose="020F0502020204030204" pitchFamily="34" charset="0"/>
-                <a:cs typeface="Times New Roman" panose="02020603050405020304" pitchFamily="18" charset="0"/>
-              </a:rPr>
-              <a:t>[NEXT SLIDE]</a:t>
-            </a:r>
-          </a:p>
-          <a:p>
-            <a:endParaRPr lang="en-US" dirty="0"/>
-          </a:p>
-        </p:txBody>
-      </p:sp>
-      <p:sp>
-        <p:nvSpPr>
-          <p:cNvPr id="4" name="Slide Number Placeholder 3"/>
-          <p:cNvSpPr>
-            <a:spLocks noGrp="1"/>
-          </p:cNvSpPr>
-          <p:nvPr>
-            <p:ph type="sldNum" sz="quarter" idx="5"/>
-          </p:nvPr>
-        </p:nvSpPr>
-        <p:spPr/>
-        <p:txBody>
-          <a:bodyPr/>
-          <a:lstStyle/>
-          <a:p>
-            <a:fld id="{3148858F-F1DB-4027-9C85-CCA6849540DD}" type="slidenum">
-              <a:rPr lang="en-US" smtClean="0"/>
-              <a:t>5</a:t>
-            </a:fld>
-            <a:endParaRPr lang="en-US"/>
-          </a:p>
-        </p:txBody>
-      </p:sp>
-    </p:spTree>
-    <p:extLst>
-      <p:ext uri="{BB962C8B-B14F-4D97-AF65-F5344CB8AC3E}">
-        <p14:creationId xmlns:p14="http://schemas.microsoft.com/office/powerpoint/2010/main" val="1471051518"/>
-      </p:ext>
-    </p:extLst>
-  </p:cSld>
-  <p:clrMapOvr>
-    <a:masterClrMapping/>
-  </p:clrMapOvr>
-</p:notes>
-</file>
-
-<file path=ppt/notesSlides/notesSlide6.xml><?xml version="1.0" encoding="utf-8"?>
-<p:notes xmlns:a="http://schemas.openxmlformats.org/drawingml/2006/main" xmlns:r="http://schemas.openxmlformats.org/officeDocument/2006/relationships" xmlns:p="http://schemas.openxmlformats.org/presentationml/2006/main">
-  <p:cSld>
-    <p:spTree>
-      <p:nvGrpSpPr>
-        <p:cNvPr id="1" name=""/>
-        <p:cNvGrpSpPr/>
-        <p:nvPr/>
-      </p:nvGrpSpPr>
-      <p:grpSpPr>
-        <a:xfrm>
-          <a:off x="0" y="0"/>
-          <a:ext cx="0" cy="0"/>
-          <a:chOff x="0" y="0"/>
-          <a:chExt cx="0" cy="0"/>
-        </a:xfrm>
-      </p:grpSpPr>
-      <p:sp>
-        <p:nvSpPr>
-          <p:cNvPr id="2" name="Slide Image Placeholder 1"/>
-          <p:cNvSpPr>
-            <a:spLocks noGrp="1" noRot="1" noChangeAspect="1"/>
-          </p:cNvSpPr>
-          <p:nvPr>
-            <p:ph type="sldImg"/>
-          </p:nvPr>
-        </p:nvSpPr>
-        <p:spPr/>
-      </p:sp>
-      <p:sp>
-        <p:nvSpPr>
-          <p:cNvPr id="3" name="Notes Placeholder 2"/>
-          <p:cNvSpPr>
-            <a:spLocks noGrp="1"/>
-          </p:cNvSpPr>
-          <p:nvPr>
-            <p:ph type="body" idx="1"/>
-          </p:nvPr>
-        </p:nvSpPr>
-        <p:spPr/>
-        <p:txBody>
-          <a:bodyPr/>
-          <a:lstStyle/>
-          <a:p>
-            <a:pPr marL="0" indent="0" defTabSz="966612">
-              <a:buFont typeface="+mj-lt"/>
-              <a:buNone/>
-              <a:defRPr/>
-            </a:pPr>
-            <a:r>
-              <a:rPr lang="en-US" sz="1200" b="1" dirty="0">
-                <a:latin typeface="+mn-lt"/>
-                <a:ea typeface="Calibri" panose="020F0502020204030204" pitchFamily="34" charset="0"/>
-                <a:cs typeface="LMRoman12-Bold"/>
-              </a:rPr>
-              <a:t>Strategy # 3: Study code block-by-block, line-by-line</a:t>
-            </a:r>
-          </a:p>
-          <a:p>
-            <a:pPr marL="0" indent="0" defTabSz="966612">
-              <a:buFont typeface="+mj-lt"/>
-              <a:buNone/>
-              <a:defRPr/>
-            </a:pPr>
-            <a:endParaRPr lang="en-US" sz="1200" b="1" dirty="0">
-              <a:latin typeface="+mn-lt"/>
-              <a:ea typeface="Calibri" panose="020F0502020204030204" pitchFamily="34" charset="0"/>
-              <a:cs typeface="LMRoman10-Regular"/>
-            </a:endParaRPr>
-          </a:p>
-          <a:p>
-            <a:pPr marL="0" indent="0" defTabSz="966612">
-              <a:buFont typeface="+mj-lt"/>
-              <a:buNone/>
-              <a:defRPr/>
-            </a:pPr>
-            <a:r>
-              <a:rPr lang="en-US" sz="1200" dirty="0">
-                <a:latin typeface="+mn-lt"/>
-                <a:ea typeface="Calibri" panose="020F0502020204030204" pitchFamily="34" charset="0"/>
-                <a:cs typeface="LMRoman10-Regular"/>
-              </a:rPr>
-              <a:t>This means running one block of code at a time.  Do you understand the output?  If things aren’t clear, spend more time with the code.  Consider these </a:t>
-            </a:r>
-            <a:r>
-              <a:rPr lang="en-US" sz="1200" dirty="0">
-                <a:latin typeface="+mn-lt"/>
-                <a:ea typeface="Calibri" panose="020F0502020204030204" pitchFamily="34" charset="0"/>
-                <a:cs typeface="Times New Roman" panose="02020603050405020304" pitchFamily="18" charset="0"/>
-              </a:rPr>
-              <a:t>tips</a:t>
-            </a:r>
-            <a:r>
-              <a:rPr lang="en-US" sz="1200" dirty="0">
-                <a:latin typeface="+mn-lt"/>
-                <a:ea typeface="Calibri" panose="020F0502020204030204" pitchFamily="34" charset="0"/>
-                <a:cs typeface="LMRoman10-Regular"/>
-              </a:rPr>
-              <a:t>:</a:t>
-            </a:r>
-          </a:p>
-          <a:p>
-            <a:pPr marL="414692" lvl="0" indent="-362480" defTabSz="966612">
-              <a:buFont typeface="+mj-lt"/>
-              <a:buAutoNum type="arabicPeriod"/>
-              <a:defRPr/>
-            </a:pPr>
-            <a:r>
-              <a:rPr lang="en-US" sz="1200" dirty="0">
-                <a:latin typeface="+mn-lt"/>
-                <a:ea typeface="Calibri" panose="020F0502020204030204" pitchFamily="34" charset="0"/>
-                <a:cs typeface="LMRoman10-Regular"/>
-              </a:rPr>
-              <a:t>Break a line of code into its components and try to understand the individual pieces.  Sometimes functions are nested within functions.</a:t>
-            </a:r>
-            <a:endParaRPr lang="en-US" sz="1200" dirty="0">
-              <a:latin typeface="+mn-lt"/>
-              <a:ea typeface="Calibri" panose="020F0502020204030204" pitchFamily="34" charset="0"/>
-              <a:cs typeface="Times New Roman" panose="02020603050405020304" pitchFamily="18" charset="0"/>
-            </a:endParaRPr>
-          </a:p>
-          <a:p>
-            <a:pPr marL="414692" lvl="0" indent="-362480" defTabSz="966612">
-              <a:buFont typeface="+mj-lt"/>
-              <a:buAutoNum type="arabicPeriod"/>
-              <a:defRPr/>
-            </a:pPr>
-            <a:r>
-              <a:rPr lang="en-US" sz="1200" dirty="0">
-                <a:latin typeface="+mn-lt"/>
-                <a:ea typeface="Calibri" panose="020F0502020204030204" pitchFamily="34" charset="0"/>
-                <a:cs typeface="LMRoman10-Regular"/>
-              </a:rPr>
-              <a:t>Document, document, document!  Remember: the documentation you write today is for the future you.  That’s the you who’s trying to figure out what this block of code is doing, six months or a year from now.</a:t>
-            </a:r>
-            <a:endParaRPr lang="en-US" sz="1200" dirty="0">
-              <a:latin typeface="+mn-lt"/>
-              <a:ea typeface="Calibri" panose="020F0502020204030204" pitchFamily="34" charset="0"/>
-              <a:cs typeface="Times New Roman" panose="02020603050405020304" pitchFamily="18" charset="0"/>
-            </a:endParaRPr>
-          </a:p>
-          <a:p>
-            <a:pPr marL="414692" lvl="0" indent="-362480" defTabSz="966612">
-              <a:buFont typeface="+mj-lt"/>
-              <a:buAutoNum type="arabicPeriod"/>
-              <a:defRPr/>
-            </a:pPr>
-            <a:r>
-              <a:rPr lang="en-US" sz="1200" dirty="0">
-                <a:latin typeface="+mn-lt"/>
-                <a:ea typeface="Calibri" panose="020F0502020204030204" pitchFamily="34" charset="0"/>
-                <a:cs typeface="LMRoman10-Regular"/>
-              </a:rPr>
-              <a:t>Perform mini experiments.  Simplify the code and then tinker with it to see what happens.</a:t>
-            </a:r>
-            <a:endParaRPr lang="en-US" sz="1200" dirty="0">
-              <a:latin typeface="+mn-lt"/>
-              <a:ea typeface="Calibri" panose="020F0502020204030204" pitchFamily="34" charset="0"/>
-              <a:cs typeface="Times New Roman" panose="02020603050405020304" pitchFamily="18" charset="0"/>
-            </a:endParaRPr>
-          </a:p>
-          <a:p>
-            <a:endParaRPr lang="en-US" dirty="0"/>
-          </a:p>
-          <a:p>
-            <a:pPr marL="0" marR="0" lvl="0" indent="0" algn="l" defTabSz="914400" rtl="0" eaLnBrk="1" fontAlgn="auto" latinLnBrk="0" hangingPunct="1">
-              <a:lnSpc>
-                <a:spcPct val="100000"/>
-              </a:lnSpc>
-              <a:spcBef>
-                <a:spcPts val="0"/>
-              </a:spcBef>
-              <a:spcAft>
-                <a:spcPts val="0"/>
-              </a:spcAft>
-              <a:buClrTx/>
-              <a:buSzTx/>
-              <a:buFontTx/>
-              <a:buNone/>
-              <a:tabLst/>
-              <a:defRPr/>
-            </a:pPr>
-            <a:r>
-              <a:rPr lang="en-US" sz="1200" dirty="0">
-                <a:latin typeface="+mn-lt"/>
-                <a:ea typeface="Calibri" panose="020F0502020204030204" pitchFamily="34" charset="0"/>
-                <a:cs typeface="Times New Roman" panose="02020603050405020304" pitchFamily="18" charset="0"/>
-              </a:rPr>
-              <a:t>[NEXT SLIDE]</a:t>
-            </a:r>
-          </a:p>
-          <a:p>
-            <a:endParaRPr lang="en-US" dirty="0"/>
-          </a:p>
-        </p:txBody>
-      </p:sp>
-      <p:sp>
-        <p:nvSpPr>
-          <p:cNvPr id="4" name="Slide Number Placeholder 3"/>
-          <p:cNvSpPr>
-            <a:spLocks noGrp="1"/>
-          </p:cNvSpPr>
-          <p:nvPr>
-            <p:ph type="sldNum" sz="quarter" idx="5"/>
-          </p:nvPr>
-        </p:nvSpPr>
-        <p:spPr/>
-        <p:txBody>
-          <a:bodyPr/>
-          <a:lstStyle/>
-          <a:p>
-            <a:fld id="{3148858F-F1DB-4027-9C85-CCA6849540DD}" type="slidenum">
-              <a:rPr lang="en-US" smtClean="0"/>
-              <a:t>6</a:t>
-            </a:fld>
-            <a:endParaRPr lang="en-US"/>
-          </a:p>
-        </p:txBody>
-      </p:sp>
-    </p:spTree>
-    <p:extLst>
-      <p:ext uri="{BB962C8B-B14F-4D97-AF65-F5344CB8AC3E}">
-        <p14:creationId xmlns:p14="http://schemas.microsoft.com/office/powerpoint/2010/main" val="2960367804"/>
-      </p:ext>
-    </p:extLst>
-  </p:cSld>
-  <p:clrMapOvr>
-    <a:masterClrMapping/>
-  </p:clrMapOvr>
-</p:notes>
-</file>
-
-<file path=ppt/notesSlides/notesSlide7.xml><?xml version="1.0" encoding="utf-8"?>
-<p:notes xmlns:a="http://schemas.openxmlformats.org/drawingml/2006/main" xmlns:r="http://schemas.openxmlformats.org/officeDocument/2006/relationships" xmlns:p="http://schemas.openxmlformats.org/presentationml/2006/main">
-  <p:cSld>
-    <p:spTree>
-      <p:nvGrpSpPr>
-        <p:cNvPr id="1" name=""/>
-        <p:cNvGrpSpPr/>
-        <p:nvPr/>
-      </p:nvGrpSpPr>
-      <p:grpSpPr>
-        <a:xfrm>
-          <a:off x="0" y="0"/>
-          <a:ext cx="0" cy="0"/>
-          <a:chOff x="0" y="0"/>
-          <a:chExt cx="0" cy="0"/>
-        </a:xfrm>
-      </p:grpSpPr>
-      <p:sp>
-        <p:nvSpPr>
-          <p:cNvPr id="2" name="Slide Image Placeholder 1"/>
-          <p:cNvSpPr>
-            <a:spLocks noGrp="1" noRot="1" noChangeAspect="1"/>
-          </p:cNvSpPr>
-          <p:nvPr>
-            <p:ph type="sldImg"/>
-          </p:nvPr>
-        </p:nvSpPr>
-        <p:spPr/>
-      </p:sp>
-      <p:sp>
-        <p:nvSpPr>
-          <p:cNvPr id="3" name="Notes Placeholder 2"/>
-          <p:cNvSpPr>
-            <a:spLocks noGrp="1"/>
-          </p:cNvSpPr>
-          <p:nvPr>
-            <p:ph type="body" idx="1"/>
-          </p:nvPr>
-        </p:nvSpPr>
-        <p:spPr/>
-        <p:txBody>
-          <a:bodyPr/>
-          <a:lstStyle/>
-          <a:p>
-            <a:pPr marL="0" indent="0" defTabSz="966612">
-              <a:buFont typeface="+mj-lt"/>
-              <a:buNone/>
-              <a:defRPr/>
-            </a:pPr>
-            <a:r>
-              <a:rPr lang="en-US" sz="1200" b="1" dirty="0">
-                <a:latin typeface="+mn-lt"/>
-                <a:ea typeface="Calibri" panose="020F0502020204030204" pitchFamily="34" charset="0"/>
-                <a:cs typeface="LMRoman12-Bold"/>
-              </a:rPr>
-              <a:t>Strategy # 4: Use the internet to find answers</a:t>
-            </a:r>
-          </a:p>
-          <a:p>
-            <a:pPr marL="0" indent="0" defTabSz="966612">
-              <a:buFont typeface="+mj-lt"/>
-              <a:buNone/>
-              <a:defRPr/>
-            </a:pPr>
-            <a:endParaRPr lang="en-US" sz="1200" b="1" dirty="0">
-              <a:latin typeface="+mn-lt"/>
-              <a:ea typeface="Calibri" panose="020F0502020204030204" pitchFamily="34" charset="0"/>
-              <a:cs typeface="LMRoman10-Regular"/>
-            </a:endParaRPr>
-          </a:p>
-          <a:p>
-            <a:pPr marL="0" indent="0" defTabSz="966612">
-              <a:buFont typeface="+mj-lt"/>
-              <a:buNone/>
-              <a:defRPr/>
-            </a:pPr>
-            <a:r>
-              <a:rPr lang="en-US" sz="1200" b="0" dirty="0">
-                <a:latin typeface="+mn-lt"/>
-                <a:ea typeface="Calibri" panose="020F0502020204030204" pitchFamily="34" charset="0"/>
-                <a:cs typeface="LMRoman10-Regular"/>
-              </a:rPr>
-              <a:t>When faced with a strange error, take a minute to search the internet because so</a:t>
-            </a:r>
-            <a:r>
-              <a:rPr lang="en-US" sz="1200" dirty="0">
-                <a:latin typeface="+mn-lt"/>
-                <a:ea typeface="Calibri" panose="020F0502020204030204" pitchFamily="34" charset="0"/>
-                <a:cs typeface="LMRoman10-Regular"/>
-              </a:rPr>
-              <a:t>meone has probably asked (and received useful answers) to the problem you now face</a:t>
-            </a:r>
-            <a:r>
-              <a:rPr lang="en-US" sz="1200" dirty="0">
-                <a:latin typeface="+mn-lt"/>
-                <a:ea typeface="Calibri" panose="020F0502020204030204" pitchFamily="34" charset="0"/>
-                <a:cs typeface="Times New Roman" panose="02020603050405020304" pitchFamily="18" charset="0"/>
-              </a:rPr>
-              <a:t>.  </a:t>
-            </a:r>
-            <a:r>
-              <a:rPr lang="en-US" sz="1200" dirty="0">
-                <a:latin typeface="+mn-lt"/>
-                <a:ea typeface="Calibri" panose="020F0502020204030204" pitchFamily="34" charset="0"/>
-                <a:cs typeface="LMRoman10-Regular"/>
-              </a:rPr>
-              <a:t>Also, I recommend that you bookmark your trusted resources.  Stack Overflow, for example, is the go-to place for technical answers to coding questions.  The site provides support for a wide variety of programming languages, including Python.</a:t>
-            </a:r>
-          </a:p>
-          <a:p>
-            <a:endParaRPr lang="en-US" dirty="0"/>
-          </a:p>
-          <a:p>
-            <a:pPr marL="0" marR="0" lvl="0" indent="0" algn="l" defTabSz="914400" rtl="0" eaLnBrk="1" fontAlgn="auto" latinLnBrk="0" hangingPunct="1">
-              <a:lnSpc>
-                <a:spcPct val="100000"/>
-              </a:lnSpc>
-              <a:spcBef>
-                <a:spcPts val="0"/>
-              </a:spcBef>
-              <a:spcAft>
-                <a:spcPts val="0"/>
-              </a:spcAft>
-              <a:buClrTx/>
-              <a:buSzTx/>
-              <a:buFontTx/>
-              <a:buNone/>
-              <a:tabLst/>
-              <a:defRPr/>
-            </a:pPr>
-            <a:r>
-              <a:rPr lang="en-US" sz="1200" dirty="0">
-                <a:latin typeface="+mn-lt"/>
-                <a:ea typeface="Calibri" panose="020F0502020204030204" pitchFamily="34" charset="0"/>
-                <a:cs typeface="Times New Roman" panose="02020603050405020304" pitchFamily="18" charset="0"/>
-              </a:rPr>
-              <a:t>[NEXT SLIDE]</a:t>
-            </a:r>
-          </a:p>
-          <a:p>
-            <a:endParaRPr lang="en-US" dirty="0"/>
-          </a:p>
-        </p:txBody>
-      </p:sp>
-      <p:sp>
-        <p:nvSpPr>
-          <p:cNvPr id="4" name="Slide Number Placeholder 3"/>
-          <p:cNvSpPr>
-            <a:spLocks noGrp="1"/>
-          </p:cNvSpPr>
-          <p:nvPr>
-            <p:ph type="sldNum" sz="quarter" idx="5"/>
-          </p:nvPr>
-        </p:nvSpPr>
-        <p:spPr/>
-        <p:txBody>
-          <a:bodyPr/>
-          <a:lstStyle/>
-          <a:p>
-            <a:fld id="{3148858F-F1DB-4027-9C85-CCA6849540DD}" type="slidenum">
-              <a:rPr lang="en-US" smtClean="0"/>
-              <a:t>7</a:t>
-            </a:fld>
-            <a:endParaRPr lang="en-US"/>
-          </a:p>
-        </p:txBody>
-      </p:sp>
-    </p:spTree>
-    <p:extLst>
-      <p:ext uri="{BB962C8B-B14F-4D97-AF65-F5344CB8AC3E}">
-        <p14:creationId xmlns:p14="http://schemas.microsoft.com/office/powerpoint/2010/main" val="2405930693"/>
-      </p:ext>
-    </p:extLst>
-  </p:cSld>
-  <p:clrMapOvr>
-    <a:masterClrMapping/>
-  </p:clrMapOvr>
-</p:notes>
-</file>
-
-<file path=ppt/notesSlides/notesSlide8.xml><?xml version="1.0" encoding="utf-8"?>
-<p:notes xmlns:a="http://schemas.openxmlformats.org/drawingml/2006/main" xmlns:r="http://schemas.openxmlformats.org/officeDocument/2006/relationships" xmlns:p="http://schemas.openxmlformats.org/presentationml/2006/main">
-  <p:cSld>
-    <p:spTree>
-      <p:nvGrpSpPr>
-        <p:cNvPr id="1" name=""/>
-        <p:cNvGrpSpPr/>
-        <p:nvPr/>
-      </p:nvGrpSpPr>
-      <p:grpSpPr>
-        <a:xfrm>
-          <a:off x="0" y="0"/>
-          <a:ext cx="0" cy="0"/>
-          <a:chOff x="0" y="0"/>
-          <a:chExt cx="0" cy="0"/>
-        </a:xfrm>
-      </p:grpSpPr>
-      <p:sp>
-        <p:nvSpPr>
-          <p:cNvPr id="2" name="Slide Image Placeholder 1"/>
-          <p:cNvSpPr>
-            <a:spLocks noGrp="1" noRot="1" noChangeAspect="1"/>
-          </p:cNvSpPr>
-          <p:nvPr>
-            <p:ph type="sldImg"/>
-          </p:nvPr>
-        </p:nvSpPr>
-        <p:spPr/>
-      </p:sp>
-      <p:sp>
-        <p:nvSpPr>
-          <p:cNvPr id="3" name="Notes Placeholder 2"/>
-          <p:cNvSpPr>
-            <a:spLocks noGrp="1"/>
-          </p:cNvSpPr>
-          <p:nvPr>
-            <p:ph type="body" idx="1"/>
-          </p:nvPr>
-        </p:nvSpPr>
-        <p:spPr/>
-        <p:txBody>
-          <a:bodyPr/>
-          <a:lstStyle/>
-          <a:p>
-            <a:pPr marL="0" indent="0" defTabSz="966612">
-              <a:buFont typeface="+mj-lt"/>
-              <a:buNone/>
-              <a:defRPr/>
-            </a:pPr>
-            <a:r>
-              <a:rPr lang="en-US" sz="1200" b="1" dirty="0">
-                <a:latin typeface="+mn-lt"/>
-                <a:ea typeface="Calibri" panose="020F0502020204030204" pitchFamily="34" charset="0"/>
-                <a:cs typeface="LMRoman10-Regular"/>
-              </a:rPr>
-              <a:t>Strategy # 5: Ask for Help</a:t>
-            </a:r>
-          </a:p>
-          <a:p>
-            <a:pPr marL="0" indent="0" defTabSz="966612">
-              <a:buFont typeface="+mj-lt"/>
-              <a:buNone/>
-              <a:defRPr/>
-            </a:pPr>
-            <a:endParaRPr lang="en-US" sz="1200" b="1" dirty="0">
-              <a:latin typeface="+mn-lt"/>
-              <a:ea typeface="Calibri" panose="020F0502020204030204" pitchFamily="34" charset="0"/>
-              <a:cs typeface="LMRoman10-Regular"/>
-            </a:endParaRPr>
-          </a:p>
-          <a:p>
-            <a:pPr marL="0" indent="0" defTabSz="966612">
-              <a:buFont typeface="+mj-lt"/>
-              <a:buNone/>
-              <a:defRPr/>
-            </a:pPr>
-            <a:r>
-              <a:rPr lang="en-US" sz="1200" dirty="0">
-                <a:latin typeface="+mn-lt"/>
-                <a:ea typeface="Calibri" panose="020F0502020204030204" pitchFamily="34" charset="0"/>
-                <a:cs typeface="LMRoman10-Regular"/>
-              </a:rPr>
-              <a:t>There’s no shame in asking for help.  We’re all learning.  And some days, I feel like I’m the one who has the most to learn. </a:t>
-            </a:r>
-          </a:p>
-          <a:p>
-            <a:endParaRPr lang="en-US" dirty="0"/>
-          </a:p>
-          <a:p>
-            <a:pPr marL="0" marR="0" lvl="0" indent="0" algn="l" defTabSz="914400" rtl="0" eaLnBrk="1" fontAlgn="auto" latinLnBrk="0" hangingPunct="1">
-              <a:lnSpc>
-                <a:spcPct val="100000"/>
-              </a:lnSpc>
-              <a:spcBef>
-                <a:spcPts val="0"/>
-              </a:spcBef>
-              <a:spcAft>
-                <a:spcPts val="0"/>
-              </a:spcAft>
-              <a:buClrTx/>
-              <a:buSzTx/>
-              <a:buFontTx/>
-              <a:buNone/>
-              <a:tabLst/>
-              <a:defRPr/>
-            </a:pPr>
-            <a:r>
-              <a:rPr lang="en-US" sz="1200" dirty="0">
-                <a:latin typeface="+mn-lt"/>
-                <a:ea typeface="Calibri" panose="020F0502020204030204" pitchFamily="34" charset="0"/>
-                <a:cs typeface="Times New Roman" panose="02020603050405020304" pitchFamily="18" charset="0"/>
-              </a:rPr>
-              <a:t>[NEXT SLIDE]</a:t>
-            </a:r>
-          </a:p>
-          <a:p>
-            <a:endParaRPr lang="en-US" dirty="0"/>
-          </a:p>
-        </p:txBody>
-      </p:sp>
-      <p:sp>
-        <p:nvSpPr>
-          <p:cNvPr id="4" name="Slide Number Placeholder 3"/>
-          <p:cNvSpPr>
-            <a:spLocks noGrp="1"/>
-          </p:cNvSpPr>
-          <p:nvPr>
-            <p:ph type="sldNum" sz="quarter" idx="5"/>
-          </p:nvPr>
-        </p:nvSpPr>
-        <p:spPr/>
-        <p:txBody>
-          <a:bodyPr/>
-          <a:lstStyle/>
-          <a:p>
-            <a:fld id="{3148858F-F1DB-4027-9C85-CCA6849540DD}" type="slidenum">
-              <a:rPr lang="en-US" smtClean="0"/>
-              <a:t>8</a:t>
-            </a:fld>
-            <a:endParaRPr lang="en-US"/>
-          </a:p>
-        </p:txBody>
-      </p:sp>
-    </p:spTree>
-    <p:extLst>
-      <p:ext uri="{BB962C8B-B14F-4D97-AF65-F5344CB8AC3E}">
-        <p14:creationId xmlns:p14="http://schemas.microsoft.com/office/powerpoint/2010/main" val="174214670"/>
-      </p:ext>
-    </p:extLst>
-  </p:cSld>
-  <p:clrMapOvr>
-    <a:masterClrMapping/>
-  </p:clrMapOvr>
-</p:notes>
-</file>
-
-<file path=ppt/notesSlides/notesSlide9.xml><?xml version="1.0" encoding="utf-8"?>
-<p:notes xmlns:a="http://schemas.openxmlformats.org/drawingml/2006/main" xmlns:r="http://schemas.openxmlformats.org/officeDocument/2006/relationships" xmlns:p="http://schemas.openxmlformats.org/presentationml/2006/main">
-  <p:cSld>
-    <p:spTree>
-      <p:nvGrpSpPr>
-        <p:cNvPr id="1" name=""/>
-        <p:cNvGrpSpPr/>
-        <p:nvPr/>
-      </p:nvGrpSpPr>
-      <p:grpSpPr>
-        <a:xfrm>
-          <a:off x="0" y="0"/>
-          <a:ext cx="0" cy="0"/>
-          <a:chOff x="0" y="0"/>
-          <a:chExt cx="0" cy="0"/>
-        </a:xfrm>
-      </p:grpSpPr>
-      <p:sp>
-        <p:nvSpPr>
-          <p:cNvPr id="2" name="Slide Image Placeholder 1"/>
-          <p:cNvSpPr>
-            <a:spLocks noGrp="1" noRot="1" noChangeAspect="1"/>
-          </p:cNvSpPr>
-          <p:nvPr>
-            <p:ph type="sldImg"/>
-          </p:nvPr>
-        </p:nvSpPr>
-        <p:spPr/>
-      </p:sp>
-      <p:sp>
-        <p:nvSpPr>
-          <p:cNvPr id="3" name="Notes Placeholder 2"/>
-          <p:cNvSpPr>
-            <a:spLocks noGrp="1"/>
-          </p:cNvSpPr>
-          <p:nvPr>
-            <p:ph type="body" idx="1"/>
-          </p:nvPr>
-        </p:nvSpPr>
-        <p:spPr/>
-        <p:txBody>
-          <a:bodyPr/>
-          <a:lstStyle/>
-          <a:p>
-            <a:pPr marL="0" indent="0" defTabSz="966612">
-              <a:buFont typeface="+mj-lt"/>
-              <a:buNone/>
-              <a:defRPr/>
-            </a:pPr>
-            <a:r>
-              <a:rPr lang="en-US" sz="1200" b="1" dirty="0">
-                <a:latin typeface="+mn-lt"/>
-                <a:ea typeface="Calibri" panose="020F0502020204030204" pitchFamily="34" charset="0"/>
-                <a:cs typeface="LMRoman12-Bold"/>
-              </a:rPr>
-              <a:t>Strategy # 6: Take your time</a:t>
-            </a:r>
-          </a:p>
-          <a:p>
-            <a:pPr marL="0" indent="0" defTabSz="966612">
-              <a:buFont typeface="+mj-lt"/>
-              <a:buNone/>
-              <a:defRPr/>
-            </a:pPr>
-            <a:endParaRPr lang="en-US" sz="1200" b="1" dirty="0">
-              <a:latin typeface="+mn-lt"/>
-              <a:ea typeface="Calibri" panose="020F0502020204030204" pitchFamily="34" charset="0"/>
-              <a:cs typeface="LMRoman10-Regular"/>
-            </a:endParaRPr>
-          </a:p>
-          <a:p>
-            <a:pPr marL="0" indent="0" defTabSz="966612">
-              <a:buFont typeface="+mj-lt"/>
-              <a:buNone/>
-              <a:defRPr/>
-            </a:pPr>
-            <a:r>
-              <a:rPr lang="en-US" sz="1200" dirty="0">
-                <a:latin typeface="+mn-lt"/>
-                <a:ea typeface="Calibri" panose="020F0502020204030204" pitchFamily="34" charset="0"/>
-                <a:cs typeface="LMRoman10-Regular"/>
-              </a:rPr>
-              <a:t>It takes time to master any subject, including a programming language.  Rome wasn’t built in a day.  So, don’t rush to get things done.  Expect some level of</a:t>
-            </a:r>
-            <a:r>
-              <a:rPr lang="en-US" sz="1200" dirty="0">
-                <a:latin typeface="+mn-lt"/>
-                <a:ea typeface="Calibri" panose="020F0502020204030204" pitchFamily="34" charset="0"/>
-                <a:cs typeface="Times New Roman" panose="02020603050405020304" pitchFamily="18" charset="0"/>
-              </a:rPr>
-              <a:t> </a:t>
-            </a:r>
-            <a:r>
-              <a:rPr lang="en-US" sz="1200" dirty="0">
-                <a:latin typeface="+mn-lt"/>
-                <a:ea typeface="Calibri" panose="020F0502020204030204" pitchFamily="34" charset="0"/>
-                <a:cs typeface="LMRoman10-Regular"/>
-              </a:rPr>
-              <a:t>struggle and frustration.  However, as your skill grows, you’ll be amazed</a:t>
-            </a:r>
-            <a:r>
-              <a:rPr lang="en-US" sz="1200" dirty="0">
-                <a:latin typeface="+mn-lt"/>
-                <a:ea typeface="Calibri" panose="020F0502020204030204" pitchFamily="34" charset="0"/>
-                <a:cs typeface="Times New Roman" panose="02020603050405020304" pitchFamily="18" charset="0"/>
-              </a:rPr>
-              <a:t> at what you can do</a:t>
-            </a:r>
-            <a:r>
-              <a:rPr lang="en-US" sz="1200" dirty="0">
-                <a:latin typeface="+mn-lt"/>
-                <a:ea typeface="Calibri" panose="020F0502020204030204" pitchFamily="34" charset="0"/>
-                <a:cs typeface="LMRoman10-Regular"/>
-              </a:rPr>
-              <a:t>.</a:t>
-            </a:r>
-          </a:p>
-          <a:p>
-            <a:pPr marL="0" indent="0" defTabSz="966612">
-              <a:buFont typeface="+mj-lt"/>
-              <a:buNone/>
-              <a:defRPr/>
-            </a:pPr>
-            <a:endParaRPr lang="en-US" sz="1200" dirty="0">
-              <a:latin typeface="+mn-lt"/>
-              <a:ea typeface="Calibri" panose="020F0502020204030204" pitchFamily="34" charset="0"/>
-              <a:cs typeface="Times New Roman" panose="02020603050405020304" pitchFamily="18" charset="0"/>
-            </a:endParaRPr>
-          </a:p>
-          <a:p>
-            <a:pPr marL="0" indent="0" defTabSz="966612">
-              <a:buFont typeface="+mj-lt"/>
-              <a:buNone/>
-              <a:defRPr/>
-            </a:pPr>
-            <a:r>
-              <a:rPr lang="en-US" sz="1200" dirty="0">
-                <a:latin typeface="+mn-lt"/>
-                <a:ea typeface="Calibri" panose="020F0502020204030204" pitchFamily="34" charset="0"/>
-                <a:cs typeface="Times New Roman" panose="02020603050405020304" pitchFamily="18" charset="0"/>
-              </a:rPr>
-              <a:t>[NEXT SLIDE]</a:t>
-            </a:r>
-          </a:p>
-          <a:p>
-            <a:endParaRPr lang="en-US" dirty="0"/>
-          </a:p>
-        </p:txBody>
-      </p:sp>
-      <p:sp>
-        <p:nvSpPr>
-          <p:cNvPr id="4" name="Slide Number Placeholder 3"/>
-          <p:cNvSpPr>
-            <a:spLocks noGrp="1"/>
-          </p:cNvSpPr>
-          <p:nvPr>
-            <p:ph type="sldNum" sz="quarter" idx="5"/>
-          </p:nvPr>
-        </p:nvSpPr>
-        <p:spPr/>
-        <p:txBody>
-          <a:bodyPr/>
-          <a:lstStyle/>
-          <a:p>
-            <a:fld id="{3148858F-F1DB-4027-9C85-CCA6849540DD}" type="slidenum">
-              <a:rPr lang="en-US" smtClean="0"/>
-              <a:t>9</a:t>
-            </a:fld>
-            <a:endParaRPr lang="en-US"/>
-          </a:p>
-        </p:txBody>
-      </p:sp>
-    </p:spTree>
-    <p:extLst>
-      <p:ext uri="{BB962C8B-B14F-4D97-AF65-F5344CB8AC3E}">
-        <p14:creationId xmlns:p14="http://schemas.microsoft.com/office/powerpoint/2010/main" val="820090273"/>
+        <p14:creationId xmlns:p14="http://schemas.microsoft.com/office/powerpoint/2010/main" val="2150403226"/>
       </p:ext>
     </p:extLst>
   </p:cSld>
@@ -3142,7 +2270,7 @@
           <a:p>
             <a:fld id="{C3F78080-8D0A-4BE8-A5B4-CB115102D524}" type="datetimeFigureOut">
               <a:rPr lang="en-US" smtClean="0"/>
-              <a:t>7/6/2023</a:t>
+              <a:t>11/1/2023</a:t>
             </a:fld>
             <a:endParaRPr lang="en-US"/>
           </a:p>
@@ -3340,7 +2468,7 @@
           <a:p>
             <a:fld id="{C3F78080-8D0A-4BE8-A5B4-CB115102D524}" type="datetimeFigureOut">
               <a:rPr lang="en-US" smtClean="0"/>
-              <a:t>7/6/2023</a:t>
+              <a:t>11/1/2023</a:t>
             </a:fld>
             <a:endParaRPr lang="en-US"/>
           </a:p>
@@ -3548,7 +2676,7 @@
           <a:p>
             <a:fld id="{C3F78080-8D0A-4BE8-A5B4-CB115102D524}" type="datetimeFigureOut">
               <a:rPr lang="en-US" smtClean="0"/>
-              <a:t>7/6/2023</a:t>
+              <a:t>11/1/2023</a:t>
             </a:fld>
             <a:endParaRPr lang="en-US"/>
           </a:p>
@@ -3746,7 +2874,7 @@
           <a:p>
             <a:fld id="{C3F78080-8D0A-4BE8-A5B4-CB115102D524}" type="datetimeFigureOut">
               <a:rPr lang="en-US" smtClean="0"/>
-              <a:t>7/6/2023</a:t>
+              <a:t>11/1/2023</a:t>
             </a:fld>
             <a:endParaRPr lang="en-US"/>
           </a:p>
@@ -4021,7 +3149,7 @@
           <a:p>
             <a:fld id="{C3F78080-8D0A-4BE8-A5B4-CB115102D524}" type="datetimeFigureOut">
               <a:rPr lang="en-US" smtClean="0"/>
-              <a:t>7/6/2023</a:t>
+              <a:t>11/1/2023</a:t>
             </a:fld>
             <a:endParaRPr lang="en-US"/>
           </a:p>
@@ -4286,7 +3414,7 @@
           <a:p>
             <a:fld id="{C3F78080-8D0A-4BE8-A5B4-CB115102D524}" type="datetimeFigureOut">
               <a:rPr lang="en-US" smtClean="0"/>
-              <a:t>7/6/2023</a:t>
+              <a:t>11/1/2023</a:t>
             </a:fld>
             <a:endParaRPr lang="en-US"/>
           </a:p>
@@ -4698,7 +3826,7 @@
           <a:p>
             <a:fld id="{C3F78080-8D0A-4BE8-A5B4-CB115102D524}" type="datetimeFigureOut">
               <a:rPr lang="en-US" smtClean="0"/>
-              <a:t>7/6/2023</a:t>
+              <a:t>11/1/2023</a:t>
             </a:fld>
             <a:endParaRPr lang="en-US"/>
           </a:p>
@@ -4839,7 +3967,7 @@
           <a:p>
             <a:fld id="{C3F78080-8D0A-4BE8-A5B4-CB115102D524}" type="datetimeFigureOut">
               <a:rPr lang="en-US" smtClean="0"/>
-              <a:t>7/6/2023</a:t>
+              <a:t>11/1/2023</a:t>
             </a:fld>
             <a:endParaRPr lang="en-US"/>
           </a:p>
@@ -4952,7 +4080,7 @@
           <a:p>
             <a:fld id="{C3F78080-8D0A-4BE8-A5B4-CB115102D524}" type="datetimeFigureOut">
               <a:rPr lang="en-US" smtClean="0"/>
-              <a:t>7/6/2023</a:t>
+              <a:t>11/1/2023</a:t>
             </a:fld>
             <a:endParaRPr lang="en-US"/>
           </a:p>
@@ -5263,7 +4391,7 @@
           <a:p>
             <a:fld id="{C3F78080-8D0A-4BE8-A5B4-CB115102D524}" type="datetimeFigureOut">
               <a:rPr lang="en-US" smtClean="0"/>
-              <a:t>7/6/2023</a:t>
+              <a:t>11/1/2023</a:t>
             </a:fld>
             <a:endParaRPr lang="en-US"/>
           </a:p>
@@ -5551,7 +4679,7 @@
           <a:p>
             <a:fld id="{C3F78080-8D0A-4BE8-A5B4-CB115102D524}" type="datetimeFigureOut">
               <a:rPr lang="en-US" smtClean="0"/>
-              <a:t>7/6/2023</a:t>
+              <a:t>11/1/2023</a:t>
             </a:fld>
             <a:endParaRPr lang="en-US"/>
           </a:p>
@@ -5792,7 +4920,7 @@
           <a:p>
             <a:fld id="{C3F78080-8D0A-4BE8-A5B4-CB115102D524}" type="datetimeFigureOut">
               <a:rPr lang="en-US" smtClean="0"/>
-              <a:t>7/6/2023</a:t>
+              <a:t>11/1/2023</a:t>
             </a:fld>
             <a:endParaRPr lang="en-US"/>
           </a:p>
@@ -6211,13 +5339,48 @@
       </p:grpSpPr>
       <p:sp>
         <p:nvSpPr>
+          <p:cNvPr id="4" name="Title 3">
+            <a:extLst>
+              <a:ext uri="{FF2B5EF4-FFF2-40B4-BE49-F238E27FC236}">
+                <a16:creationId xmlns:a16="http://schemas.microsoft.com/office/drawing/2014/main" id="{2D0D5C11-0DF5-486F-9F72-D98170B4FB97}"/>
+              </a:ext>
+            </a:extLst>
+          </p:cNvPr>
+          <p:cNvSpPr>
+            <a:spLocks noGrp="1"/>
+          </p:cNvSpPr>
+          <p:nvPr>
+            <p:ph type="title"/>
+          </p:nvPr>
+        </p:nvSpPr>
+        <p:spPr>
+          <a:xfrm>
+            <a:off x="831850" y="-2852738"/>
+            <a:ext cx="10515600" cy="2852738"/>
+          </a:xfrm>
+        </p:spPr>
+        <p:txBody>
+          <a:bodyPr vert="horz" lIns="91440" tIns="45720" rIns="91440" bIns="45720" rtlCol="0" anchor="b">
+            <a:normAutofit/>
+          </a:bodyPr>
+          <a:lstStyle/>
+          <a:p>
+            <a:r>
+              <a:rPr lang="en-US" dirty="0"/>
+              <a:t>Python for AI</a:t>
+            </a:r>
+          </a:p>
+        </p:txBody>
+      </p:sp>
+      <p:sp>
+        <p:nvSpPr>
           <p:cNvPr id="3" name="Text Placeholder 2">
             <a:extLst>
               <a:ext uri="{FF2B5EF4-FFF2-40B4-BE49-F238E27FC236}">
                 <a16:creationId xmlns:a16="http://schemas.microsoft.com/office/drawing/2014/main" id="{098BC2D2-CCF7-4C63-8489-B46BF394FCA2}"/>
               </a:ext>
               <a:ext uri="{C183D7F6-B498-43B3-948B-1728B52AA6E4}">
-                <adec:decorative xmlns:adec="http://schemas.microsoft.com/office/drawing/2017/decorative" val="0"/>
+                <adec:decorative xmlns:adec="http://schemas.microsoft.com/office/drawing/2017/decorative" val="1"/>
               </a:ext>
             </a:extLst>
           </p:cNvPr>
@@ -6359,6 +5522,14 @@
 <file path=ppt/slides/slide2.xml><?xml version="1.0" encoding="utf-8"?>
 <p:sld xmlns:a="http://schemas.openxmlformats.org/drawingml/2006/main" xmlns:r="http://schemas.openxmlformats.org/officeDocument/2006/relationships" xmlns:p="http://schemas.openxmlformats.org/presentationml/2006/main">
   <p:cSld>
+    <p:bg>
+      <p:bgPr>
+        <a:solidFill>
+          <a:schemeClr val="bg1"/>
+        </a:solidFill>
+        <a:effectLst/>
+      </p:bgPr>
+    </p:bg>
     <p:spTree>
       <p:nvGrpSpPr>
         <p:cNvPr id="1" name=""/>
@@ -6373,12 +5544,94 @@
           <a:chExt cx="0" cy="0"/>
         </a:xfrm>
       </p:grpSpPr>
+      <p:sp>
+        <p:nvSpPr>
+          <p:cNvPr id="5" name="Title 4">
+            <a:extLst>
+              <a:ext uri="{FF2B5EF4-FFF2-40B4-BE49-F238E27FC236}">
+                <a16:creationId xmlns:a16="http://schemas.microsoft.com/office/drawing/2014/main" id="{B43ACC0D-07F9-4942-A66C-AC76F2E16EE6}"/>
+              </a:ext>
+            </a:extLst>
+          </p:cNvPr>
+          <p:cNvSpPr>
+            <a:spLocks noGrp="1"/>
+          </p:cNvSpPr>
+          <p:nvPr>
+            <p:ph type="title" idx="4294967295"/>
+          </p:nvPr>
+        </p:nvSpPr>
+        <p:spPr>
+          <a:xfrm>
+            <a:off x="838200" y="-1325563"/>
+            <a:ext cx="10515600" cy="1325563"/>
+          </a:xfrm>
+        </p:spPr>
+        <p:txBody>
+          <a:bodyPr vert="horz" lIns="91440" tIns="45720" rIns="91440" bIns="45720" rtlCol="0" anchor="b">
+            <a:normAutofit/>
+          </a:bodyPr>
+          <a:lstStyle/>
+          <a:p>
+            <a:r>
+              <a:rPr lang="en-US" dirty="0"/>
+              <a:t>Git, Git Hub, and </a:t>
+            </a:r>
+            <a:r>
+              <a:rPr lang="en-US" dirty="0" err="1"/>
+              <a:t>Jupyter</a:t>
+            </a:r>
+            <a:endParaRPr lang="en-US" dirty="0"/>
+          </a:p>
+        </p:txBody>
+      </p:sp>
       <p:pic>
         <p:nvPicPr>
-          <p:cNvPr id="1026" name="Picture 2">
-            <a:extLst>
-              <a:ext uri="{FF2B5EF4-FFF2-40B4-BE49-F238E27FC236}">
-                <a16:creationId xmlns:a16="http://schemas.microsoft.com/office/drawing/2014/main" id="{3723C6B1-ABA5-663E-4CCE-F7DFCC646272}"/>
+          <p:cNvPr id="2" name="Graphic 1" descr="The git logo">
+            <a:extLst>
+              <a:ext uri="{FF2B5EF4-FFF2-40B4-BE49-F238E27FC236}">
+                <a16:creationId xmlns:a16="http://schemas.microsoft.com/office/drawing/2014/main" id="{E87BC2EE-676C-78A6-6452-B7171DA5AE94}"/>
+              </a:ext>
+              <a:ext uri="{C183D7F6-B498-43B3-948B-1728B52AA6E4}">
+                <adec:decorative xmlns:adec="http://schemas.microsoft.com/office/drawing/2017/decorative" val="0"/>
+              </a:ext>
+            </a:extLst>
+          </p:cNvPr>
+          <p:cNvPicPr>
+            <a:picLocks noChangeAspect="1"/>
+          </p:cNvPicPr>
+          <p:nvPr/>
+        </p:nvPicPr>
+        <p:blipFill>
+          <a:blip r:embed="rId3">
+            <a:extLst>
+              <a:ext uri="{96DAC541-7B7A-43D3-8B79-37D633B846F1}">
+                <asvg:svgBlip xmlns:asvg="http://schemas.microsoft.com/office/drawing/2016/SVG/main" r:embed="rId4"/>
+              </a:ext>
+            </a:extLst>
+          </a:blip>
+          <a:stretch>
+            <a:fillRect/>
+          </a:stretch>
+        </p:blipFill>
+        <p:spPr>
+          <a:xfrm>
+            <a:off x="335281" y="1766994"/>
+            <a:ext cx="3517120" cy="3517120"/>
+          </a:xfrm>
+          <a:prstGeom prst="rect">
+            <a:avLst/>
+          </a:prstGeom>
+        </p:spPr>
+      </p:pic>
+      <p:pic>
+        <p:nvPicPr>
+          <p:cNvPr id="3" name="Picture 4" descr="The GitHub.com logo">
+            <a:extLst>
+              <a:ext uri="{FF2B5EF4-FFF2-40B4-BE49-F238E27FC236}">
+                <a16:creationId xmlns:a16="http://schemas.microsoft.com/office/drawing/2014/main" id="{FBF248DE-3F48-2FCD-D5B4-81F7CA1E67D3}"/>
+              </a:ext>
+              <a:ext uri="{C183D7F6-B498-43B3-948B-1728B52AA6E4}">
+                <adec:decorative xmlns:adec="http://schemas.microsoft.com/office/drawing/2017/decorative" val="0"/>
               </a:ext>
             </a:extLst>
           </p:cNvPr>
@@ -6388,22 +5641,21 @@
           <p:nvPr/>
         </p:nvPicPr>
         <p:blipFill>
-          <a:blip r:embed="rId3">
+          <a:blip r:embed="rId5">
             <a:extLst>
               <a:ext uri="{28A0092B-C50C-407E-A947-70E740481C1C}">
                 <a14:useLocalDpi xmlns:a14="http://schemas.microsoft.com/office/drawing/2010/main" val="0"/>
               </a:ext>
             </a:extLst>
           </a:blip>
-          <a:srcRect/>
           <a:stretch>
             <a:fillRect/>
           </a:stretch>
         </p:blipFill>
         <p:spPr bwMode="auto">
           <a:xfrm>
-            <a:off x="3233736" y="2462212"/>
-            <a:ext cx="5724525" cy="1933575"/>
+            <a:off x="4310676" y="1657254"/>
+            <a:ext cx="3537345" cy="3537345"/>
           </a:xfrm>
           <a:prstGeom prst="rect">
             <a:avLst/>
@@ -6422,13 +5674,13 @@
       </p:pic>
       <p:pic>
         <p:nvPicPr>
-          <p:cNvPr id="2" name="Picture 1">
-            <a:extLst>
-              <a:ext uri="{FF2B5EF4-FFF2-40B4-BE49-F238E27FC236}">
-                <a16:creationId xmlns:a16="http://schemas.microsoft.com/office/drawing/2014/main" id="{C104B480-12AD-24BA-9F36-15E6AF21B510}"/>
+          <p:cNvPr id="4" name="Graphic 3" descr="The Jupyter logo">
+            <a:extLst>
+              <a:ext uri="{FF2B5EF4-FFF2-40B4-BE49-F238E27FC236}">
+                <a16:creationId xmlns:a16="http://schemas.microsoft.com/office/drawing/2014/main" id="{90BA9BEC-A6D4-09EB-A1B3-7F22AD647B8C}"/>
               </a:ext>
               <a:ext uri="{C183D7F6-B498-43B3-948B-1728B52AA6E4}">
-                <adec:decorative xmlns:adec="http://schemas.microsoft.com/office/drawing/2017/decorative" val="1"/>
+                <adec:decorative xmlns:adec="http://schemas.microsoft.com/office/drawing/2017/decorative" val="0"/>
               </a:ext>
             </a:extLst>
           </p:cNvPr>
@@ -6438,10 +5690,10 @@
           <p:nvPr/>
         </p:nvPicPr>
         <p:blipFill>
-          <a:blip r:embed="rId4">
-            <a:extLst>
-              <a:ext uri="{28A0092B-C50C-407E-A947-70E740481C1C}">
-                <a14:useLocalDpi xmlns:a14="http://schemas.microsoft.com/office/drawing/2010/main" val="0"/>
+          <a:blip r:embed="rId6">
+            <a:extLst>
+              <a:ext uri="{96DAC541-7B7A-43D3-8B79-37D633B846F1}">
+                <asvg:svgBlip xmlns:asvg="http://schemas.microsoft.com/office/drawing/2016/SVG/main" r:embed="rId7"/>
               </a:ext>
             </a:extLst>
           </a:blip>
@@ -6451,948 +5703,122 @@
         </p:blipFill>
         <p:spPr>
           <a:xfrm>
-            <a:off x="11378037" y="6045200"/>
-            <a:ext cx="800100" cy="812800"/>
+            <a:off x="8239050" y="1387596"/>
+            <a:ext cx="3517119" cy="4076660"/>
           </a:xfrm>
           <a:prstGeom prst="rect">
             <a:avLst/>
           </a:prstGeom>
         </p:spPr>
       </p:pic>
-    </p:spTree>
-    <p:extLst>
-      <p:ext uri="{BB962C8B-B14F-4D97-AF65-F5344CB8AC3E}">
-        <p14:creationId xmlns:p14="http://schemas.microsoft.com/office/powerpoint/2010/main" val="392144026"/>
-      </p:ext>
-    </p:extLst>
-  </p:cSld>
-  <p:clrMapOvr>
-    <a:masterClrMapping/>
-  </p:clrMapOvr>
-</p:sld>
-</file>
-
-<file path=ppt/slides/slide3.xml><?xml version="1.0" encoding="utf-8"?>
-<p:sld xmlns:a="http://schemas.openxmlformats.org/drawingml/2006/main" xmlns:r="http://schemas.openxmlformats.org/officeDocument/2006/relationships" xmlns:p="http://schemas.openxmlformats.org/presentationml/2006/main">
-  <p:cSld>
-    <p:spTree>
-      <p:nvGrpSpPr>
-        <p:cNvPr id="1" name=""/>
-        <p:cNvGrpSpPr/>
-        <p:nvPr/>
-      </p:nvGrpSpPr>
-      <p:grpSpPr>
-        <a:xfrm>
-          <a:off x="0" y="0"/>
-          <a:ext cx="0" cy="0"/>
-          <a:chOff x="0" y="0"/>
-          <a:chExt cx="0" cy="0"/>
-        </a:xfrm>
-      </p:grpSpPr>
-      <p:sp>
-        <p:nvSpPr>
-          <p:cNvPr id="4" name="TextBox 3">
-            <a:extLst>
-              <a:ext uri="{FF2B5EF4-FFF2-40B4-BE49-F238E27FC236}">
-                <a16:creationId xmlns:a16="http://schemas.microsoft.com/office/drawing/2014/main" id="{15CD17A5-E0E7-8509-589A-E8ACC2BB6A89}"/>
-              </a:ext>
-            </a:extLst>
-          </p:cNvPr>
-          <p:cNvSpPr txBox="1"/>
-          <p:nvPr/>
-        </p:nvSpPr>
+      <p:cxnSp>
+        <p:nvCxnSpPr>
+          <p:cNvPr id="9" name="Straight Connector 8">
+            <a:extLst>
+              <a:ext uri="{FF2B5EF4-FFF2-40B4-BE49-F238E27FC236}">
+                <a16:creationId xmlns:a16="http://schemas.microsoft.com/office/drawing/2014/main" id="{DCD67800-37AC-4E14-89B0-F79DCB3FB86D}"/>
+              </a:ext>
+              <a:ext uri="{C183D7F6-B498-43B3-948B-1728B52AA6E4}">
+                <adec:decorative xmlns:adec="http://schemas.microsoft.com/office/drawing/2017/decorative" val="1"/>
+              </a:ext>
+            </a:extLst>
+          </p:cNvPr>
+          <p:cNvCxnSpPr>
+            <a:cxnSpLocks noGrp="1" noRot="1" noChangeAspect="1" noMove="1" noResize="1" noEditPoints="1" noAdjustHandles="1" noChangeArrowheads="1" noChangeShapeType="1"/>
+          </p:cNvCxnSpPr>
+          <p:nvPr>
+            <p:extLst>
+              <p:ext uri="{386F3935-93C4-4BCD-93E2-E3B085C9AB24}">
+                <p16:designElem xmlns:p16="http://schemas.microsoft.com/office/powerpoint/2015/main" val="1"/>
+              </p:ext>
+            </p:extLst>
+          </p:nvPr>
+        </p:nvCxnSpPr>
         <p:spPr>
           <a:xfrm>
-            <a:off x="1" y="3167390"/>
-            <a:ext cx="12191999" cy="830997"/>
+            <a:off x="4165600" y="1573887"/>
+            <a:ext cx="0" cy="3710227"/>
           </a:xfrm>
-          <a:prstGeom prst="rect">
+          <a:prstGeom prst="line">
             <a:avLst/>
           </a:prstGeom>
-          <a:noFill/>
-        </p:spPr>
-        <p:txBody>
-          <a:bodyPr wrap="square" rtlCol="0">
-            <a:spAutoFit/>
-          </a:bodyPr>
-          <a:lstStyle/>
-          <a:p>
-            <a:pPr algn="ctr"/>
-            <a:r>
-              <a:rPr lang="en-US" sz="4800" dirty="0">
-                <a:solidFill>
-                  <a:schemeClr val="tx1">
-                    <a:lumMod val="75000"/>
-                    <a:lumOff val="25000"/>
-                  </a:schemeClr>
-                </a:solidFill>
-                <a:latin typeface="Avenir" panose="02000503020000020003" pitchFamily="2" charset="0"/>
-              </a:rPr>
-              <a:t>Six Learning Strategies</a:t>
-            </a:r>
-          </a:p>
-        </p:txBody>
-      </p:sp>
-      <p:pic>
-        <p:nvPicPr>
-          <p:cNvPr id="6" name="Picture 5">
-            <a:extLst>
-              <a:ext uri="{FF2B5EF4-FFF2-40B4-BE49-F238E27FC236}">
-                <a16:creationId xmlns:a16="http://schemas.microsoft.com/office/drawing/2014/main" id="{C273985E-561D-5CBB-83CD-3397F7E5BCEA}"/>
-              </a:ext>
-              <a:ext uri="{C183D7F6-B498-43B3-948B-1728B52AA6E4}">
-                <adec:decorative xmlns:adec="http://schemas.microsoft.com/office/drawing/2017/decorative" val="1"/>
-              </a:ext>
-            </a:extLst>
-          </p:cNvPr>
-          <p:cNvPicPr>
-            <a:picLocks noChangeAspect="1"/>
-          </p:cNvPicPr>
-          <p:nvPr/>
-        </p:nvPicPr>
-        <p:blipFill>
-          <a:blip r:embed="rId3">
-            <a:extLst>
-              <a:ext uri="{28A0092B-C50C-407E-A947-70E740481C1C}">
-                <a14:useLocalDpi xmlns:a14="http://schemas.microsoft.com/office/drawing/2010/main" val="0"/>
-              </a:ext>
-            </a:extLst>
-          </a:blip>
-          <a:stretch>
-            <a:fillRect/>
-          </a:stretch>
-        </p:blipFill>
-        <p:spPr>
-          <a:xfrm>
-            <a:off x="11378037" y="6045200"/>
-            <a:ext cx="800100" cy="812800"/>
-          </a:xfrm>
-          <a:prstGeom prst="rect">
-            <a:avLst/>
-          </a:prstGeom>
-        </p:spPr>
-      </p:pic>
-    </p:spTree>
-    <p:extLst>
-      <p:ext uri="{BB962C8B-B14F-4D97-AF65-F5344CB8AC3E}">
-        <p14:creationId xmlns:p14="http://schemas.microsoft.com/office/powerpoint/2010/main" val="3739470341"/>
-      </p:ext>
-    </p:extLst>
-  </p:cSld>
-  <p:clrMapOvr>
-    <a:masterClrMapping/>
-  </p:clrMapOvr>
-  <mc:AlternateContent xmlns:mc="http://schemas.openxmlformats.org/markup-compatibility/2006" xmlns:p14="http://schemas.microsoft.com/office/powerpoint/2010/main">
-    <mc:Choice Requires="p14">
-      <p:transition spd="med" p14:dur="700">
-        <p:fade/>
-      </p:transition>
-    </mc:Choice>
-    <mc:Fallback xmlns="">
-      <p:transition spd="med">
-        <p:fade/>
-      </p:transition>
-    </mc:Fallback>
-  </mc:AlternateContent>
-</p:sld>
-</file>
-
-<file path=ppt/slides/slide4.xml><?xml version="1.0" encoding="utf-8"?>
-<p:sld xmlns:a="http://schemas.openxmlformats.org/drawingml/2006/main" xmlns:r="http://schemas.openxmlformats.org/officeDocument/2006/relationships" xmlns:p="http://schemas.openxmlformats.org/presentationml/2006/main">
-  <p:cSld>
-    <p:spTree>
-      <p:nvGrpSpPr>
-        <p:cNvPr id="1" name=""/>
-        <p:cNvGrpSpPr/>
-        <p:nvPr/>
-      </p:nvGrpSpPr>
-      <p:grpSpPr>
-        <a:xfrm>
-          <a:off x="0" y="0"/>
-          <a:ext cx="0" cy="0"/>
-          <a:chOff x="0" y="0"/>
-          <a:chExt cx="0" cy="0"/>
-        </a:xfrm>
-      </p:grpSpPr>
-      <p:sp>
-        <p:nvSpPr>
-          <p:cNvPr id="4" name="TextBox 3">
-            <a:extLst>
-              <a:ext uri="{FF2B5EF4-FFF2-40B4-BE49-F238E27FC236}">
-                <a16:creationId xmlns:a16="http://schemas.microsoft.com/office/drawing/2014/main" id="{15CD17A5-E0E7-8509-589A-E8ACC2BB6A89}"/>
-              </a:ext>
-            </a:extLst>
-          </p:cNvPr>
-          <p:cNvSpPr txBox="1"/>
-          <p:nvPr/>
-        </p:nvSpPr>
-        <p:spPr>
-          <a:xfrm>
-            <a:off x="1" y="3167390"/>
-            <a:ext cx="12191999" cy="830997"/>
-          </a:xfrm>
-          <a:prstGeom prst="rect">
-            <a:avLst/>
-          </a:prstGeom>
-          <a:noFill/>
-        </p:spPr>
-        <p:txBody>
-          <a:bodyPr wrap="square" rtlCol="0">
-            <a:spAutoFit/>
-          </a:bodyPr>
-          <a:lstStyle/>
-          <a:p>
-            <a:pPr algn="ctr"/>
-            <a:r>
-              <a:rPr lang="en-US" sz="4800" dirty="0">
-                <a:solidFill>
-                  <a:schemeClr val="tx1">
-                    <a:lumMod val="75000"/>
-                    <a:lumOff val="25000"/>
-                  </a:schemeClr>
-                </a:solidFill>
-                <a:latin typeface="Avenir" panose="02000503020000020003" pitchFamily="2" charset="0"/>
-              </a:rPr>
-              <a:t>Focus</a:t>
-            </a:r>
-          </a:p>
-        </p:txBody>
-      </p:sp>
-      <p:sp>
-        <p:nvSpPr>
-          <p:cNvPr id="5" name="Oval 4">
-            <a:extLst>
-              <a:ext uri="{FF2B5EF4-FFF2-40B4-BE49-F238E27FC236}">
-                <a16:creationId xmlns:a16="http://schemas.microsoft.com/office/drawing/2014/main" id="{971634D0-256A-F75D-5B88-DF8561E5F21B}"/>
-              </a:ext>
-            </a:extLst>
-          </p:cNvPr>
-          <p:cNvSpPr/>
-          <p:nvPr/>
-        </p:nvSpPr>
-        <p:spPr>
-          <a:xfrm>
-            <a:off x="838199" y="657726"/>
-            <a:ext cx="1086853" cy="1058779"/>
-          </a:xfrm>
-          <a:prstGeom prst="ellipse">
-            <a:avLst/>
-          </a:prstGeom>
-          <a:solidFill>
-            <a:srgbClr val="6767AF"/>
-          </a:solidFill>
-          <a:ln>
+          <a:ln w="19050">
             <a:solidFill>
-              <a:schemeClr val="tx1">
-                <a:lumMod val="75000"/>
-                <a:lumOff val="25000"/>
-              </a:schemeClr>
+              <a:srgbClr val="7F7F7F"/>
             </a:solidFill>
           </a:ln>
         </p:spPr>
         <p:style>
-          <a:lnRef idx="2">
-            <a:schemeClr val="accent1">
-              <a:shade val="50000"/>
-            </a:schemeClr>
+          <a:lnRef idx="1">
+            <a:schemeClr val="accent1"/>
           </a:lnRef>
-          <a:fillRef idx="1">
+          <a:fillRef idx="0">
             <a:schemeClr val="accent1"/>
           </a:fillRef>
           <a:effectRef idx="0">
             <a:schemeClr val="accent1"/>
           </a:effectRef>
           <a:fontRef idx="minor">
-            <a:schemeClr val="lt1"/>
+            <a:schemeClr val="tx1"/>
           </a:fontRef>
         </p:style>
-        <p:txBody>
-          <a:bodyPr rtlCol="0" anchor="ctr"/>
-          <a:lstStyle/>
-          <a:p>
-            <a:pPr algn="ctr"/>
-            <a:r>
-              <a:rPr lang="en-US" sz="4800" dirty="0">
-                <a:highlight>
-                  <a:srgbClr val="6767AF"/>
-                </a:highlight>
-                <a:latin typeface="Avenir" panose="02000503020000020003"/>
-              </a:rPr>
-              <a:t>1</a:t>
-            </a:r>
-          </a:p>
-        </p:txBody>
-      </p:sp>
-      <p:pic>
-        <p:nvPicPr>
-          <p:cNvPr id="9" name="Picture 8">
-            <a:extLst>
-              <a:ext uri="{FF2B5EF4-FFF2-40B4-BE49-F238E27FC236}">
-                <a16:creationId xmlns:a16="http://schemas.microsoft.com/office/drawing/2014/main" id="{2D8BFBAB-A31A-4376-C1EE-9B5CDDB7E7AC}"/>
+      </p:cxnSp>
+      <p:cxnSp>
+        <p:nvCxnSpPr>
+          <p:cNvPr id="11" name="Straight Connector 10">
+            <a:extLst>
+              <a:ext uri="{FF2B5EF4-FFF2-40B4-BE49-F238E27FC236}">
+                <a16:creationId xmlns:a16="http://schemas.microsoft.com/office/drawing/2014/main" id="{20F1788F-A5AE-4188-8274-F7F2E3833ECD}"/>
               </a:ext>
               <a:ext uri="{C183D7F6-B498-43B3-948B-1728B52AA6E4}">
                 <adec:decorative xmlns:adec="http://schemas.microsoft.com/office/drawing/2017/decorative" val="1"/>
               </a:ext>
             </a:extLst>
           </p:cNvPr>
-          <p:cNvPicPr>
-            <a:picLocks noChangeAspect="1"/>
-          </p:cNvPicPr>
-          <p:nvPr/>
-        </p:nvPicPr>
-        <p:blipFill>
-          <a:blip r:embed="rId3">
-            <a:extLst>
-              <a:ext uri="{28A0092B-C50C-407E-A947-70E740481C1C}">
-                <a14:useLocalDpi xmlns:a14="http://schemas.microsoft.com/office/drawing/2010/main" val="0"/>
-              </a:ext>
-            </a:extLst>
-          </a:blip>
-          <a:stretch>
-            <a:fillRect/>
-          </a:stretch>
-        </p:blipFill>
+          <p:cNvCxnSpPr>
+            <a:cxnSpLocks noGrp="1" noRot="1" noChangeAspect="1" noMove="1" noResize="1" noEditPoints="1" noAdjustHandles="1" noChangeArrowheads="1" noChangeShapeType="1"/>
+          </p:cNvCxnSpPr>
+          <p:nvPr>
+            <p:extLst>
+              <p:ext uri="{386F3935-93C4-4BCD-93E2-E3B085C9AB24}">
+                <p16:designElem xmlns:p16="http://schemas.microsoft.com/office/powerpoint/2015/main" val="1"/>
+              </p:ext>
+            </p:extLst>
+          </p:nvPr>
+        </p:nvCxnSpPr>
         <p:spPr>
           <a:xfrm>
-            <a:off x="11378037" y="6045200"/>
-            <a:ext cx="800100" cy="812800"/>
+            <a:off x="7995920" y="1573887"/>
+            <a:ext cx="0" cy="3710227"/>
           </a:xfrm>
-          <a:prstGeom prst="rect">
+          <a:prstGeom prst="line">
             <a:avLst/>
           </a:prstGeom>
-        </p:spPr>
-      </p:pic>
-    </p:spTree>
-    <p:extLst>
-      <p:ext uri="{BB962C8B-B14F-4D97-AF65-F5344CB8AC3E}">
-        <p14:creationId xmlns:p14="http://schemas.microsoft.com/office/powerpoint/2010/main" val="972631615"/>
-      </p:ext>
-    </p:extLst>
-  </p:cSld>
-  <p:clrMapOvr>
-    <a:masterClrMapping/>
-  </p:clrMapOvr>
-</p:sld>
-</file>
-
-<file path=ppt/slides/slide5.xml><?xml version="1.0" encoding="utf-8"?>
-<p:sld xmlns:a="http://schemas.openxmlformats.org/drawingml/2006/main" xmlns:r="http://schemas.openxmlformats.org/officeDocument/2006/relationships" xmlns:p="http://schemas.openxmlformats.org/presentationml/2006/main">
-  <p:cSld>
-    <p:spTree>
-      <p:nvGrpSpPr>
-        <p:cNvPr id="1" name=""/>
-        <p:cNvGrpSpPr/>
-        <p:nvPr/>
-      </p:nvGrpSpPr>
-      <p:grpSpPr>
-        <a:xfrm>
-          <a:off x="0" y="0"/>
-          <a:ext cx="0" cy="0"/>
-          <a:chOff x="0" y="0"/>
-          <a:chExt cx="0" cy="0"/>
-        </a:xfrm>
-      </p:grpSpPr>
-      <p:sp>
-        <p:nvSpPr>
-          <p:cNvPr id="4" name="TextBox 3">
-            <a:extLst>
-              <a:ext uri="{FF2B5EF4-FFF2-40B4-BE49-F238E27FC236}">
-                <a16:creationId xmlns:a16="http://schemas.microsoft.com/office/drawing/2014/main" id="{15CD17A5-E0E7-8509-589A-E8ACC2BB6A89}"/>
-              </a:ext>
-            </a:extLst>
-          </p:cNvPr>
-          <p:cNvSpPr txBox="1"/>
-          <p:nvPr/>
-        </p:nvSpPr>
-        <p:spPr>
-          <a:xfrm>
-            <a:off x="1" y="3167390"/>
-            <a:ext cx="12191999" cy="830997"/>
-          </a:xfrm>
-          <a:prstGeom prst="rect">
-            <a:avLst/>
-          </a:prstGeom>
-          <a:noFill/>
-        </p:spPr>
-        <p:txBody>
-          <a:bodyPr wrap="square" rtlCol="0">
-            <a:spAutoFit/>
-          </a:bodyPr>
-          <a:lstStyle/>
-          <a:p>
-            <a:pPr algn="ctr"/>
-            <a:r>
-              <a:rPr lang="en-US" sz="4800" dirty="0">
-                <a:solidFill>
-                  <a:schemeClr val="tx1">
-                    <a:lumMod val="75000"/>
-                    <a:lumOff val="25000"/>
-                  </a:schemeClr>
-                </a:solidFill>
-                <a:latin typeface="Avenir" panose="02000503020000020003" pitchFamily="2" charset="0"/>
-              </a:rPr>
-              <a:t>Avoid “Copy and Paste”</a:t>
-            </a:r>
-          </a:p>
-        </p:txBody>
-      </p:sp>
-      <p:sp>
-        <p:nvSpPr>
-          <p:cNvPr id="5" name="Oval 4">
-            <a:extLst>
-              <a:ext uri="{FF2B5EF4-FFF2-40B4-BE49-F238E27FC236}">
-                <a16:creationId xmlns:a16="http://schemas.microsoft.com/office/drawing/2014/main" id="{971634D0-256A-F75D-5B88-DF8561E5F21B}"/>
-              </a:ext>
-            </a:extLst>
-          </p:cNvPr>
-          <p:cNvSpPr/>
-          <p:nvPr/>
-        </p:nvSpPr>
-        <p:spPr>
-          <a:xfrm>
-            <a:off x="838199" y="657726"/>
-            <a:ext cx="1086853" cy="1058779"/>
-          </a:xfrm>
-          <a:prstGeom prst="ellipse">
-            <a:avLst/>
-          </a:prstGeom>
-          <a:solidFill>
-            <a:srgbClr val="6767AF"/>
-          </a:solidFill>
-          <a:ln>
+          <a:ln w="19050">
             <a:solidFill>
-              <a:schemeClr val="tx1">
-                <a:lumMod val="75000"/>
-                <a:lumOff val="25000"/>
-              </a:schemeClr>
+              <a:srgbClr val="7F7F7F"/>
             </a:solidFill>
           </a:ln>
         </p:spPr>
         <p:style>
-          <a:lnRef idx="2">
-            <a:schemeClr val="accent1">
-              <a:shade val="50000"/>
-            </a:schemeClr>
+          <a:lnRef idx="1">
+            <a:schemeClr val="accent1"/>
           </a:lnRef>
-          <a:fillRef idx="1">
+          <a:fillRef idx="0">
             <a:schemeClr val="accent1"/>
           </a:fillRef>
           <a:effectRef idx="0">
             <a:schemeClr val="accent1"/>
           </a:effectRef>
           <a:fontRef idx="minor">
-            <a:schemeClr val="lt1"/>
+            <a:schemeClr val="tx1"/>
           </a:fontRef>
         </p:style>
-        <p:txBody>
-          <a:bodyPr rtlCol="0" anchor="ctr"/>
-          <a:lstStyle/>
-          <a:p>
-            <a:pPr algn="ctr"/>
-            <a:r>
-              <a:rPr lang="en-US" sz="4800" dirty="0">
-                <a:highlight>
-                  <a:srgbClr val="6767AF"/>
-                </a:highlight>
-                <a:latin typeface="Avenir" panose="02000503020000020003"/>
-              </a:rPr>
-              <a:t>2</a:t>
-            </a:r>
-          </a:p>
-        </p:txBody>
-      </p:sp>
-      <p:pic>
-        <p:nvPicPr>
-          <p:cNvPr id="2" name="Picture 1">
-            <a:extLst>
-              <a:ext uri="{FF2B5EF4-FFF2-40B4-BE49-F238E27FC236}">
-                <a16:creationId xmlns:a16="http://schemas.microsoft.com/office/drawing/2014/main" id="{385D7631-0112-C016-5908-346FDA79DEA8}"/>
-              </a:ext>
-              <a:ext uri="{C183D7F6-B498-43B3-948B-1728B52AA6E4}">
-                <adec:decorative xmlns:adec="http://schemas.microsoft.com/office/drawing/2017/decorative" val="1"/>
-              </a:ext>
-            </a:extLst>
-          </p:cNvPr>
-          <p:cNvPicPr>
-            <a:picLocks noChangeAspect="1"/>
-          </p:cNvPicPr>
-          <p:nvPr/>
-        </p:nvPicPr>
-        <p:blipFill>
-          <a:blip r:embed="rId3">
-            <a:extLst>
-              <a:ext uri="{28A0092B-C50C-407E-A947-70E740481C1C}">
-                <a14:useLocalDpi xmlns:a14="http://schemas.microsoft.com/office/drawing/2010/main" val="0"/>
-              </a:ext>
-            </a:extLst>
-          </a:blip>
-          <a:stretch>
-            <a:fillRect/>
-          </a:stretch>
-        </p:blipFill>
-        <p:spPr>
-          <a:xfrm>
-            <a:off x="11378037" y="6045200"/>
-            <a:ext cx="800100" cy="812800"/>
-          </a:xfrm>
-          <a:prstGeom prst="rect">
-            <a:avLst/>
-          </a:prstGeom>
-        </p:spPr>
-      </p:pic>
+      </p:cxnSp>
     </p:spTree>
     <p:extLst>
       <p:ext uri="{BB962C8B-B14F-4D97-AF65-F5344CB8AC3E}">
-        <p14:creationId xmlns:p14="http://schemas.microsoft.com/office/powerpoint/2010/main" val="4257819007"/>
-      </p:ext>
-    </p:extLst>
-  </p:cSld>
-  <p:clrMapOvr>
-    <a:masterClrMapping/>
-  </p:clrMapOvr>
-</p:sld>
-</file>
-
-<file path=ppt/slides/slide6.xml><?xml version="1.0" encoding="utf-8"?>
-<p:sld xmlns:a="http://schemas.openxmlformats.org/drawingml/2006/main" xmlns:r="http://schemas.openxmlformats.org/officeDocument/2006/relationships" xmlns:p="http://schemas.openxmlformats.org/presentationml/2006/main">
-  <p:cSld>
-    <p:spTree>
-      <p:nvGrpSpPr>
-        <p:cNvPr id="1" name=""/>
-        <p:cNvGrpSpPr/>
-        <p:nvPr/>
-      </p:nvGrpSpPr>
-      <p:grpSpPr>
-        <a:xfrm>
-          <a:off x="0" y="0"/>
-          <a:ext cx="0" cy="0"/>
-          <a:chOff x="0" y="0"/>
-          <a:chExt cx="0" cy="0"/>
-        </a:xfrm>
-      </p:grpSpPr>
-      <p:sp>
-        <p:nvSpPr>
-          <p:cNvPr id="4" name="TextBox 3">
-            <a:extLst>
-              <a:ext uri="{FF2B5EF4-FFF2-40B4-BE49-F238E27FC236}">
-                <a16:creationId xmlns:a16="http://schemas.microsoft.com/office/drawing/2014/main" id="{15CD17A5-E0E7-8509-589A-E8ACC2BB6A89}"/>
-              </a:ext>
-            </a:extLst>
-          </p:cNvPr>
-          <p:cNvSpPr txBox="1"/>
-          <p:nvPr/>
-        </p:nvSpPr>
-        <p:spPr>
-          <a:xfrm>
-            <a:off x="1" y="3167390"/>
-            <a:ext cx="12191999" cy="830997"/>
-          </a:xfrm>
-          <a:prstGeom prst="rect">
-            <a:avLst/>
-          </a:prstGeom>
-          <a:noFill/>
-        </p:spPr>
-        <p:txBody>
-          <a:bodyPr wrap="square" rtlCol="0">
-            <a:spAutoFit/>
-          </a:bodyPr>
-          <a:lstStyle/>
-          <a:p>
-            <a:pPr algn="ctr"/>
-            <a:r>
-              <a:rPr lang="en-US" sz="4800" dirty="0">
-                <a:solidFill>
-                  <a:schemeClr val="tx1">
-                    <a:lumMod val="75000"/>
-                    <a:lumOff val="25000"/>
-                  </a:schemeClr>
-                </a:solidFill>
-                <a:latin typeface="Avenir" panose="02000503020000020003" pitchFamily="2" charset="0"/>
-              </a:rPr>
-              <a:t>Study Code Block-by-Block / Line-by-Line</a:t>
-            </a:r>
-          </a:p>
-        </p:txBody>
-      </p:sp>
-      <p:sp>
-        <p:nvSpPr>
-          <p:cNvPr id="5" name="Oval 4">
-            <a:extLst>
-              <a:ext uri="{FF2B5EF4-FFF2-40B4-BE49-F238E27FC236}">
-                <a16:creationId xmlns:a16="http://schemas.microsoft.com/office/drawing/2014/main" id="{971634D0-256A-F75D-5B88-DF8561E5F21B}"/>
-              </a:ext>
-            </a:extLst>
-          </p:cNvPr>
-          <p:cNvSpPr/>
-          <p:nvPr/>
-        </p:nvSpPr>
-        <p:spPr>
-          <a:xfrm>
-            <a:off x="838199" y="657726"/>
-            <a:ext cx="1086853" cy="1058779"/>
-          </a:xfrm>
-          <a:prstGeom prst="ellipse">
-            <a:avLst/>
-          </a:prstGeom>
-          <a:solidFill>
-            <a:srgbClr val="6767AF"/>
-          </a:solidFill>
-          <a:ln>
-            <a:solidFill>
-              <a:schemeClr val="tx1">
-                <a:lumMod val="75000"/>
-                <a:lumOff val="25000"/>
-              </a:schemeClr>
-            </a:solidFill>
-          </a:ln>
-        </p:spPr>
-        <p:style>
-          <a:lnRef idx="2">
-            <a:schemeClr val="accent1">
-              <a:shade val="50000"/>
-            </a:schemeClr>
-          </a:lnRef>
-          <a:fillRef idx="1">
-            <a:schemeClr val="accent1"/>
-          </a:fillRef>
-          <a:effectRef idx="0">
-            <a:schemeClr val="accent1"/>
-          </a:effectRef>
-          <a:fontRef idx="minor">
-            <a:schemeClr val="lt1"/>
-          </a:fontRef>
-        </p:style>
-        <p:txBody>
-          <a:bodyPr rtlCol="0" anchor="ctr"/>
-          <a:lstStyle/>
-          <a:p>
-            <a:pPr algn="ctr"/>
-            <a:r>
-              <a:rPr lang="en-US" sz="4800" dirty="0">
-                <a:highlight>
-                  <a:srgbClr val="6767AF"/>
-                </a:highlight>
-                <a:latin typeface="Avenir" panose="02000503020000020003"/>
-              </a:rPr>
-              <a:t>3</a:t>
-            </a:r>
-          </a:p>
-        </p:txBody>
-      </p:sp>
-      <p:pic>
-        <p:nvPicPr>
-          <p:cNvPr id="2" name="Picture 1">
-            <a:extLst>
-              <a:ext uri="{FF2B5EF4-FFF2-40B4-BE49-F238E27FC236}">
-                <a16:creationId xmlns:a16="http://schemas.microsoft.com/office/drawing/2014/main" id="{A36421E2-C875-FF3B-8221-8C9E414B076D}"/>
-              </a:ext>
-              <a:ext uri="{C183D7F6-B498-43B3-948B-1728B52AA6E4}">
-                <adec:decorative xmlns:adec="http://schemas.microsoft.com/office/drawing/2017/decorative" val="1"/>
-              </a:ext>
-            </a:extLst>
-          </p:cNvPr>
-          <p:cNvPicPr>
-            <a:picLocks noChangeAspect="1"/>
-          </p:cNvPicPr>
-          <p:nvPr/>
-        </p:nvPicPr>
-        <p:blipFill>
-          <a:blip r:embed="rId3">
-            <a:extLst>
-              <a:ext uri="{28A0092B-C50C-407E-A947-70E740481C1C}">
-                <a14:useLocalDpi xmlns:a14="http://schemas.microsoft.com/office/drawing/2010/main" val="0"/>
-              </a:ext>
-            </a:extLst>
-          </a:blip>
-          <a:stretch>
-            <a:fillRect/>
-          </a:stretch>
-        </p:blipFill>
-        <p:spPr>
-          <a:xfrm>
-            <a:off x="11378037" y="6045200"/>
-            <a:ext cx="800100" cy="812800"/>
-          </a:xfrm>
-          <a:prstGeom prst="rect">
-            <a:avLst/>
-          </a:prstGeom>
-        </p:spPr>
-      </p:pic>
-    </p:spTree>
-    <p:extLst>
-      <p:ext uri="{BB962C8B-B14F-4D97-AF65-F5344CB8AC3E}">
-        <p14:creationId xmlns:p14="http://schemas.microsoft.com/office/powerpoint/2010/main" val="2760127036"/>
-      </p:ext>
-    </p:extLst>
-  </p:cSld>
-  <p:clrMapOvr>
-    <a:masterClrMapping/>
-  </p:clrMapOvr>
-</p:sld>
-</file>
-
-<file path=ppt/slides/slide7.xml><?xml version="1.0" encoding="utf-8"?>
-<p:sld xmlns:a="http://schemas.openxmlformats.org/drawingml/2006/main" xmlns:r="http://schemas.openxmlformats.org/officeDocument/2006/relationships" xmlns:p="http://schemas.openxmlformats.org/presentationml/2006/main">
-  <p:cSld>
-    <p:spTree>
-      <p:nvGrpSpPr>
-        <p:cNvPr id="1" name=""/>
-        <p:cNvGrpSpPr/>
-        <p:nvPr/>
-      </p:nvGrpSpPr>
-      <p:grpSpPr>
-        <a:xfrm>
-          <a:off x="0" y="0"/>
-          <a:ext cx="0" cy="0"/>
-          <a:chOff x="0" y="0"/>
-          <a:chExt cx="0" cy="0"/>
-        </a:xfrm>
-      </p:grpSpPr>
-      <p:sp>
-        <p:nvSpPr>
-          <p:cNvPr id="4" name="TextBox 3">
-            <a:extLst>
-              <a:ext uri="{FF2B5EF4-FFF2-40B4-BE49-F238E27FC236}">
-                <a16:creationId xmlns:a16="http://schemas.microsoft.com/office/drawing/2014/main" id="{15CD17A5-E0E7-8509-589A-E8ACC2BB6A89}"/>
-              </a:ext>
-            </a:extLst>
-          </p:cNvPr>
-          <p:cNvSpPr txBox="1"/>
-          <p:nvPr/>
-        </p:nvSpPr>
-        <p:spPr>
-          <a:xfrm>
-            <a:off x="1" y="3167390"/>
-            <a:ext cx="12191999" cy="830997"/>
-          </a:xfrm>
-          <a:prstGeom prst="rect">
-            <a:avLst/>
-          </a:prstGeom>
-          <a:noFill/>
-        </p:spPr>
-        <p:txBody>
-          <a:bodyPr wrap="square" rtlCol="0">
-            <a:spAutoFit/>
-          </a:bodyPr>
-          <a:lstStyle/>
-          <a:p>
-            <a:pPr algn="ctr"/>
-            <a:r>
-              <a:rPr lang="en-US" sz="4800" dirty="0">
-                <a:solidFill>
-                  <a:schemeClr val="tx1">
-                    <a:lumMod val="75000"/>
-                    <a:lumOff val="25000"/>
-                  </a:schemeClr>
-                </a:solidFill>
-                <a:latin typeface="Avenir" panose="02000503020000020003" pitchFamily="2" charset="0"/>
-              </a:rPr>
-              <a:t>Use the Internet to Find Answers </a:t>
-            </a:r>
-          </a:p>
-        </p:txBody>
-      </p:sp>
-      <p:sp>
-        <p:nvSpPr>
-          <p:cNvPr id="5" name="Oval 4">
-            <a:extLst>
-              <a:ext uri="{FF2B5EF4-FFF2-40B4-BE49-F238E27FC236}">
-                <a16:creationId xmlns:a16="http://schemas.microsoft.com/office/drawing/2014/main" id="{971634D0-256A-F75D-5B88-DF8561E5F21B}"/>
-              </a:ext>
-            </a:extLst>
-          </p:cNvPr>
-          <p:cNvSpPr/>
-          <p:nvPr/>
-        </p:nvSpPr>
-        <p:spPr>
-          <a:xfrm>
-            <a:off x="838199" y="657726"/>
-            <a:ext cx="1086853" cy="1058779"/>
-          </a:xfrm>
-          <a:prstGeom prst="ellipse">
-            <a:avLst/>
-          </a:prstGeom>
-          <a:solidFill>
-            <a:srgbClr val="6767AF"/>
-          </a:solidFill>
-          <a:ln>
-            <a:solidFill>
-              <a:schemeClr val="tx1">
-                <a:lumMod val="75000"/>
-                <a:lumOff val="25000"/>
-              </a:schemeClr>
-            </a:solidFill>
-          </a:ln>
-        </p:spPr>
-        <p:style>
-          <a:lnRef idx="2">
-            <a:schemeClr val="accent1">
-              <a:shade val="50000"/>
-            </a:schemeClr>
-          </a:lnRef>
-          <a:fillRef idx="1">
-            <a:schemeClr val="accent1"/>
-          </a:fillRef>
-          <a:effectRef idx="0">
-            <a:schemeClr val="accent1"/>
-          </a:effectRef>
-          <a:fontRef idx="minor">
-            <a:schemeClr val="lt1"/>
-          </a:fontRef>
-        </p:style>
-        <p:txBody>
-          <a:bodyPr rtlCol="0" anchor="ctr"/>
-          <a:lstStyle/>
-          <a:p>
-            <a:pPr algn="ctr"/>
-            <a:r>
-              <a:rPr lang="en-US" sz="4800" dirty="0">
-                <a:highlight>
-                  <a:srgbClr val="6767AF"/>
-                </a:highlight>
-                <a:latin typeface="Avenir" panose="02000503020000020003"/>
-              </a:rPr>
-              <a:t>4</a:t>
-            </a:r>
-          </a:p>
-        </p:txBody>
-      </p:sp>
-      <p:pic>
-        <p:nvPicPr>
-          <p:cNvPr id="2" name="Picture 1">
-            <a:extLst>
-              <a:ext uri="{FF2B5EF4-FFF2-40B4-BE49-F238E27FC236}">
-                <a16:creationId xmlns:a16="http://schemas.microsoft.com/office/drawing/2014/main" id="{1B626444-B7A4-054F-FADB-4C31C82EDB33}"/>
-              </a:ext>
-              <a:ext uri="{C183D7F6-B498-43B3-948B-1728B52AA6E4}">
-                <adec:decorative xmlns:adec="http://schemas.microsoft.com/office/drawing/2017/decorative" val="1"/>
-              </a:ext>
-            </a:extLst>
-          </p:cNvPr>
-          <p:cNvPicPr>
-            <a:picLocks noChangeAspect="1"/>
-          </p:cNvPicPr>
-          <p:nvPr/>
-        </p:nvPicPr>
-        <p:blipFill>
-          <a:blip r:embed="rId3">
-            <a:extLst>
-              <a:ext uri="{28A0092B-C50C-407E-A947-70E740481C1C}">
-                <a14:useLocalDpi xmlns:a14="http://schemas.microsoft.com/office/drawing/2010/main" val="0"/>
-              </a:ext>
-            </a:extLst>
-          </a:blip>
-          <a:stretch>
-            <a:fillRect/>
-          </a:stretch>
-        </p:blipFill>
-        <p:spPr>
-          <a:xfrm>
-            <a:off x="11378037" y="6045200"/>
-            <a:ext cx="800100" cy="812800"/>
-          </a:xfrm>
-          <a:prstGeom prst="rect">
-            <a:avLst/>
-          </a:prstGeom>
-        </p:spPr>
-      </p:pic>
-      <p:grpSp>
-        <p:nvGrpSpPr>
-          <p:cNvPr id="8" name="Group 7">
-            <a:extLst>
-              <a:ext uri="{FF2B5EF4-FFF2-40B4-BE49-F238E27FC236}">
-                <a16:creationId xmlns:a16="http://schemas.microsoft.com/office/drawing/2014/main" id="{933DAE10-7C9E-182C-9026-C2DD3C1FB277}"/>
-              </a:ext>
-            </a:extLst>
-          </p:cNvPr>
-          <p:cNvGrpSpPr/>
-          <p:nvPr/>
-        </p:nvGrpSpPr>
-        <p:grpSpPr>
-          <a:xfrm>
-            <a:off x="4843064" y="3564959"/>
-            <a:ext cx="2649302" cy="2480241"/>
-            <a:chOff x="4843064" y="3564959"/>
-            <a:chExt cx="2649302" cy="2480241"/>
-          </a:xfrm>
-        </p:grpSpPr>
-        <p:pic>
-          <p:nvPicPr>
-            <p:cNvPr id="6" name="Picture 5">
-              <a:extLst>
-                <a:ext uri="{FF2B5EF4-FFF2-40B4-BE49-F238E27FC236}">
-                  <a16:creationId xmlns:a16="http://schemas.microsoft.com/office/drawing/2014/main" id="{CA9D3EE0-B91B-5344-A296-E933F40819E6}"/>
-                </a:ext>
-              </a:extLst>
-            </p:cNvPr>
-            <p:cNvPicPr>
-              <a:picLocks noChangeAspect="1"/>
-            </p:cNvPicPr>
-            <p:nvPr/>
-          </p:nvPicPr>
-          <p:blipFill>
-            <a:blip r:embed="rId4"/>
-            <a:stretch>
-              <a:fillRect/>
-            </a:stretch>
-          </p:blipFill>
-          <p:spPr>
-            <a:xfrm>
-              <a:off x="4843064" y="3998387"/>
-              <a:ext cx="2649302" cy="2046813"/>
-            </a:xfrm>
-            <a:prstGeom prst="rect">
-              <a:avLst/>
-            </a:prstGeom>
-          </p:spPr>
-        </p:pic>
-        <p:sp>
-          <p:nvSpPr>
-            <p:cNvPr id="7" name="TextBox 6">
-              <a:extLst>
-                <a:ext uri="{FF2B5EF4-FFF2-40B4-BE49-F238E27FC236}">
-                  <a16:creationId xmlns:a16="http://schemas.microsoft.com/office/drawing/2014/main" id="{05C6B2CE-55BE-6736-01C9-60239D4F3E5D}"/>
-                </a:ext>
-              </a:extLst>
-            </p:cNvPr>
-            <p:cNvSpPr txBox="1"/>
-            <p:nvPr/>
-          </p:nvSpPr>
-          <p:spPr>
-            <a:xfrm>
-              <a:off x="5841344" y="3564959"/>
-              <a:ext cx="652743" cy="1569660"/>
-            </a:xfrm>
-            <a:prstGeom prst="rect">
-              <a:avLst/>
-            </a:prstGeom>
-            <a:noFill/>
-          </p:spPr>
-          <p:txBody>
-            <a:bodyPr wrap="none" rtlCol="0">
-              <a:spAutoFit/>
-            </a:bodyPr>
-            <a:lstStyle/>
-            <a:p>
-              <a:r>
-                <a:rPr lang="en-US" sz="9600" dirty="0">
-                  <a:solidFill>
-                    <a:schemeClr val="accent6">
-                      <a:lumMod val="75000"/>
-                    </a:schemeClr>
-                  </a:solidFill>
-                  <a:latin typeface="Californian FB" panose="0207040306080B030204" pitchFamily="18" charset="0"/>
-                </a:rPr>
-                <a:t>^</a:t>
-              </a:r>
-            </a:p>
-          </p:txBody>
-        </p:sp>
-      </p:grpSp>
-    </p:spTree>
-    <p:extLst>
-      <p:ext uri="{BB962C8B-B14F-4D97-AF65-F5344CB8AC3E}">
-        <p14:creationId xmlns:p14="http://schemas.microsoft.com/office/powerpoint/2010/main" val="3975799666"/>
+        <p14:creationId xmlns:p14="http://schemas.microsoft.com/office/powerpoint/2010/main" val="3385506350"/>
       </p:ext>
     </p:extLst>
   </p:cSld>
@@ -7423,9 +5849,9 @@
                             </p:stCondLst>
                             <p:childTnLst>
                               <p:par>
-                                <p:cTn id="5" presetID="10" presetClass="entr" presetSubtype="0" fill="hold" nodeType="withEffect">
+                                <p:cTn id="5" presetID="10" presetClass="entr" presetSubtype="0" fill="hold" nodeType="afterEffect">
                                   <p:stCondLst>
-                                    <p:cond delay="2000"/>
+                                    <p:cond delay="0"/>
                                   </p:stCondLst>
                                   <p:childTnLst>
                                     <p:set>
@@ -7436,7 +5862,7 @@
                                           </p:stCondLst>
                                         </p:cTn>
                                         <p:tgtEl>
-                                          <p:spTgt spid="8"/>
+                                          <p:spTgt spid="2"/>
                                         </p:tgtEl>
                                         <p:attrNameLst>
                                           <p:attrName>style.visibility</p:attrName>
@@ -7450,7 +5876,51 @@
                                       <p:cBhvr>
                                         <p:cTn id="7" dur="500"/>
                                         <p:tgtEl>
-                                          <p:spTgt spid="8"/>
+                                          <p:spTgt spid="2"/>
+                                        </p:tgtEl>
+                                      </p:cBhvr>
+                                    </p:animEffect>
+                                  </p:childTnLst>
+                                </p:cTn>
+                              </p:par>
+                            </p:childTnLst>
+                          </p:cTn>
+                        </p:par>
+                        <p:par>
+                          <p:cTn id="8" fill="hold">
+                            <p:stCondLst>
+                              <p:cond delay="500"/>
+                            </p:stCondLst>
+                            <p:childTnLst>
+                              <p:par>
+                                <p:cTn id="9" presetID="10" presetClass="entr" presetSubtype="0" fill="hold" nodeType="afterEffect">
+                                  <p:stCondLst>
+                                    <p:cond delay="0"/>
+                                  </p:stCondLst>
+                                  <p:childTnLst>
+                                    <p:set>
+                                      <p:cBhvr>
+                                        <p:cTn id="10" dur="1" fill="hold">
+                                          <p:stCondLst>
+                                            <p:cond delay="0"/>
+                                          </p:stCondLst>
+                                        </p:cTn>
+                                        <p:tgtEl>
+                                          <p:spTgt spid="4"/>
+                                        </p:tgtEl>
+                                        <p:attrNameLst>
+                                          <p:attrName>style.visibility</p:attrName>
+                                        </p:attrNameLst>
+                                      </p:cBhvr>
+                                      <p:to>
+                                        <p:strVal val="visible"/>
+                                      </p:to>
+                                    </p:set>
+                                    <p:animEffect transition="in" filter="fade">
+                                      <p:cBhvr>
+                                        <p:cTn id="11" dur="500"/>
+                                        <p:tgtEl>
+                                          <p:spTgt spid="4"/>
                                         </p:tgtEl>
                                       </p:cBhvr>
                                     </p:animEffect>
@@ -7488,7 +5958,7 @@
 </p:sld>
 </file>
 
-<file path=ppt/slides/slide8.xml><?xml version="1.0" encoding="utf-8"?>
+<file path=ppt/slides/slide3.xml><?xml version="1.0" encoding="utf-8"?>
 <p:sld xmlns:a="http://schemas.openxmlformats.org/drawingml/2006/main" xmlns:r="http://schemas.openxmlformats.org/officeDocument/2006/relationships" xmlns:p="http://schemas.openxmlformats.org/presentationml/2006/main">
   <p:cSld>
     <p:spTree>
@@ -7507,119 +5977,95 @@
       </p:grpSpPr>
       <p:sp>
         <p:nvSpPr>
-          <p:cNvPr id="4" name="TextBox 3">
-            <a:extLst>
-              <a:ext uri="{FF2B5EF4-FFF2-40B4-BE49-F238E27FC236}">
-                <a16:creationId xmlns:a16="http://schemas.microsoft.com/office/drawing/2014/main" id="{15CD17A5-E0E7-8509-589A-E8ACC2BB6A89}"/>
-              </a:ext>
-            </a:extLst>
-          </p:cNvPr>
-          <p:cNvSpPr txBox="1"/>
-          <p:nvPr/>
+          <p:cNvPr id="3" name="Title 2">
+            <a:extLst>
+              <a:ext uri="{FF2B5EF4-FFF2-40B4-BE49-F238E27FC236}">
+                <a16:creationId xmlns:a16="http://schemas.microsoft.com/office/drawing/2014/main" id="{AD48ED86-B563-4FF0-8FCB-1C78EE3B50FC}"/>
+              </a:ext>
+            </a:extLst>
+          </p:cNvPr>
+          <p:cNvSpPr>
+            <a:spLocks noGrp="1"/>
+          </p:cNvSpPr>
+          <p:nvPr>
+            <p:ph type="title" idx="4294967295"/>
+          </p:nvPr>
         </p:nvSpPr>
         <p:spPr>
           <a:xfrm>
-            <a:off x="1" y="3167390"/>
-            <a:ext cx="12191999" cy="830997"/>
+            <a:off x="838200" y="-1325563"/>
+            <a:ext cx="10515600" cy="1325563"/>
+          </a:xfrm>
+        </p:spPr>
+        <p:txBody>
+          <a:bodyPr vert="horz" lIns="91440" tIns="45720" rIns="91440" bIns="45720" rtlCol="0" anchor="b">
+            <a:normAutofit/>
+          </a:bodyPr>
+          <a:lstStyle/>
+          <a:p>
+            <a:r>
+              <a:rPr lang="en-US" dirty="0"/>
+              <a:t>Python</a:t>
+            </a:r>
+          </a:p>
+        </p:txBody>
+      </p:sp>
+      <p:pic>
+        <p:nvPicPr>
+          <p:cNvPr id="1026" name="Picture 2">
+            <a:extLst>
+              <a:ext uri="{FF2B5EF4-FFF2-40B4-BE49-F238E27FC236}">
+                <a16:creationId xmlns:a16="http://schemas.microsoft.com/office/drawing/2014/main" id="{3723C6B1-ABA5-663E-4CCE-F7DFCC646272}"/>
+              </a:ext>
+              <a:ext uri="{C183D7F6-B498-43B3-948B-1728B52AA6E4}">
+                <adec:decorative xmlns:adec="http://schemas.microsoft.com/office/drawing/2017/decorative" val="1"/>
+              </a:ext>
+            </a:extLst>
+          </p:cNvPr>
+          <p:cNvPicPr>
+            <a:picLocks noChangeAspect="1" noChangeArrowheads="1"/>
+          </p:cNvPicPr>
+          <p:nvPr/>
+        </p:nvPicPr>
+        <p:blipFill>
+          <a:blip r:embed="rId3">
+            <a:extLst>
+              <a:ext uri="{28A0092B-C50C-407E-A947-70E740481C1C}">
+                <a14:useLocalDpi xmlns:a14="http://schemas.microsoft.com/office/drawing/2010/main" val="0"/>
+              </a:ext>
+            </a:extLst>
+          </a:blip>
+          <a:srcRect/>
+          <a:stretch>
+            <a:fillRect/>
+          </a:stretch>
+        </p:blipFill>
+        <p:spPr bwMode="auto">
+          <a:xfrm>
+            <a:off x="3233736" y="2462212"/>
+            <a:ext cx="5724525" cy="1933575"/>
           </a:xfrm>
           <a:prstGeom prst="rect">
             <a:avLst/>
           </a:prstGeom>
           <a:noFill/>
+          <a:extLst>
+            <a:ext uri="{909E8E84-426E-40DD-AFC4-6F175D3DCCD1}">
+              <a14:hiddenFill xmlns:a14="http://schemas.microsoft.com/office/drawing/2010/main">
+                <a:solidFill>
+                  <a:srgbClr val="FFFFFF"/>
+                </a:solidFill>
+              </a14:hiddenFill>
+            </a:ext>
+          </a:extLst>
         </p:spPr>
-        <p:txBody>
-          <a:bodyPr wrap="square" rtlCol="0">
-            <a:spAutoFit/>
-          </a:bodyPr>
-          <a:lstStyle/>
-          <a:p>
-            <a:pPr algn="ctr"/>
-            <a:r>
-              <a:rPr lang="en-US" sz="4800" dirty="0">
-                <a:solidFill>
-                  <a:schemeClr val="tx1">
-                    <a:lumMod val="75000"/>
-                    <a:lumOff val="25000"/>
-                  </a:schemeClr>
-                </a:solidFill>
-                <a:latin typeface="Avenir" panose="02000503020000020003" pitchFamily="2" charset="0"/>
-              </a:rPr>
-              <a:t>Ask for Help</a:t>
-            </a:r>
-          </a:p>
-        </p:txBody>
-      </p:sp>
-      <p:sp>
-        <p:nvSpPr>
-          <p:cNvPr id="5" name="Oval 4">
-            <a:extLst>
-              <a:ext uri="{FF2B5EF4-FFF2-40B4-BE49-F238E27FC236}">
-                <a16:creationId xmlns:a16="http://schemas.microsoft.com/office/drawing/2014/main" id="{971634D0-256A-F75D-5B88-DF8561E5F21B}"/>
-              </a:ext>
-            </a:extLst>
-          </p:cNvPr>
-          <p:cNvSpPr/>
-          <p:nvPr/>
-        </p:nvSpPr>
-        <p:spPr>
-          <a:xfrm>
-            <a:off x="838199" y="657726"/>
-            <a:ext cx="1086853" cy="1058779"/>
-          </a:xfrm>
-          <a:prstGeom prst="ellipse">
-            <a:avLst/>
-          </a:prstGeom>
-          <a:solidFill>
-            <a:srgbClr val="6767AF"/>
-          </a:solidFill>
-          <a:ln>
-            <a:solidFill>
-              <a:schemeClr val="tx1">
-                <a:lumMod val="75000"/>
-                <a:lumOff val="25000"/>
-              </a:schemeClr>
-            </a:solidFill>
-          </a:ln>
-        </p:spPr>
-        <p:style>
-          <a:lnRef idx="2">
-            <a:schemeClr val="accent1">
-              <a:shade val="50000"/>
-            </a:schemeClr>
-          </a:lnRef>
-          <a:fillRef idx="1">
-            <a:schemeClr val="accent1"/>
-          </a:fillRef>
-          <a:effectRef idx="0">
-            <a:schemeClr val="accent1"/>
-          </a:effectRef>
-          <a:fontRef idx="minor">
-            <a:schemeClr val="lt1"/>
-          </a:fontRef>
-        </p:style>
-        <p:txBody>
-          <a:bodyPr rtlCol="0" anchor="ctr"/>
-          <a:lstStyle/>
-          <a:p>
-            <a:pPr algn="ctr"/>
-            <a:r>
-              <a:rPr lang="en-US" sz="4800" dirty="0">
-                <a:highlight>
-                  <a:srgbClr val="6767AF"/>
-                </a:highlight>
-                <a:latin typeface="Avenir" panose="02000503020000020003"/>
-              </a:rPr>
-              <a:t>5</a:t>
-            </a:r>
-          </a:p>
-        </p:txBody>
-      </p:sp>
+      </p:pic>
       <p:pic>
         <p:nvPicPr>
           <p:cNvPr id="2" name="Picture 1">
             <a:extLst>
               <a:ext uri="{FF2B5EF4-FFF2-40B4-BE49-F238E27FC236}">
-                <a16:creationId xmlns:a16="http://schemas.microsoft.com/office/drawing/2014/main" id="{CDB91293-E7D8-B074-A788-3BCE0005BF5D}"/>
+                <a16:creationId xmlns:a16="http://schemas.microsoft.com/office/drawing/2014/main" id="{C104B480-12AD-24BA-9F36-15E6AF21B510}"/>
               </a:ext>
               <a:ext uri="{C183D7F6-B498-43B3-948B-1728B52AA6E4}">
                 <adec:decorative xmlns:adec="http://schemas.microsoft.com/office/drawing/2017/decorative" val="1"/>
@@ -7632,7 +6078,7 @@
           <p:nvPr/>
         </p:nvPicPr>
         <p:blipFill>
-          <a:blip r:embed="rId3">
+          <a:blip r:embed="rId4">
             <a:extLst>
               <a:ext uri="{28A0092B-C50C-407E-A947-70E740481C1C}">
                 <a14:useLocalDpi xmlns:a14="http://schemas.microsoft.com/office/drawing/2010/main" val="0"/>
@@ -7656,7 +6102,7 @@
     </p:spTree>
     <p:extLst>
       <p:ext uri="{BB962C8B-B14F-4D97-AF65-F5344CB8AC3E}">
-        <p14:creationId xmlns:p14="http://schemas.microsoft.com/office/powerpoint/2010/main" val="3662302424"/>
+        <p14:creationId xmlns:p14="http://schemas.microsoft.com/office/powerpoint/2010/main" val="392144026"/>
       </p:ext>
     </p:extLst>
   </p:cSld>
@@ -7666,7 +6112,7 @@
 </p:sld>
 </file>
 
-<file path=ppt/slides/slide9.xml><?xml version="1.0" encoding="utf-8"?>
+<file path=ppt/slides/slide4.xml><?xml version="1.0" encoding="utf-8"?>
 <p:sld xmlns:a="http://schemas.openxmlformats.org/drawingml/2006/main" xmlns:r="http://schemas.openxmlformats.org/officeDocument/2006/relationships" xmlns:p="http://schemas.openxmlformats.org/presentationml/2006/main">
   <p:cSld>
     <p:spTree>
@@ -7685,119 +6131,95 @@
       </p:grpSpPr>
       <p:sp>
         <p:nvSpPr>
-          <p:cNvPr id="4" name="TextBox 3">
-            <a:extLst>
-              <a:ext uri="{FF2B5EF4-FFF2-40B4-BE49-F238E27FC236}">
-                <a16:creationId xmlns:a16="http://schemas.microsoft.com/office/drawing/2014/main" id="{15CD17A5-E0E7-8509-589A-E8ACC2BB6A89}"/>
-              </a:ext>
-            </a:extLst>
-          </p:cNvPr>
-          <p:cNvSpPr txBox="1"/>
-          <p:nvPr/>
+          <p:cNvPr id="4" name="Title 3">
+            <a:extLst>
+              <a:ext uri="{FF2B5EF4-FFF2-40B4-BE49-F238E27FC236}">
+                <a16:creationId xmlns:a16="http://schemas.microsoft.com/office/drawing/2014/main" id="{3E24E32D-2BAD-4804-B513-11E4618F0D02}"/>
+              </a:ext>
+            </a:extLst>
+          </p:cNvPr>
+          <p:cNvSpPr>
+            <a:spLocks noGrp="1"/>
+          </p:cNvSpPr>
+          <p:nvPr>
+            <p:ph type="title" idx="4294967295"/>
+          </p:nvPr>
         </p:nvSpPr>
         <p:spPr>
           <a:xfrm>
-            <a:off x="1" y="3167390"/>
-            <a:ext cx="12191999" cy="830997"/>
+            <a:off x="838200" y="-1325563"/>
+            <a:ext cx="10515600" cy="1325563"/>
+          </a:xfrm>
+        </p:spPr>
+        <p:txBody>
+          <a:bodyPr vert="horz" lIns="91440" tIns="45720" rIns="91440" bIns="45720" rtlCol="0" anchor="b">
+            <a:normAutofit/>
+          </a:bodyPr>
+          <a:lstStyle/>
+          <a:p>
+            <a:r>
+              <a:rPr lang="en-US" dirty="0"/>
+              <a:t>Python and Pandas</a:t>
+            </a:r>
+          </a:p>
+        </p:txBody>
+      </p:sp>
+      <p:pic>
+        <p:nvPicPr>
+          <p:cNvPr id="1026" name="Picture 2">
+            <a:extLst>
+              <a:ext uri="{FF2B5EF4-FFF2-40B4-BE49-F238E27FC236}">
+                <a16:creationId xmlns:a16="http://schemas.microsoft.com/office/drawing/2014/main" id="{3723C6B1-ABA5-663E-4CCE-F7DFCC646272}"/>
+              </a:ext>
+              <a:ext uri="{C183D7F6-B498-43B3-948B-1728B52AA6E4}">
+                <adec:decorative xmlns:adec="http://schemas.microsoft.com/office/drawing/2017/decorative" val="1"/>
+              </a:ext>
+            </a:extLst>
+          </p:cNvPr>
+          <p:cNvPicPr>
+            <a:picLocks noChangeAspect="1" noChangeArrowheads="1"/>
+          </p:cNvPicPr>
+          <p:nvPr/>
+        </p:nvPicPr>
+        <p:blipFill>
+          <a:blip r:embed="rId3">
+            <a:extLst>
+              <a:ext uri="{28A0092B-C50C-407E-A947-70E740481C1C}">
+                <a14:useLocalDpi xmlns:a14="http://schemas.microsoft.com/office/drawing/2010/main" val="0"/>
+              </a:ext>
+            </a:extLst>
+          </a:blip>
+          <a:srcRect/>
+          <a:stretch>
+            <a:fillRect/>
+          </a:stretch>
+        </p:blipFill>
+        <p:spPr bwMode="auto">
+          <a:xfrm>
+            <a:off x="3233736" y="2462212"/>
+            <a:ext cx="5724525" cy="1933575"/>
           </a:xfrm>
           <a:prstGeom prst="rect">
             <a:avLst/>
           </a:prstGeom>
           <a:noFill/>
+          <a:extLst>
+            <a:ext uri="{909E8E84-426E-40DD-AFC4-6F175D3DCCD1}">
+              <a14:hiddenFill xmlns:a14="http://schemas.microsoft.com/office/drawing/2010/main">
+                <a:solidFill>
+                  <a:srgbClr val="FFFFFF"/>
+                </a:solidFill>
+              </a14:hiddenFill>
+            </a:ext>
+          </a:extLst>
         </p:spPr>
-        <p:txBody>
-          <a:bodyPr wrap="square" rtlCol="0">
-            <a:spAutoFit/>
-          </a:bodyPr>
-          <a:lstStyle/>
-          <a:p>
-            <a:pPr algn="ctr"/>
-            <a:r>
-              <a:rPr lang="en-US" sz="4800" dirty="0">
-                <a:solidFill>
-                  <a:schemeClr val="tx1">
-                    <a:lumMod val="75000"/>
-                    <a:lumOff val="25000"/>
-                  </a:schemeClr>
-                </a:solidFill>
-                <a:latin typeface="Avenir" panose="02000503020000020003" pitchFamily="2" charset="0"/>
-              </a:rPr>
-              <a:t>Take Your Time</a:t>
-            </a:r>
-          </a:p>
-        </p:txBody>
-      </p:sp>
-      <p:sp>
-        <p:nvSpPr>
-          <p:cNvPr id="5" name="Oval 4">
-            <a:extLst>
-              <a:ext uri="{FF2B5EF4-FFF2-40B4-BE49-F238E27FC236}">
-                <a16:creationId xmlns:a16="http://schemas.microsoft.com/office/drawing/2014/main" id="{971634D0-256A-F75D-5B88-DF8561E5F21B}"/>
-              </a:ext>
-            </a:extLst>
-          </p:cNvPr>
-          <p:cNvSpPr/>
-          <p:nvPr/>
-        </p:nvSpPr>
-        <p:spPr>
-          <a:xfrm>
-            <a:off x="838199" y="657726"/>
-            <a:ext cx="1086853" cy="1058779"/>
-          </a:xfrm>
-          <a:prstGeom prst="ellipse">
-            <a:avLst/>
-          </a:prstGeom>
-          <a:solidFill>
-            <a:srgbClr val="6767AF"/>
-          </a:solidFill>
-          <a:ln>
-            <a:solidFill>
-              <a:schemeClr val="tx1">
-                <a:lumMod val="75000"/>
-                <a:lumOff val="25000"/>
-              </a:schemeClr>
-            </a:solidFill>
-          </a:ln>
-        </p:spPr>
-        <p:style>
-          <a:lnRef idx="2">
-            <a:schemeClr val="accent1">
-              <a:shade val="50000"/>
-            </a:schemeClr>
-          </a:lnRef>
-          <a:fillRef idx="1">
-            <a:schemeClr val="accent1"/>
-          </a:fillRef>
-          <a:effectRef idx="0">
-            <a:schemeClr val="accent1"/>
-          </a:effectRef>
-          <a:fontRef idx="minor">
-            <a:schemeClr val="lt1"/>
-          </a:fontRef>
-        </p:style>
-        <p:txBody>
-          <a:bodyPr rtlCol="0" anchor="ctr"/>
-          <a:lstStyle/>
-          <a:p>
-            <a:pPr algn="ctr"/>
-            <a:r>
-              <a:rPr lang="en-US" sz="4800" dirty="0">
-                <a:highlight>
-                  <a:srgbClr val="6767AF"/>
-                </a:highlight>
-                <a:latin typeface="Avenir" panose="02000503020000020003"/>
-              </a:rPr>
-              <a:t>6</a:t>
-            </a:r>
-          </a:p>
-        </p:txBody>
-      </p:sp>
+      </p:pic>
       <p:pic>
         <p:nvPicPr>
           <p:cNvPr id="2" name="Picture 1">
             <a:extLst>
               <a:ext uri="{FF2B5EF4-FFF2-40B4-BE49-F238E27FC236}">
-                <a16:creationId xmlns:a16="http://schemas.microsoft.com/office/drawing/2014/main" id="{A53D85D5-3138-0DE4-30EC-73BBBA7954C6}"/>
+                <a16:creationId xmlns:a16="http://schemas.microsoft.com/office/drawing/2014/main" id="{C104B480-12AD-24BA-9F36-15E6AF21B510}"/>
               </a:ext>
               <a:ext uri="{C183D7F6-B498-43B3-948B-1728B52AA6E4}">
                 <adec:decorative xmlns:adec="http://schemas.microsoft.com/office/drawing/2017/decorative" val="1"/>
@@ -7810,7 +6232,7 @@
           <p:nvPr/>
         </p:nvPicPr>
         <p:blipFill>
-          <a:blip r:embed="rId3">
+          <a:blip r:embed="rId4">
             <a:extLst>
               <a:ext uri="{28A0092B-C50C-407E-A947-70E740481C1C}">
                 <a14:useLocalDpi xmlns:a14="http://schemas.microsoft.com/office/drawing/2010/main" val="0"/>
@@ -7831,10 +6253,60 @@
           </a:prstGeom>
         </p:spPr>
       </p:pic>
+      <p:pic>
+        <p:nvPicPr>
+          <p:cNvPr id="3" name="Picture 2">
+            <a:extLst>
+              <a:ext uri="{FF2B5EF4-FFF2-40B4-BE49-F238E27FC236}">
+                <a16:creationId xmlns:a16="http://schemas.microsoft.com/office/drawing/2014/main" id="{75F00E85-81DC-B82D-31A0-293ED8BA4ADD}"/>
+              </a:ext>
+              <a:ext uri="{C183D7F6-B498-43B3-948B-1728B52AA6E4}">
+                <adec:decorative xmlns:adec="http://schemas.microsoft.com/office/drawing/2017/decorative" val="1"/>
+              </a:ext>
+            </a:extLst>
+          </p:cNvPr>
+          <p:cNvPicPr>
+            <a:picLocks noChangeAspect="1" noChangeArrowheads="1"/>
+          </p:cNvPicPr>
+          <p:nvPr/>
+        </p:nvPicPr>
+        <p:blipFill>
+          <a:blip r:embed="rId5">
+            <a:extLst>
+              <a:ext uri="{28A0092B-C50C-407E-A947-70E740481C1C}">
+                <a14:useLocalDpi xmlns:a14="http://schemas.microsoft.com/office/drawing/2010/main" val="0"/>
+              </a:ext>
+            </a:extLst>
+          </a:blip>
+          <a:srcRect/>
+          <a:stretch>
+            <a:fillRect/>
+          </a:stretch>
+        </p:blipFill>
+        <p:spPr bwMode="auto">
+          <a:xfrm>
+            <a:off x="4148092" y="4659420"/>
+            <a:ext cx="3895812" cy="1578190"/>
+          </a:xfrm>
+          <a:prstGeom prst="rect">
+            <a:avLst/>
+          </a:prstGeom>
+          <a:noFill/>
+          <a:extLst>
+            <a:ext uri="{909E8E84-426E-40DD-AFC4-6F175D3DCCD1}">
+              <a14:hiddenFill xmlns:a14="http://schemas.microsoft.com/office/drawing/2010/main">
+                <a:solidFill>
+                  <a:srgbClr val="FFFFFF"/>
+                </a:solidFill>
+              </a14:hiddenFill>
+            </a:ext>
+          </a:extLst>
+        </p:spPr>
+      </p:pic>
     </p:spTree>
     <p:extLst>
       <p:ext uri="{BB962C8B-B14F-4D97-AF65-F5344CB8AC3E}">
-        <p14:creationId xmlns:p14="http://schemas.microsoft.com/office/powerpoint/2010/main" val="3062191149"/>
+        <p14:creationId xmlns:p14="http://schemas.microsoft.com/office/powerpoint/2010/main" val="2933933768"/>
       </p:ext>
     </p:extLst>
   </p:cSld>
@@ -8435,9 +6907,29 @@
 </file>
 
 <file path=customXml/item1.xml><?xml version="1.0" encoding="utf-8"?>
-<ct:contentTypeSchema xmlns:ct="http://schemas.microsoft.com/office/2006/metadata/contentType" xmlns:ma="http://schemas.microsoft.com/office/2006/metadata/properties/metaAttributes" ct:_="" ma:_="" ma:contentTypeName="Document" ma:contentTypeID="0x0101002673533D22965147974C76FEA4E99B6D" ma:contentTypeVersion="9" ma:contentTypeDescription="Create a new document." ma:contentTypeScope="" ma:versionID="e71eb3f1b47f60ef069b9b8710610cb8">
-  <xsd:schema xmlns:xsd="http://www.w3.org/2001/XMLSchema" xmlns:xs="http://www.w3.org/2001/XMLSchema" xmlns:p="http://schemas.microsoft.com/office/2006/metadata/properties" xmlns:ns2="457672a9-2aae-4e32-9c0c-21a1a727485c" targetNamespace="http://schemas.microsoft.com/office/2006/metadata/properties" ma:root="true" ma:fieldsID="9155a27f35ca249c5c04cd4479bb01cb" ns2:_="">
+<p:properties xmlns:p="http://schemas.microsoft.com/office/2006/metadata/properties" xmlns:xsi="http://www.w3.org/2001/XMLSchema-instance" xmlns:pc="http://schemas.microsoft.com/office/infopath/2007/PartnerControls">
+  <documentManagement>
+    <lcf76f155ced4ddcb4097134ff3c332f xmlns="457672a9-2aae-4e32-9c0c-21a1a727485c">
+      <Terms xmlns="http://schemas.microsoft.com/office/infopath/2007/PartnerControls"/>
+    </lcf76f155ced4ddcb4097134ff3c332f>
+  </documentManagement>
+</p:properties>
+</file>
+
+<file path=customXml/item2.xml><?xml version="1.0" encoding="utf-8"?>
+<?mso-contentType ?>
+<FormTemplates xmlns="http://schemas.microsoft.com/sharepoint/v3/contenttype/forms">
+  <Display>DocumentLibraryForm</Display>
+  <Edit>DocumentLibraryForm</Edit>
+  <New>DocumentLibraryForm</New>
+</FormTemplates>
+</file>
+
+<file path=customXml/item3.xml><?xml version="1.0" encoding="utf-8"?>
+<ct:contentTypeSchema xmlns:ct="http://schemas.microsoft.com/office/2006/metadata/contentType" xmlns:ma="http://schemas.microsoft.com/office/2006/metadata/properties/metaAttributes" ct:_="" ma:_="" ma:contentTypeName="Document" ma:contentTypeID="0x0101002673533D22965147974C76FEA4E99B6D" ma:contentTypeVersion="12" ma:contentTypeDescription="Create a new document." ma:contentTypeScope="" ma:versionID="3f910c0e24e3ef7e8d488bc6f8c277c7">
+  <xsd:schema xmlns:xsd="http://www.w3.org/2001/XMLSchema" xmlns:xs="http://www.w3.org/2001/XMLSchema" xmlns:p="http://schemas.microsoft.com/office/2006/metadata/properties" xmlns:ns2="457672a9-2aae-4e32-9c0c-21a1a727485c" xmlns:ns3="dab19d59-310d-4ad5-9870-435903295c2c" targetNamespace="http://schemas.microsoft.com/office/2006/metadata/properties" ma:root="true" ma:fieldsID="4d432f6a320c6c03154718ff93a28c96" ns2:_="" ns3:_="">
     <xsd:import namespace="457672a9-2aae-4e32-9c0c-21a1a727485c"/>
+    <xsd:import namespace="dab19d59-310d-4ad5-9870-435903295c2c"/>
     <xsd:element name="properties">
       <xsd:complexType>
         <xsd:sequence>
@@ -8452,6 +6944,9 @@
                 <xsd:element ref="ns2:MediaServiceEventHashCode" minOccurs="0"/>
                 <xsd:element ref="ns2:MediaServiceDateTaken" minOccurs="0"/>
                 <xsd:element ref="ns2:MediaLengthInSeconds" minOccurs="0"/>
+                <xsd:element ref="ns2:MediaServiceObjectDetectorVersions" minOccurs="0"/>
+                <xsd:element ref="ns3:SharedWithUsers" minOccurs="0"/>
+                <xsd:element ref="ns3:SharedWithDetails" minOccurs="0"/>
               </xsd:all>
             </xsd:complexType>
           </xsd:element>
@@ -8504,6 +6999,41 @@
     <xsd:element name="MediaLengthInSeconds" ma:index="16" nillable="true" ma:displayName="MediaLengthInSeconds" ma:hidden="true" ma:internalName="MediaLengthInSeconds" ma:readOnly="true">
       <xsd:simpleType>
         <xsd:restriction base="dms:Unknown"/>
+      </xsd:simpleType>
+    </xsd:element>
+    <xsd:element name="MediaServiceObjectDetectorVersions" ma:index="17" nillable="true" ma:displayName="MediaServiceObjectDetectorVersions" ma:hidden="true" ma:indexed="true" ma:internalName="MediaServiceObjectDetectorVersions" ma:readOnly="true">
+      <xsd:simpleType>
+        <xsd:restriction base="dms:Text"/>
+      </xsd:simpleType>
+    </xsd:element>
+  </xsd:schema>
+  <xsd:schema xmlns:xsd="http://www.w3.org/2001/XMLSchema" xmlns:xs="http://www.w3.org/2001/XMLSchema" xmlns:dms="http://schemas.microsoft.com/office/2006/documentManagement/types" xmlns:pc="http://schemas.microsoft.com/office/infopath/2007/PartnerControls" targetNamespace="dab19d59-310d-4ad5-9870-435903295c2c" elementFormDefault="qualified">
+    <xsd:import namespace="http://schemas.microsoft.com/office/2006/documentManagement/types"/>
+    <xsd:import namespace="http://schemas.microsoft.com/office/infopath/2007/PartnerControls"/>
+    <xsd:element name="SharedWithUsers" ma:index="18" nillable="true" ma:displayName="Shared With" ma:internalName="SharedWithUsers" ma:readOnly="true">
+      <xsd:complexType>
+        <xsd:complexContent>
+          <xsd:extension base="dms:UserMulti">
+            <xsd:sequence>
+              <xsd:element name="UserInfo" minOccurs="0" maxOccurs="unbounded">
+                <xsd:complexType>
+                  <xsd:sequence>
+                    <xsd:element name="DisplayName" type="xsd:string" minOccurs="0"/>
+                    <xsd:element name="AccountId" type="dms:UserId" minOccurs="0" nillable="true"/>
+                    <xsd:element name="AccountType" type="xsd:string" minOccurs="0"/>
+                  </xsd:sequence>
+                </xsd:complexType>
+              </xsd:element>
+            </xsd:sequence>
+          </xsd:extension>
+        </xsd:complexContent>
+      </xsd:complexType>
+    </xsd:element>
+    <xsd:element name="SharedWithDetails" ma:index="19" nillable="true" ma:displayName="Shared With Details" ma:internalName="SharedWithDetails" ma:readOnly="true">
+      <xsd:simpleType>
+        <xsd:restriction base="dms:Note">
+          <xsd:maxLength value="255"/>
+        </xsd:restriction>
       </xsd:simpleType>
     </xsd:element>
   </xsd:schema>
@@ -8606,39 +7136,18 @@
 </ct:contentTypeSchema>
 </file>
 
-<file path=customXml/item2.xml><?xml version="1.0" encoding="utf-8"?>
-<?mso-contentType ?>
-<FormTemplates xmlns="http://schemas.microsoft.com/sharepoint/v3/contenttype/forms">
-  <Display>DocumentLibraryForm</Display>
-  <Edit>DocumentLibraryForm</Edit>
-  <New>DocumentLibraryForm</New>
-</FormTemplates>
-</file>
-
-<file path=customXml/item3.xml><?xml version="1.0" encoding="utf-8"?>
-<p:properties xmlns:p="http://schemas.microsoft.com/office/2006/metadata/properties" xmlns:xsi="http://www.w3.org/2001/XMLSchema-instance" xmlns:pc="http://schemas.microsoft.com/office/infopath/2007/PartnerControls">
-  <documentManagement>
-    <lcf76f155ced4ddcb4097134ff3c332f xmlns="457672a9-2aae-4e32-9c0c-21a1a727485c">
-      <Terms xmlns="http://schemas.microsoft.com/office/infopath/2007/PartnerControls"/>
-    </lcf76f155ced4ddcb4097134ff3c332f>
-  </documentManagement>
-</p:properties>
-</file>
-
 <file path=customXml/itemProps1.xml><?xml version="1.0" encoding="utf-8"?>
-<ds:datastoreItem xmlns:ds="http://schemas.openxmlformats.org/officeDocument/2006/customXml" ds:itemID="{B695C47F-71C0-46F5-9C58-C9AC4D477B79}">
+<ds:datastoreItem xmlns:ds="http://schemas.openxmlformats.org/officeDocument/2006/customXml" ds:itemID="{0B26EFB6-63B6-4D71-9C88-C5CC6E45A9D0}">
   <ds:schemaRefs>
-    <ds:schemaRef ds:uri="http://schemas.microsoft.com/office/2006/metadata/contentType"/>
-    <ds:schemaRef ds:uri="http://schemas.microsoft.com/office/2006/metadata/properties/metaAttributes"/>
-    <ds:schemaRef ds:uri="http://www.w3.org/2001/XMLSchema"/>
-    <ds:schemaRef ds:uri="http://schemas.microsoft.com/office/2006/metadata/properties"/>
-    <ds:schemaRef ds:uri="457672a9-2aae-4e32-9c0c-21a1a727485c"/>
-    <ds:schemaRef ds:uri="http://schemas.microsoft.com/office/2006/documentManagement/types"/>
     <ds:schemaRef ds:uri="http://schemas.microsoft.com/office/infopath/2007/PartnerControls"/>
-    <ds:schemaRef ds:uri="http://schemas.openxmlformats.org/package/2006/metadata/core-properties"/>
     <ds:schemaRef ds:uri="http://purl.org/dc/elements/1.1/"/>
     <ds:schemaRef ds:uri="http://purl.org/dc/terms/"/>
-    <ds:schemaRef ds:uri="http://schemas.microsoft.com/internal/obd"/>
+    <ds:schemaRef ds:uri="457672a9-2aae-4e32-9c0c-21a1a727485c"/>
+    <ds:schemaRef ds:uri="http://purl.org/dc/dcmitype/"/>
+    <ds:schemaRef ds:uri="http://www.w3.org/XML/1998/namespace"/>
+    <ds:schemaRef ds:uri="http://schemas.microsoft.com/office/2006/documentManagement/types"/>
+    <ds:schemaRef ds:uri="http://schemas.openxmlformats.org/package/2006/metadata/core-properties"/>
+    <ds:schemaRef ds:uri="http://schemas.microsoft.com/office/2006/metadata/properties"/>
   </ds:schemaRefs>
 </ds:datastoreItem>
 </file>
@@ -8652,17 +7161,20 @@
 </file>
 
 <file path=customXml/itemProps3.xml><?xml version="1.0" encoding="utf-8"?>
-<ds:datastoreItem xmlns:ds="http://schemas.openxmlformats.org/officeDocument/2006/customXml" ds:itemID="{0B26EFB6-63B6-4D71-9C88-C5CC6E45A9D0}">
+<ds:datastoreItem xmlns:ds="http://schemas.openxmlformats.org/officeDocument/2006/customXml" ds:itemID="{3C1033CA-23FB-41C7-8A95-DCAA51ACBE23}">
   <ds:schemaRefs>
+    <ds:schemaRef ds:uri="http://schemas.microsoft.com/office/2006/metadata/contentType"/>
+    <ds:schemaRef ds:uri="http://schemas.microsoft.com/office/2006/metadata/properties/metaAttributes"/>
+    <ds:schemaRef ds:uri="http://www.w3.org/2001/XMLSchema"/>
+    <ds:schemaRef ds:uri="http://schemas.microsoft.com/office/2006/metadata/properties"/>
+    <ds:schemaRef ds:uri="457672a9-2aae-4e32-9c0c-21a1a727485c"/>
+    <ds:schemaRef ds:uri="dab19d59-310d-4ad5-9870-435903295c2c"/>
+    <ds:schemaRef ds:uri="http://schemas.microsoft.com/office/2006/documentManagement/types"/>
     <ds:schemaRef ds:uri="http://schemas.microsoft.com/office/infopath/2007/PartnerControls"/>
+    <ds:schemaRef ds:uri="http://schemas.openxmlformats.org/package/2006/metadata/core-properties"/>
     <ds:schemaRef ds:uri="http://purl.org/dc/elements/1.1/"/>
     <ds:schemaRef ds:uri="http://purl.org/dc/terms/"/>
-    <ds:schemaRef ds:uri="457672a9-2aae-4e32-9c0c-21a1a727485c"/>
-    <ds:schemaRef ds:uri="http://purl.org/dc/dcmitype/"/>
-    <ds:schemaRef ds:uri="http://www.w3.org/XML/1998/namespace"/>
-    <ds:schemaRef ds:uri="http://schemas.microsoft.com/office/2006/documentManagement/types"/>
-    <ds:schemaRef ds:uri="http://schemas.openxmlformats.org/package/2006/metadata/core-properties"/>
-    <ds:schemaRef ds:uri="http://schemas.microsoft.com/office/2006/metadata/properties"/>
+    <ds:schemaRef ds:uri="http://schemas.microsoft.com/internal/obd"/>
   </ds:schemaRefs>
 </ds:datastoreItem>
 </file>
</xml_diff>

<commit_message>
Revert "Merge pull request #26 from PracticumAI/plotnine"
This reverts commit cb3bf0d2c940fffc7e1b24f05cee81d225333249, reversing
changes made to ca3de521d390865e37d42943c2444ef82258988d.
</commit_message>
<xml_diff>
--- a/presentations/01_intro_to_python.pptx
+++ b/presentations/01_intro_to_python.pptx
@@ -6909,10 +6909,9 @@
 <file path=customXml/item1.xml><?xml version="1.0" encoding="utf-8"?>
 <p:properties xmlns:p="http://schemas.microsoft.com/office/2006/metadata/properties" xmlns:xsi="http://www.w3.org/2001/XMLSchema-instance" xmlns:pc="http://schemas.microsoft.com/office/infopath/2007/PartnerControls">
   <documentManagement>
-    <lcf76f155ced4ddcb4097134ff3c332f xmlns="73469ae3-3789-4a7f-87ef-b4423e3499cf">
+    <lcf76f155ced4ddcb4097134ff3c332f xmlns="457672a9-2aae-4e32-9c0c-21a1a727485c">
       <Terms xmlns="http://schemas.microsoft.com/office/infopath/2007/PartnerControls"/>
     </lcf76f155ced4ddcb4097134ff3c332f>
-    <TaxCatchAll xmlns="370954b4-d60e-43df-a72f-328730ed82f8" xsi:nil="true"/>
   </documentManagement>
 </p:properties>
 </file>
@@ -6927,10 +6926,10 @@
 </file>
 
 <file path=customXml/item3.xml><?xml version="1.0" encoding="utf-8"?>
-<ct:contentTypeSchema xmlns:ct="http://schemas.microsoft.com/office/2006/metadata/contentType" xmlns:ma="http://schemas.microsoft.com/office/2006/metadata/properties/metaAttributes" ct:_="" ma:_="" ma:contentTypeName="Document" ma:contentTypeID="0x010100EE74D62019A86849A6E8272CE3CB8567" ma:contentTypeVersion="11" ma:contentTypeDescription="Create a new document." ma:contentTypeScope="" ma:versionID="9ab9ae8d3e7fa803892914cdce0dcd1b">
-  <xsd:schema xmlns:xsd="http://www.w3.org/2001/XMLSchema" xmlns:xs="http://www.w3.org/2001/XMLSchema" xmlns:p="http://schemas.microsoft.com/office/2006/metadata/properties" xmlns:ns2="73469ae3-3789-4a7f-87ef-b4423e3499cf" xmlns:ns3="370954b4-d60e-43df-a72f-328730ed82f8" targetNamespace="http://schemas.microsoft.com/office/2006/metadata/properties" ma:root="true" ma:fieldsID="35c618105688bc21e670d38e6f4b56af" ns2:_="" ns3:_="">
-    <xsd:import namespace="73469ae3-3789-4a7f-87ef-b4423e3499cf"/>
-    <xsd:import namespace="370954b4-d60e-43df-a72f-328730ed82f8"/>
+<ct:contentTypeSchema xmlns:ct="http://schemas.microsoft.com/office/2006/metadata/contentType" xmlns:ma="http://schemas.microsoft.com/office/2006/metadata/properties/metaAttributes" ct:_="" ma:_="" ma:contentTypeName="Document" ma:contentTypeID="0x0101002673533D22965147974C76FEA4E99B6D" ma:contentTypeVersion="12" ma:contentTypeDescription="Create a new document." ma:contentTypeScope="" ma:versionID="3f910c0e24e3ef7e8d488bc6f8c277c7">
+  <xsd:schema xmlns:xsd="http://www.w3.org/2001/XMLSchema" xmlns:xs="http://www.w3.org/2001/XMLSchema" xmlns:p="http://schemas.microsoft.com/office/2006/metadata/properties" xmlns:ns2="457672a9-2aae-4e32-9c0c-21a1a727485c" xmlns:ns3="dab19d59-310d-4ad5-9870-435903295c2c" targetNamespace="http://schemas.microsoft.com/office/2006/metadata/properties" ma:root="true" ma:fieldsID="4d432f6a320c6c03154718ff93a28c96" ns2:_="" ns3:_="">
+    <xsd:import namespace="457672a9-2aae-4e32-9c0c-21a1a727485c"/>
+    <xsd:import namespace="dab19d59-310d-4ad5-9870-435903295c2c"/>
     <xsd:element name="properties">
       <xsd:complexType>
         <xsd:sequence>
@@ -6939,14 +6938,15 @@
               <xsd:all>
                 <xsd:element ref="ns2:MediaServiceMetadata" minOccurs="0"/>
                 <xsd:element ref="ns2:MediaServiceFastMetadata" minOccurs="0"/>
+                <xsd:element ref="ns2:lcf76f155ced4ddcb4097134ff3c332f" minOccurs="0"/>
+                <xsd:element ref="ns2:MediaServiceOCR" minOccurs="0"/>
+                <xsd:element ref="ns2:MediaServiceGenerationTime" minOccurs="0"/>
+                <xsd:element ref="ns2:MediaServiceEventHashCode" minOccurs="0"/>
+                <xsd:element ref="ns2:MediaServiceDateTaken" minOccurs="0"/>
+                <xsd:element ref="ns2:MediaLengthInSeconds" minOccurs="0"/>
                 <xsd:element ref="ns2:MediaServiceObjectDetectorVersions" minOccurs="0"/>
                 <xsd:element ref="ns3:SharedWithUsers" minOccurs="0"/>
                 <xsd:element ref="ns3:SharedWithDetails" minOccurs="0"/>
-                <xsd:element ref="ns2:lcf76f155ced4ddcb4097134ff3c332f" minOccurs="0"/>
-                <xsd:element ref="ns3:TaxCatchAll" minOccurs="0"/>
-                <xsd:element ref="ns2:MediaServiceOCR" minOccurs="0"/>
-                <xsd:element ref="ns2:MediaServiceGenerationTime" minOccurs="0"/>
-                <xsd:element ref="ns2:MediaServiceEventHashCode" minOccurs="0"/>
               </xsd:all>
             </xsd:complexType>
           </xsd:element>
@@ -6954,7 +6954,7 @@
       </xsd:complexType>
     </xsd:element>
   </xsd:schema>
-  <xsd:schema xmlns:xsd="http://www.w3.org/2001/XMLSchema" xmlns:xs="http://www.w3.org/2001/XMLSchema" xmlns:dms="http://schemas.microsoft.com/office/2006/documentManagement/types" xmlns:pc="http://schemas.microsoft.com/office/infopath/2007/PartnerControls" targetNamespace="73469ae3-3789-4a7f-87ef-b4423e3499cf" elementFormDefault="qualified">
+  <xsd:schema xmlns:xsd="http://www.w3.org/2001/XMLSchema" xmlns:xs="http://www.w3.org/2001/XMLSchema" xmlns:dms="http://schemas.microsoft.com/office/2006/documentManagement/types" xmlns:pc="http://schemas.microsoft.com/office/infopath/2007/PartnerControls" targetNamespace="457672a9-2aae-4e32-9c0c-21a1a727485c" elementFormDefault="qualified">
     <xsd:import namespace="http://schemas.microsoft.com/office/2006/documentManagement/types"/>
     <xsd:import namespace="http://schemas.microsoft.com/office/infopath/2007/PartnerControls"/>
     <xsd:element name="MediaServiceMetadata" ma:index="8" nillable="true" ma:displayName="MediaServiceMetadata" ma:hidden="true" ma:internalName="MediaServiceMetadata" ma:readOnly="true">
@@ -6967,40 +6967,50 @@
         <xsd:restriction base="dms:Note"/>
       </xsd:simpleType>
     </xsd:element>
-    <xsd:element name="MediaServiceObjectDetectorVersions" ma:index="10" nillable="true" ma:displayName="MediaServiceObjectDetectorVersions" ma:hidden="true" ma:indexed="true" ma:internalName="MediaServiceObjectDetectorVersions" ma:readOnly="true">
-      <xsd:simpleType>
-        <xsd:restriction base="dms:Text"/>
-      </xsd:simpleType>
-    </xsd:element>
-    <xsd:element name="lcf76f155ced4ddcb4097134ff3c332f" ma:index="14" nillable="true" ma:taxonomy="true" ma:internalName="lcf76f155ced4ddcb4097134ff3c332f" ma:taxonomyFieldName="MediaServiceImageTags" ma:displayName="Image Tags" ma:readOnly="false" ma:fieldId="{5cf76f15-5ced-4ddc-b409-7134ff3c332f}" ma:taxonomyMulti="true" ma:sspId="fa0c477a-f09e-4137-8c49-77869fdcca91" ma:termSetId="09814cd3-568e-fe90-9814-8d621ff8fb84" ma:anchorId="fba54fb3-c3e1-fe81-a776-ca4b69148c4d" ma:open="true" ma:isKeyword="false">
+    <xsd:element name="lcf76f155ced4ddcb4097134ff3c332f" ma:index="11" nillable="true" ma:taxonomy="true" ma:internalName="lcf76f155ced4ddcb4097134ff3c332f" ma:taxonomyFieldName="MediaServiceImageTags" ma:displayName="Image Tags" ma:readOnly="false" ma:fieldId="{5cf76f15-5ced-4ddc-b409-7134ff3c332f}" ma:taxonomyMulti="true" ma:sspId="fa0c477a-f09e-4137-8c49-77869fdcca91" ma:termSetId="09814cd3-568e-fe90-9814-8d621ff8fb84" ma:anchorId="fba54fb3-c3e1-fe81-a776-ca4b69148c4d" ma:open="true" ma:isKeyword="false">
       <xsd:complexType>
         <xsd:sequence>
           <xsd:element ref="pc:Terms" minOccurs="0" maxOccurs="1"/>
         </xsd:sequence>
       </xsd:complexType>
     </xsd:element>
-    <xsd:element name="MediaServiceOCR" ma:index="16" nillable="true" ma:displayName="Extracted Text" ma:internalName="MediaServiceOCR" ma:readOnly="true">
+    <xsd:element name="MediaServiceOCR" ma:index="12" nillable="true" ma:displayName="Extracted Text" ma:internalName="MediaServiceOCR" ma:readOnly="true">
       <xsd:simpleType>
         <xsd:restriction base="dms:Note">
           <xsd:maxLength value="255"/>
         </xsd:restriction>
       </xsd:simpleType>
     </xsd:element>
-    <xsd:element name="MediaServiceGenerationTime" ma:index="17" nillable="true" ma:displayName="MediaServiceGenerationTime" ma:hidden="true" ma:internalName="MediaServiceGenerationTime" ma:readOnly="true">
+    <xsd:element name="MediaServiceGenerationTime" ma:index="13" nillable="true" ma:displayName="MediaServiceGenerationTime" ma:hidden="true" ma:internalName="MediaServiceGenerationTime" ma:readOnly="true">
       <xsd:simpleType>
         <xsd:restriction base="dms:Text"/>
       </xsd:simpleType>
     </xsd:element>
-    <xsd:element name="MediaServiceEventHashCode" ma:index="18" nillable="true" ma:displayName="MediaServiceEventHashCode" ma:hidden="true" ma:internalName="MediaServiceEventHashCode" ma:readOnly="true">
+    <xsd:element name="MediaServiceEventHashCode" ma:index="14" nillable="true" ma:displayName="MediaServiceEventHashCode" ma:hidden="true" ma:internalName="MediaServiceEventHashCode" ma:readOnly="true">
+      <xsd:simpleType>
+        <xsd:restriction base="dms:Text"/>
+      </xsd:simpleType>
+    </xsd:element>
+    <xsd:element name="MediaServiceDateTaken" ma:index="15" nillable="true" ma:displayName="MediaServiceDateTaken" ma:hidden="true" ma:indexed="true" ma:internalName="MediaServiceDateTaken" ma:readOnly="true">
+      <xsd:simpleType>
+        <xsd:restriction base="dms:Text"/>
+      </xsd:simpleType>
+    </xsd:element>
+    <xsd:element name="MediaLengthInSeconds" ma:index="16" nillable="true" ma:displayName="MediaLengthInSeconds" ma:hidden="true" ma:internalName="MediaLengthInSeconds" ma:readOnly="true">
+      <xsd:simpleType>
+        <xsd:restriction base="dms:Unknown"/>
+      </xsd:simpleType>
+    </xsd:element>
+    <xsd:element name="MediaServiceObjectDetectorVersions" ma:index="17" nillable="true" ma:displayName="MediaServiceObjectDetectorVersions" ma:hidden="true" ma:indexed="true" ma:internalName="MediaServiceObjectDetectorVersions" ma:readOnly="true">
       <xsd:simpleType>
         <xsd:restriction base="dms:Text"/>
       </xsd:simpleType>
     </xsd:element>
   </xsd:schema>
-  <xsd:schema xmlns:xsd="http://www.w3.org/2001/XMLSchema" xmlns:xs="http://www.w3.org/2001/XMLSchema" xmlns:dms="http://schemas.microsoft.com/office/2006/documentManagement/types" xmlns:pc="http://schemas.microsoft.com/office/infopath/2007/PartnerControls" targetNamespace="370954b4-d60e-43df-a72f-328730ed82f8" elementFormDefault="qualified">
+  <xsd:schema xmlns:xsd="http://www.w3.org/2001/XMLSchema" xmlns:xs="http://www.w3.org/2001/XMLSchema" xmlns:dms="http://schemas.microsoft.com/office/2006/documentManagement/types" xmlns:pc="http://schemas.microsoft.com/office/infopath/2007/PartnerControls" targetNamespace="dab19d59-310d-4ad5-9870-435903295c2c" elementFormDefault="qualified">
     <xsd:import namespace="http://schemas.microsoft.com/office/2006/documentManagement/types"/>
     <xsd:import namespace="http://schemas.microsoft.com/office/infopath/2007/PartnerControls"/>
-    <xsd:element name="SharedWithUsers" ma:index="11" nillable="true" ma:displayName="Shared With" ma:internalName="SharedWithUsers" ma:readOnly="true">
+    <xsd:element name="SharedWithUsers" ma:index="18" nillable="true" ma:displayName="Shared With" ma:internalName="SharedWithUsers" ma:readOnly="true">
       <xsd:complexType>
         <xsd:complexContent>
           <xsd:extension base="dms:UserMulti">
@@ -7019,23 +7029,12 @@
         </xsd:complexContent>
       </xsd:complexType>
     </xsd:element>
-    <xsd:element name="SharedWithDetails" ma:index="12" nillable="true" ma:displayName="Shared With Details" ma:internalName="SharedWithDetails" ma:readOnly="true">
+    <xsd:element name="SharedWithDetails" ma:index="19" nillable="true" ma:displayName="Shared With Details" ma:internalName="SharedWithDetails" ma:readOnly="true">
       <xsd:simpleType>
         <xsd:restriction base="dms:Note">
           <xsd:maxLength value="255"/>
         </xsd:restriction>
       </xsd:simpleType>
-    </xsd:element>
-    <xsd:element name="TaxCatchAll" ma:index="15" nillable="true" ma:displayName="Taxonomy Catch All Column" ma:hidden="true" ma:list="{382dca3c-54a7-41ab-aa21-4ab4e1588e2d}" ma:internalName="TaxCatchAll" ma:showField="CatchAllData" ma:web="370954b4-d60e-43df-a72f-328730ed82f8">
-      <xsd:complexType>
-        <xsd:complexContent>
-          <xsd:extension base="dms:MultiChoiceLookup">
-            <xsd:sequence>
-              <xsd:element name="Value" type="dms:Lookup" maxOccurs="unbounded" minOccurs="0" nillable="true"/>
-            </xsd:sequence>
-          </xsd:extension>
-        </xsd:complexContent>
-      </xsd:complexType>
     </xsd:element>
   </xsd:schema>
   <xsd:schema xmlns="http://schemas.openxmlformats.org/package/2006/metadata/core-properties" xmlns:xsd="http://www.w3.org/2001/XMLSchema" xmlns:xsi="http://www.w3.org/2001/XMLSchema-instance" xmlns:dc="http://purl.org/dc/elements/1.1/" xmlns:dcterms="http://purl.org/dc/terms/" xmlns:odoc="http://schemas.microsoft.com/internal/obd" targetNamespace="http://schemas.openxmlformats.org/package/2006/metadata/core-properties" elementFormDefault="qualified" attributeFormDefault="unqualified" blockDefault="#all">
@@ -7162,5 +7161,20 @@
 </file>
 
 <file path=customXml/itemProps3.xml><?xml version="1.0" encoding="utf-8"?>
-<ds:datastoreItem xmlns:ds="http://schemas.openxmlformats.org/officeDocument/2006/customXml" ds:itemID="{B8B2BF3D-6C64-4341-B79B-E91BF739883A}"/>
+<ds:datastoreItem xmlns:ds="http://schemas.openxmlformats.org/officeDocument/2006/customXml" ds:itemID="{3C1033CA-23FB-41C7-8A95-DCAA51ACBE23}">
+  <ds:schemaRefs>
+    <ds:schemaRef ds:uri="http://schemas.microsoft.com/office/2006/metadata/contentType"/>
+    <ds:schemaRef ds:uri="http://schemas.microsoft.com/office/2006/metadata/properties/metaAttributes"/>
+    <ds:schemaRef ds:uri="http://www.w3.org/2001/XMLSchema"/>
+    <ds:schemaRef ds:uri="http://schemas.microsoft.com/office/2006/metadata/properties"/>
+    <ds:schemaRef ds:uri="457672a9-2aae-4e32-9c0c-21a1a727485c"/>
+    <ds:schemaRef ds:uri="dab19d59-310d-4ad5-9870-435903295c2c"/>
+    <ds:schemaRef ds:uri="http://schemas.microsoft.com/office/2006/documentManagement/types"/>
+    <ds:schemaRef ds:uri="http://schemas.microsoft.com/office/infopath/2007/PartnerControls"/>
+    <ds:schemaRef ds:uri="http://schemas.openxmlformats.org/package/2006/metadata/core-properties"/>
+    <ds:schemaRef ds:uri="http://purl.org/dc/elements/1.1/"/>
+    <ds:schemaRef ds:uri="http://purl.org/dc/terms/"/>
+    <ds:schemaRef ds:uri="http://schemas.microsoft.com/internal/obd"/>
+  </ds:schemaRefs>
+</ds:datastoreItem>
 </file>
</xml_diff>

<commit_message>
Revert "Merge upstream/main conflicts resolved"
This reverts commit 388504ededd4bcbde5daf6d53fba80624197c06b, reversing
changes made to cb7d270d524c0fc30bb60da2af82b87fc56d089a.
</commit_message>
<xml_diff>
--- a/presentations/01_intro_to_python.pptx
+++ b/presentations/01_intro_to_python.pptx
@@ -6909,9 +6909,10 @@
 <file path=customXml/item1.xml><?xml version="1.0" encoding="utf-8"?>
 <p:properties xmlns:p="http://schemas.microsoft.com/office/2006/metadata/properties" xmlns:xsi="http://www.w3.org/2001/XMLSchema-instance" xmlns:pc="http://schemas.microsoft.com/office/infopath/2007/PartnerControls">
   <documentManagement>
-    <lcf76f155ced4ddcb4097134ff3c332f xmlns="457672a9-2aae-4e32-9c0c-21a1a727485c">
+    <lcf76f155ced4ddcb4097134ff3c332f xmlns="73469ae3-3789-4a7f-87ef-b4423e3499cf">
       <Terms xmlns="http://schemas.microsoft.com/office/infopath/2007/PartnerControls"/>
     </lcf76f155ced4ddcb4097134ff3c332f>
+    <TaxCatchAll xmlns="370954b4-d60e-43df-a72f-328730ed82f8" xsi:nil="true"/>
   </documentManagement>
 </p:properties>
 </file>
@@ -6926,10 +6927,10 @@
 </file>
 
 <file path=customXml/item3.xml><?xml version="1.0" encoding="utf-8"?>
-<ct:contentTypeSchema xmlns:ct="http://schemas.microsoft.com/office/2006/metadata/contentType" xmlns:ma="http://schemas.microsoft.com/office/2006/metadata/properties/metaAttributes" ct:_="" ma:_="" ma:contentTypeName="Document" ma:contentTypeID="0x0101002673533D22965147974C76FEA4E99B6D" ma:contentTypeVersion="12" ma:contentTypeDescription="Create a new document." ma:contentTypeScope="" ma:versionID="3f910c0e24e3ef7e8d488bc6f8c277c7">
-  <xsd:schema xmlns:xsd="http://www.w3.org/2001/XMLSchema" xmlns:xs="http://www.w3.org/2001/XMLSchema" xmlns:p="http://schemas.microsoft.com/office/2006/metadata/properties" xmlns:ns2="457672a9-2aae-4e32-9c0c-21a1a727485c" xmlns:ns3="dab19d59-310d-4ad5-9870-435903295c2c" targetNamespace="http://schemas.microsoft.com/office/2006/metadata/properties" ma:root="true" ma:fieldsID="4d432f6a320c6c03154718ff93a28c96" ns2:_="" ns3:_="">
-    <xsd:import namespace="457672a9-2aae-4e32-9c0c-21a1a727485c"/>
-    <xsd:import namespace="dab19d59-310d-4ad5-9870-435903295c2c"/>
+<ct:contentTypeSchema xmlns:ct="http://schemas.microsoft.com/office/2006/metadata/contentType" xmlns:ma="http://schemas.microsoft.com/office/2006/metadata/properties/metaAttributes" ct:_="" ma:_="" ma:contentTypeName="Document" ma:contentTypeID="0x010100EE74D62019A86849A6E8272CE3CB8567" ma:contentTypeVersion="11" ma:contentTypeDescription="Create a new document." ma:contentTypeScope="" ma:versionID="9ab9ae8d3e7fa803892914cdce0dcd1b">
+  <xsd:schema xmlns:xsd="http://www.w3.org/2001/XMLSchema" xmlns:xs="http://www.w3.org/2001/XMLSchema" xmlns:p="http://schemas.microsoft.com/office/2006/metadata/properties" xmlns:ns2="73469ae3-3789-4a7f-87ef-b4423e3499cf" xmlns:ns3="370954b4-d60e-43df-a72f-328730ed82f8" targetNamespace="http://schemas.microsoft.com/office/2006/metadata/properties" ma:root="true" ma:fieldsID="35c618105688bc21e670d38e6f4b56af" ns2:_="" ns3:_="">
+    <xsd:import namespace="73469ae3-3789-4a7f-87ef-b4423e3499cf"/>
+    <xsd:import namespace="370954b4-d60e-43df-a72f-328730ed82f8"/>
     <xsd:element name="properties">
       <xsd:complexType>
         <xsd:sequence>
@@ -6938,15 +6939,14 @@
               <xsd:all>
                 <xsd:element ref="ns2:MediaServiceMetadata" minOccurs="0"/>
                 <xsd:element ref="ns2:MediaServiceFastMetadata" minOccurs="0"/>
+                <xsd:element ref="ns2:MediaServiceObjectDetectorVersions" minOccurs="0"/>
+                <xsd:element ref="ns3:SharedWithUsers" minOccurs="0"/>
+                <xsd:element ref="ns3:SharedWithDetails" minOccurs="0"/>
                 <xsd:element ref="ns2:lcf76f155ced4ddcb4097134ff3c332f" minOccurs="0"/>
+                <xsd:element ref="ns3:TaxCatchAll" minOccurs="0"/>
                 <xsd:element ref="ns2:MediaServiceOCR" minOccurs="0"/>
                 <xsd:element ref="ns2:MediaServiceGenerationTime" minOccurs="0"/>
                 <xsd:element ref="ns2:MediaServiceEventHashCode" minOccurs="0"/>
-                <xsd:element ref="ns2:MediaServiceDateTaken" minOccurs="0"/>
-                <xsd:element ref="ns2:MediaLengthInSeconds" minOccurs="0"/>
-                <xsd:element ref="ns2:MediaServiceObjectDetectorVersions" minOccurs="0"/>
-                <xsd:element ref="ns3:SharedWithUsers" minOccurs="0"/>
-                <xsd:element ref="ns3:SharedWithDetails" minOccurs="0"/>
               </xsd:all>
             </xsd:complexType>
           </xsd:element>
@@ -6954,7 +6954,7 @@
       </xsd:complexType>
     </xsd:element>
   </xsd:schema>
-  <xsd:schema xmlns:xsd="http://www.w3.org/2001/XMLSchema" xmlns:xs="http://www.w3.org/2001/XMLSchema" xmlns:dms="http://schemas.microsoft.com/office/2006/documentManagement/types" xmlns:pc="http://schemas.microsoft.com/office/infopath/2007/PartnerControls" targetNamespace="457672a9-2aae-4e32-9c0c-21a1a727485c" elementFormDefault="qualified">
+  <xsd:schema xmlns:xsd="http://www.w3.org/2001/XMLSchema" xmlns:xs="http://www.w3.org/2001/XMLSchema" xmlns:dms="http://schemas.microsoft.com/office/2006/documentManagement/types" xmlns:pc="http://schemas.microsoft.com/office/infopath/2007/PartnerControls" targetNamespace="73469ae3-3789-4a7f-87ef-b4423e3499cf" elementFormDefault="qualified">
     <xsd:import namespace="http://schemas.microsoft.com/office/2006/documentManagement/types"/>
     <xsd:import namespace="http://schemas.microsoft.com/office/infopath/2007/PartnerControls"/>
     <xsd:element name="MediaServiceMetadata" ma:index="8" nillable="true" ma:displayName="MediaServiceMetadata" ma:hidden="true" ma:internalName="MediaServiceMetadata" ma:readOnly="true">
@@ -6967,50 +6967,40 @@
         <xsd:restriction base="dms:Note"/>
       </xsd:simpleType>
     </xsd:element>
-    <xsd:element name="lcf76f155ced4ddcb4097134ff3c332f" ma:index="11" nillable="true" ma:taxonomy="true" ma:internalName="lcf76f155ced4ddcb4097134ff3c332f" ma:taxonomyFieldName="MediaServiceImageTags" ma:displayName="Image Tags" ma:readOnly="false" ma:fieldId="{5cf76f15-5ced-4ddc-b409-7134ff3c332f}" ma:taxonomyMulti="true" ma:sspId="fa0c477a-f09e-4137-8c49-77869fdcca91" ma:termSetId="09814cd3-568e-fe90-9814-8d621ff8fb84" ma:anchorId="fba54fb3-c3e1-fe81-a776-ca4b69148c4d" ma:open="true" ma:isKeyword="false">
+    <xsd:element name="MediaServiceObjectDetectorVersions" ma:index="10" nillable="true" ma:displayName="MediaServiceObjectDetectorVersions" ma:hidden="true" ma:indexed="true" ma:internalName="MediaServiceObjectDetectorVersions" ma:readOnly="true">
+      <xsd:simpleType>
+        <xsd:restriction base="dms:Text"/>
+      </xsd:simpleType>
+    </xsd:element>
+    <xsd:element name="lcf76f155ced4ddcb4097134ff3c332f" ma:index="14" nillable="true" ma:taxonomy="true" ma:internalName="lcf76f155ced4ddcb4097134ff3c332f" ma:taxonomyFieldName="MediaServiceImageTags" ma:displayName="Image Tags" ma:readOnly="false" ma:fieldId="{5cf76f15-5ced-4ddc-b409-7134ff3c332f}" ma:taxonomyMulti="true" ma:sspId="fa0c477a-f09e-4137-8c49-77869fdcca91" ma:termSetId="09814cd3-568e-fe90-9814-8d621ff8fb84" ma:anchorId="fba54fb3-c3e1-fe81-a776-ca4b69148c4d" ma:open="true" ma:isKeyword="false">
       <xsd:complexType>
         <xsd:sequence>
           <xsd:element ref="pc:Terms" minOccurs="0" maxOccurs="1"/>
         </xsd:sequence>
       </xsd:complexType>
     </xsd:element>
-    <xsd:element name="MediaServiceOCR" ma:index="12" nillable="true" ma:displayName="Extracted Text" ma:internalName="MediaServiceOCR" ma:readOnly="true">
+    <xsd:element name="MediaServiceOCR" ma:index="16" nillable="true" ma:displayName="Extracted Text" ma:internalName="MediaServiceOCR" ma:readOnly="true">
       <xsd:simpleType>
         <xsd:restriction base="dms:Note">
           <xsd:maxLength value="255"/>
         </xsd:restriction>
       </xsd:simpleType>
     </xsd:element>
-    <xsd:element name="MediaServiceGenerationTime" ma:index="13" nillable="true" ma:displayName="MediaServiceGenerationTime" ma:hidden="true" ma:internalName="MediaServiceGenerationTime" ma:readOnly="true">
+    <xsd:element name="MediaServiceGenerationTime" ma:index="17" nillable="true" ma:displayName="MediaServiceGenerationTime" ma:hidden="true" ma:internalName="MediaServiceGenerationTime" ma:readOnly="true">
       <xsd:simpleType>
         <xsd:restriction base="dms:Text"/>
       </xsd:simpleType>
     </xsd:element>
-    <xsd:element name="MediaServiceEventHashCode" ma:index="14" nillable="true" ma:displayName="MediaServiceEventHashCode" ma:hidden="true" ma:internalName="MediaServiceEventHashCode" ma:readOnly="true">
-      <xsd:simpleType>
-        <xsd:restriction base="dms:Text"/>
-      </xsd:simpleType>
-    </xsd:element>
-    <xsd:element name="MediaServiceDateTaken" ma:index="15" nillable="true" ma:displayName="MediaServiceDateTaken" ma:hidden="true" ma:indexed="true" ma:internalName="MediaServiceDateTaken" ma:readOnly="true">
-      <xsd:simpleType>
-        <xsd:restriction base="dms:Text"/>
-      </xsd:simpleType>
-    </xsd:element>
-    <xsd:element name="MediaLengthInSeconds" ma:index="16" nillable="true" ma:displayName="MediaLengthInSeconds" ma:hidden="true" ma:internalName="MediaLengthInSeconds" ma:readOnly="true">
-      <xsd:simpleType>
-        <xsd:restriction base="dms:Unknown"/>
-      </xsd:simpleType>
-    </xsd:element>
-    <xsd:element name="MediaServiceObjectDetectorVersions" ma:index="17" nillable="true" ma:displayName="MediaServiceObjectDetectorVersions" ma:hidden="true" ma:indexed="true" ma:internalName="MediaServiceObjectDetectorVersions" ma:readOnly="true">
+    <xsd:element name="MediaServiceEventHashCode" ma:index="18" nillable="true" ma:displayName="MediaServiceEventHashCode" ma:hidden="true" ma:internalName="MediaServiceEventHashCode" ma:readOnly="true">
       <xsd:simpleType>
         <xsd:restriction base="dms:Text"/>
       </xsd:simpleType>
     </xsd:element>
   </xsd:schema>
-  <xsd:schema xmlns:xsd="http://www.w3.org/2001/XMLSchema" xmlns:xs="http://www.w3.org/2001/XMLSchema" xmlns:dms="http://schemas.microsoft.com/office/2006/documentManagement/types" xmlns:pc="http://schemas.microsoft.com/office/infopath/2007/PartnerControls" targetNamespace="dab19d59-310d-4ad5-9870-435903295c2c" elementFormDefault="qualified">
+  <xsd:schema xmlns:xsd="http://www.w3.org/2001/XMLSchema" xmlns:xs="http://www.w3.org/2001/XMLSchema" xmlns:dms="http://schemas.microsoft.com/office/2006/documentManagement/types" xmlns:pc="http://schemas.microsoft.com/office/infopath/2007/PartnerControls" targetNamespace="370954b4-d60e-43df-a72f-328730ed82f8" elementFormDefault="qualified">
     <xsd:import namespace="http://schemas.microsoft.com/office/2006/documentManagement/types"/>
     <xsd:import namespace="http://schemas.microsoft.com/office/infopath/2007/PartnerControls"/>
-    <xsd:element name="SharedWithUsers" ma:index="18" nillable="true" ma:displayName="Shared With" ma:internalName="SharedWithUsers" ma:readOnly="true">
+    <xsd:element name="SharedWithUsers" ma:index="11" nillable="true" ma:displayName="Shared With" ma:internalName="SharedWithUsers" ma:readOnly="true">
       <xsd:complexType>
         <xsd:complexContent>
           <xsd:extension base="dms:UserMulti">
@@ -7029,12 +7019,23 @@
         </xsd:complexContent>
       </xsd:complexType>
     </xsd:element>
-    <xsd:element name="SharedWithDetails" ma:index="19" nillable="true" ma:displayName="Shared With Details" ma:internalName="SharedWithDetails" ma:readOnly="true">
+    <xsd:element name="SharedWithDetails" ma:index="12" nillable="true" ma:displayName="Shared With Details" ma:internalName="SharedWithDetails" ma:readOnly="true">
       <xsd:simpleType>
         <xsd:restriction base="dms:Note">
           <xsd:maxLength value="255"/>
         </xsd:restriction>
       </xsd:simpleType>
+    </xsd:element>
+    <xsd:element name="TaxCatchAll" ma:index="15" nillable="true" ma:displayName="Taxonomy Catch All Column" ma:hidden="true" ma:list="{382dca3c-54a7-41ab-aa21-4ab4e1588e2d}" ma:internalName="TaxCatchAll" ma:showField="CatchAllData" ma:web="370954b4-d60e-43df-a72f-328730ed82f8">
+      <xsd:complexType>
+        <xsd:complexContent>
+          <xsd:extension base="dms:MultiChoiceLookup">
+            <xsd:sequence>
+              <xsd:element name="Value" type="dms:Lookup" maxOccurs="unbounded" minOccurs="0" nillable="true"/>
+            </xsd:sequence>
+          </xsd:extension>
+        </xsd:complexContent>
+      </xsd:complexType>
     </xsd:element>
   </xsd:schema>
   <xsd:schema xmlns="http://schemas.openxmlformats.org/package/2006/metadata/core-properties" xmlns:xsd="http://www.w3.org/2001/XMLSchema" xmlns:xsi="http://www.w3.org/2001/XMLSchema-instance" xmlns:dc="http://purl.org/dc/elements/1.1/" xmlns:dcterms="http://purl.org/dc/terms/" xmlns:odoc="http://schemas.microsoft.com/internal/obd" targetNamespace="http://schemas.openxmlformats.org/package/2006/metadata/core-properties" elementFormDefault="qualified" attributeFormDefault="unqualified" blockDefault="#all">
@@ -7161,20 +7162,5 @@
 </file>
 
 <file path=customXml/itemProps3.xml><?xml version="1.0" encoding="utf-8"?>
-<ds:datastoreItem xmlns:ds="http://schemas.openxmlformats.org/officeDocument/2006/customXml" ds:itemID="{3C1033CA-23FB-41C7-8A95-DCAA51ACBE23}">
-  <ds:schemaRefs>
-    <ds:schemaRef ds:uri="http://schemas.microsoft.com/office/2006/metadata/contentType"/>
-    <ds:schemaRef ds:uri="http://schemas.microsoft.com/office/2006/metadata/properties/metaAttributes"/>
-    <ds:schemaRef ds:uri="http://www.w3.org/2001/XMLSchema"/>
-    <ds:schemaRef ds:uri="http://schemas.microsoft.com/office/2006/metadata/properties"/>
-    <ds:schemaRef ds:uri="457672a9-2aae-4e32-9c0c-21a1a727485c"/>
-    <ds:schemaRef ds:uri="dab19d59-310d-4ad5-9870-435903295c2c"/>
-    <ds:schemaRef ds:uri="http://schemas.microsoft.com/office/2006/documentManagement/types"/>
-    <ds:schemaRef ds:uri="http://schemas.microsoft.com/office/infopath/2007/PartnerControls"/>
-    <ds:schemaRef ds:uri="http://schemas.openxmlformats.org/package/2006/metadata/core-properties"/>
-    <ds:schemaRef ds:uri="http://purl.org/dc/elements/1.1/"/>
-    <ds:schemaRef ds:uri="http://purl.org/dc/terms/"/>
-    <ds:schemaRef ds:uri="http://schemas.microsoft.com/internal/obd"/>
-  </ds:schemaRefs>
-</ds:datastoreItem>
+<ds:datastoreItem xmlns:ds="http://schemas.openxmlformats.org/officeDocument/2006/customXml" ds:itemID="{B8B2BF3D-6C64-4341-B79B-E91BF739883A}"/>
 </file>
</xml_diff>